<commit_message>
new objects for analyses
Dataframes…

	SentimentCharacterOverSeries
	SentimentCharacterOverSeason
	SentimentCharacterOverSeason_M(für plot von Marinette)

…hinzugefügt
</commit_message>
<xml_diff>
--- a/pipe diagram.pptx
+++ b/pipe diagram.pptx
@@ -104,6 +104,11 @@
       </a:defRPr>
     </a:lvl9pPr>
   </p:defaultTextStyle>
+  <p:extLst>
+    <p:ext uri="{EFAFB233-063F-42B5-8137-9DF3F51BA10A}">
+      <p15:sldGuideLst xmlns:p15="http://schemas.microsoft.com/office/powerpoint/2012/main"/>
+    </p:ext>
+  </p:extLst>
 </p:presentation>
 </file>
 
@@ -254,7 +259,7 @@
           <a:p>
             <a:fld id="{FDBA45A5-DBC2-D449-BA1E-D23E556848F0}" type="datetimeFigureOut">
               <a:rPr lang="de-DE" smtClean="0"/>
-              <a:t>20.05.22</a:t>
+              <a:t>21.05.22</a:t>
             </a:fld>
             <a:endParaRPr lang="de-DE"/>
           </a:p>
@@ -452,7 +457,7 @@
           <a:p>
             <a:fld id="{FDBA45A5-DBC2-D449-BA1E-D23E556848F0}" type="datetimeFigureOut">
               <a:rPr lang="de-DE" smtClean="0"/>
-              <a:t>20.05.22</a:t>
+              <a:t>21.05.22</a:t>
             </a:fld>
             <a:endParaRPr lang="de-DE"/>
           </a:p>
@@ -660,7 +665,7 @@
           <a:p>
             <a:fld id="{FDBA45A5-DBC2-D449-BA1E-D23E556848F0}" type="datetimeFigureOut">
               <a:rPr lang="de-DE" smtClean="0"/>
-              <a:t>20.05.22</a:t>
+              <a:t>21.05.22</a:t>
             </a:fld>
             <a:endParaRPr lang="de-DE"/>
           </a:p>
@@ -858,7 +863,7 @@
           <a:p>
             <a:fld id="{FDBA45A5-DBC2-D449-BA1E-D23E556848F0}" type="datetimeFigureOut">
               <a:rPr lang="de-DE" smtClean="0"/>
-              <a:t>20.05.22</a:t>
+              <a:t>21.05.22</a:t>
             </a:fld>
             <a:endParaRPr lang="de-DE"/>
           </a:p>
@@ -1133,7 +1138,7 @@
           <a:p>
             <a:fld id="{FDBA45A5-DBC2-D449-BA1E-D23E556848F0}" type="datetimeFigureOut">
               <a:rPr lang="de-DE" smtClean="0"/>
-              <a:t>20.05.22</a:t>
+              <a:t>21.05.22</a:t>
             </a:fld>
             <a:endParaRPr lang="de-DE"/>
           </a:p>
@@ -1398,7 +1403,7 @@
           <a:p>
             <a:fld id="{FDBA45A5-DBC2-D449-BA1E-D23E556848F0}" type="datetimeFigureOut">
               <a:rPr lang="de-DE" smtClean="0"/>
-              <a:t>20.05.22</a:t>
+              <a:t>21.05.22</a:t>
             </a:fld>
             <a:endParaRPr lang="de-DE"/>
           </a:p>
@@ -1810,7 +1815,7 @@
           <a:p>
             <a:fld id="{FDBA45A5-DBC2-D449-BA1E-D23E556848F0}" type="datetimeFigureOut">
               <a:rPr lang="de-DE" smtClean="0"/>
-              <a:t>20.05.22</a:t>
+              <a:t>21.05.22</a:t>
             </a:fld>
             <a:endParaRPr lang="de-DE"/>
           </a:p>
@@ -1951,7 +1956,7 @@
           <a:p>
             <a:fld id="{FDBA45A5-DBC2-D449-BA1E-D23E556848F0}" type="datetimeFigureOut">
               <a:rPr lang="de-DE" smtClean="0"/>
-              <a:t>20.05.22</a:t>
+              <a:t>21.05.22</a:t>
             </a:fld>
             <a:endParaRPr lang="de-DE"/>
           </a:p>
@@ -2064,7 +2069,7 @@
           <a:p>
             <a:fld id="{FDBA45A5-DBC2-D449-BA1E-D23E556848F0}" type="datetimeFigureOut">
               <a:rPr lang="de-DE" smtClean="0"/>
-              <a:t>20.05.22</a:t>
+              <a:t>21.05.22</a:t>
             </a:fld>
             <a:endParaRPr lang="de-DE"/>
           </a:p>
@@ -2375,7 +2380,7 @@
           <a:p>
             <a:fld id="{FDBA45A5-DBC2-D449-BA1E-D23E556848F0}" type="datetimeFigureOut">
               <a:rPr lang="de-DE" smtClean="0"/>
-              <a:t>20.05.22</a:t>
+              <a:t>21.05.22</a:t>
             </a:fld>
             <a:endParaRPr lang="de-DE"/>
           </a:p>
@@ -2663,7 +2668,7 @@
           <a:p>
             <a:fld id="{FDBA45A5-DBC2-D449-BA1E-D23E556848F0}" type="datetimeFigureOut">
               <a:rPr lang="de-DE" smtClean="0"/>
-              <a:t>20.05.22</a:t>
+              <a:t>21.05.22</a:t>
             </a:fld>
             <a:endParaRPr lang="de-DE"/>
           </a:p>
@@ -2904,7 +2909,7 @@
           <a:p>
             <a:fld id="{FDBA45A5-DBC2-D449-BA1E-D23E556848F0}" type="datetimeFigureOut">
               <a:rPr lang="de-DE" smtClean="0"/>
-              <a:t>20.05.22</a:t>
+              <a:t>21.05.22</a:t>
             </a:fld>
             <a:endParaRPr lang="de-DE"/>
           </a:p>
@@ -3437,8 +3442,8 @@
         </p:nvSpPr>
         <p:spPr>
           <a:xfrm>
-            <a:off x="1364059" y="2106215"/>
-            <a:ext cx="1285082" cy="471488"/>
+            <a:off x="1364058" y="2106214"/>
+            <a:ext cx="1422901" cy="573189"/>
           </a:xfrm>
           <a:prstGeom prst="roundRect">
             <a:avLst/>
@@ -3564,12 +3569,20 @@
         </p:nvSpPr>
         <p:spPr>
           <a:xfrm>
-            <a:off x="1461789" y="3339705"/>
-            <a:ext cx="1128712" cy="471488"/>
+            <a:off x="1364058" y="2962273"/>
+            <a:ext cx="1422901" cy="573188"/>
           </a:xfrm>
           <a:prstGeom prst="roundRect">
             <a:avLst/>
           </a:prstGeom>
+          <a:solidFill>
+            <a:schemeClr val="accent3">
+              <a:lumMod val="75000"/>
+            </a:schemeClr>
+          </a:solidFill>
+          <a:ln>
+            <a:noFill/>
+          </a:ln>
         </p:spPr>
         <p:style>
           <a:lnRef idx="2">
@@ -3593,8 +3606,20 @@
           <a:p>
             <a:pPr algn="ctr"/>
             <a:r>
+              <a:rPr lang="de-DE" sz="1200" dirty="0"/>
+              <a:t>C . WEB SCRAPING </a:t>
+            </a:r>
+            <a:r>
               <a:rPr lang="de-DE" sz="1200" dirty="0" err="1"/>
-              <a:t>Cleaning</a:t>
+              <a:t>of</a:t>
+            </a:r>
+            <a:r>
+              <a:rPr lang="de-DE" sz="1200" dirty="0"/>
+              <a:t> </a:t>
+            </a:r>
+            <a:r>
+              <a:rPr lang="de-DE" sz="1200" dirty="0" err="1"/>
+              <a:t>medadata</a:t>
             </a:r>
             <a:endParaRPr lang="de-DE" sz="1200" dirty="0"/>
           </a:p>
@@ -3614,12 +3639,20 @@
         </p:nvSpPr>
         <p:spPr>
           <a:xfrm>
-            <a:off x="935038" y="5006976"/>
-            <a:ext cx="1128712" cy="471488"/>
+            <a:off x="1364057" y="3818330"/>
+            <a:ext cx="1422901" cy="573187"/>
           </a:xfrm>
           <a:prstGeom prst="roundRect">
             <a:avLst/>
           </a:prstGeom>
+          <a:solidFill>
+            <a:schemeClr val="accent4">
+              <a:lumMod val="75000"/>
+            </a:schemeClr>
+          </a:solidFill>
+          <a:ln>
+            <a:noFill/>
+          </a:ln>
         </p:spPr>
         <p:style>
           <a:lnRef idx="2">
@@ -3643,10 +3676,9 @@
           <a:p>
             <a:pPr algn="ctr"/>
             <a:r>
-              <a:rPr lang="de-DE" sz="1200" dirty="0" err="1"/>
-              <a:t>Analyzing</a:t>
-            </a:r>
-            <a:endParaRPr lang="de-DE" sz="1200" dirty="0"/>
+              <a:rPr lang="de-DE" sz="1200" dirty="0"/>
+              <a:t>D. ANALYSE DATA</a:t>
+            </a:r>
           </a:p>
         </p:txBody>
       </p:sp>
@@ -3664,7 +3696,7 @@
         </p:nvSpPr>
         <p:spPr>
           <a:xfrm>
-            <a:off x="2786959" y="1250157"/>
+            <a:off x="2853550" y="1250157"/>
             <a:ext cx="2133899" cy="471488"/>
           </a:xfrm>
           <a:prstGeom prst="snip2DiagRect">
@@ -3744,7 +3776,62 @@
         </p:nvSpPr>
         <p:spPr>
           <a:xfrm>
-            <a:off x="5294513" y="1243012"/>
+            <a:off x="5427695" y="1241470"/>
+            <a:ext cx="2133899" cy="471488"/>
+          </a:xfrm>
+          <a:prstGeom prst="snip2DiagRect">
+            <a:avLst/>
+          </a:prstGeom>
+          <a:solidFill>
+            <a:schemeClr val="accent1"/>
+          </a:solidFill>
+          <a:ln>
+            <a:noFill/>
+          </a:ln>
+        </p:spPr>
+        <p:style>
+          <a:lnRef idx="2">
+            <a:schemeClr val="accent2">
+              <a:shade val="50000"/>
+            </a:schemeClr>
+          </a:lnRef>
+          <a:fillRef idx="1">
+            <a:schemeClr val="accent2"/>
+          </a:fillRef>
+          <a:effectRef idx="0">
+            <a:schemeClr val="accent2"/>
+          </a:effectRef>
+          <a:fontRef idx="minor">
+            <a:schemeClr val="lt1"/>
+          </a:fontRef>
+        </p:style>
+        <p:txBody>
+          <a:bodyPr rtlCol="0" anchor="ctr"/>
+          <a:lstStyle/>
+          <a:p>
+            <a:pPr algn="ctr"/>
+            <a:r>
+              <a:rPr lang="en-US" sz="1200" dirty="0"/>
+              <a:t>research availability of transcripts</a:t>
+            </a:r>
+          </a:p>
+        </p:txBody>
+      </p:sp>
+      <p:sp>
+        <p:nvSpPr>
+          <p:cNvPr id="14" name="Diagonal liegende Ecken des Rechtecks schneiden 13">
+            <a:extLst>
+              <a:ext uri="{FF2B5EF4-FFF2-40B4-BE49-F238E27FC236}">
+                <a16:creationId xmlns:a16="http://schemas.microsoft.com/office/drawing/2014/main" id="{726765C8-15FF-C0C5-CB26-F37A0AD295A5}"/>
+              </a:ext>
+            </a:extLst>
+          </p:cNvPr>
+          <p:cNvSpPr/>
+          <p:nvPr/>
+        </p:nvSpPr>
+        <p:spPr>
+          <a:xfrm>
+            <a:off x="8001840" y="1241470"/>
             <a:ext cx="2039145" cy="471488"/>
           </a:xfrm>
           <a:prstGeom prst="snip2DiagRect">
@@ -3779,18 +3866,39 @@
           <a:p>
             <a:pPr algn="ctr"/>
             <a:r>
-              <a:rPr lang="en-US" sz="1200" dirty="0"/>
-              <a:t>research availability of transcripts</a:t>
-            </a:r>
-          </a:p>
-        </p:txBody>
-      </p:sp>
-      <p:sp>
-        <p:nvSpPr>
-          <p:cNvPr id="14" name="Diagonal liegende Ecken des Rechtecks schneiden 13">
-            <a:extLst>
-              <a:ext uri="{FF2B5EF4-FFF2-40B4-BE49-F238E27FC236}">
-                <a16:creationId xmlns:a16="http://schemas.microsoft.com/office/drawing/2014/main" id="{726765C8-15FF-C0C5-CB26-F37A0AD295A5}"/>
+              <a:rPr lang="de-DE" sz="1200" dirty="0"/>
+              <a:t>check </a:t>
+            </a:r>
+            <a:r>
+              <a:rPr lang="de-DE" sz="1200" dirty="0" err="1"/>
+              <a:t>quality</a:t>
+            </a:r>
+            <a:r>
+              <a:rPr lang="de-DE" sz="1200" dirty="0"/>
+              <a:t> </a:t>
+            </a:r>
+            <a:r>
+              <a:rPr lang="de-DE" sz="1200" dirty="0" err="1"/>
+              <a:t>of</a:t>
+            </a:r>
+            <a:r>
+              <a:rPr lang="de-DE" sz="1200" dirty="0"/>
+              <a:t> </a:t>
+            </a:r>
+            <a:r>
+              <a:rPr lang="de-DE" sz="1200" dirty="0" err="1"/>
+              <a:t>transcripts</a:t>
+            </a:r>
+            <a:endParaRPr lang="de-DE" sz="1200" dirty="0"/>
+          </a:p>
+        </p:txBody>
+      </p:sp>
+      <p:sp>
+        <p:nvSpPr>
+          <p:cNvPr id="16" name="Diagonal liegende Ecken des Rechtecks schneiden 15">
+            <a:extLst>
+              <a:ext uri="{FF2B5EF4-FFF2-40B4-BE49-F238E27FC236}">
+                <a16:creationId xmlns:a16="http://schemas.microsoft.com/office/drawing/2014/main" id="{8975157A-7151-B215-687A-C23F22812F56}"/>
               </a:ext>
             </a:extLst>
           </p:cNvPr>
@@ -3799,84 +3907,8 @@
         </p:nvSpPr>
         <p:spPr>
           <a:xfrm>
-            <a:off x="7707313" y="1250157"/>
-            <a:ext cx="2039145" cy="471488"/>
-          </a:xfrm>
-          <a:prstGeom prst="snip2DiagRect">
-            <a:avLst/>
-          </a:prstGeom>
-          <a:solidFill>
-            <a:schemeClr val="accent1"/>
-          </a:solidFill>
-          <a:ln>
-            <a:noFill/>
-          </a:ln>
-        </p:spPr>
-        <p:style>
-          <a:lnRef idx="2">
-            <a:schemeClr val="accent2">
-              <a:shade val="50000"/>
-            </a:schemeClr>
-          </a:lnRef>
-          <a:fillRef idx="1">
-            <a:schemeClr val="accent2"/>
-          </a:fillRef>
-          <a:effectRef idx="0">
-            <a:schemeClr val="accent2"/>
-          </a:effectRef>
-          <a:fontRef idx="minor">
-            <a:schemeClr val="lt1"/>
-          </a:fontRef>
-        </p:style>
-        <p:txBody>
-          <a:bodyPr rtlCol="0" anchor="ctr"/>
-          <a:lstStyle/>
-          <a:p>
-            <a:pPr algn="ctr"/>
-            <a:r>
-              <a:rPr lang="de-DE" sz="1200" dirty="0"/>
-              <a:t>check </a:t>
-            </a:r>
-            <a:r>
-              <a:rPr lang="de-DE" sz="1200" dirty="0" err="1"/>
-              <a:t>quality</a:t>
-            </a:r>
-            <a:r>
-              <a:rPr lang="de-DE" sz="1200" dirty="0"/>
-              <a:t> </a:t>
-            </a:r>
-            <a:r>
-              <a:rPr lang="de-DE" sz="1200" dirty="0" err="1"/>
-              <a:t>of</a:t>
-            </a:r>
-            <a:r>
-              <a:rPr lang="de-DE" sz="1200" dirty="0"/>
-              <a:t> </a:t>
-            </a:r>
-            <a:r>
-              <a:rPr lang="de-DE" sz="1200" dirty="0" err="1"/>
-              <a:t>transcripts</a:t>
-            </a:r>
-            <a:endParaRPr lang="de-DE" sz="1200" dirty="0"/>
-          </a:p>
-        </p:txBody>
-      </p:sp>
-      <p:sp>
-        <p:nvSpPr>
-          <p:cNvPr id="16" name="Diagonal liegende Ecken des Rechtecks schneiden 15">
-            <a:extLst>
-              <a:ext uri="{FF2B5EF4-FFF2-40B4-BE49-F238E27FC236}">
-                <a16:creationId xmlns:a16="http://schemas.microsoft.com/office/drawing/2014/main" id="{8975157A-7151-B215-687A-C23F22812F56}"/>
-              </a:ext>
-            </a:extLst>
-          </p:cNvPr>
-          <p:cNvSpPr/>
-          <p:nvPr/>
-        </p:nvSpPr>
-        <p:spPr>
-          <a:xfrm>
-            <a:off x="10120113" y="1250157"/>
-            <a:ext cx="1834457" cy="471488"/>
+            <a:off x="10481231" y="1252219"/>
+            <a:ext cx="1599773" cy="559484"/>
           </a:xfrm>
           <a:prstGeom prst="snip2DiagRect">
             <a:avLst/>
@@ -4015,25 +4047,25 @@
         </p:nvCxnSpPr>
         <p:spPr>
           <a:xfrm flipH="1">
-            <a:off x="2006600" y="1721645"/>
-            <a:ext cx="9030742" cy="384570"/>
+            <a:off x="2075509" y="1811703"/>
+            <a:ext cx="9205609" cy="294511"/>
           </a:xfrm>
           <a:prstGeom prst="straightConnector1">
             <a:avLst/>
           </a:prstGeom>
-          <a:ln>
+          <a:ln cap="sq">
             <a:tailEnd type="triangle"/>
           </a:ln>
         </p:spPr>
         <p:style>
           <a:lnRef idx="1">
-            <a:schemeClr val="accent1"/>
+            <a:schemeClr val="dk1"/>
           </a:lnRef>
           <a:fillRef idx="0">
-            <a:schemeClr val="accent1"/>
+            <a:schemeClr val="dk1"/>
           </a:fillRef>
           <a:effectRef idx="0">
-            <a:schemeClr val="accent1"/>
+            <a:schemeClr val="dk1"/>
           </a:effectRef>
           <a:fontRef idx="minor">
             <a:schemeClr val="tx1"/>
@@ -4054,7 +4086,7 @@
         </p:nvSpPr>
         <p:spPr>
           <a:xfrm>
-            <a:off x="2857699" y="2093120"/>
+            <a:off x="2895155" y="2093120"/>
             <a:ext cx="1400372" cy="471488"/>
           </a:xfrm>
           <a:prstGeom prst="snip2DiagRect">
@@ -4120,7 +4152,7 @@
         </p:nvSpPr>
         <p:spPr>
           <a:xfrm>
-            <a:off x="4403724" y="2093120"/>
+            <a:off x="4403723" y="2099668"/>
             <a:ext cx="1785542" cy="471488"/>
           </a:xfrm>
           <a:prstGeom prst="snip2DiagRect">
@@ -4275,7 +4307,7 @@
         </p:nvSpPr>
         <p:spPr>
           <a:xfrm>
-            <a:off x="6334919" y="2106215"/>
+            <a:off x="6297461" y="2113360"/>
             <a:ext cx="2153047" cy="471488"/>
           </a:xfrm>
           <a:prstGeom prst="snip2DiagRect">
@@ -4371,7 +4403,7 @@
         </p:nvSpPr>
         <p:spPr>
           <a:xfrm>
-            <a:off x="8726885" y="2106215"/>
+            <a:off x="8554736" y="2106215"/>
             <a:ext cx="1206106" cy="471488"/>
           </a:xfrm>
           <a:prstGeom prst="snip2DiagRect">
@@ -4435,8 +4467,8 @@
         </p:nvSpPr>
         <p:spPr>
           <a:xfrm>
-            <a:off x="10120113" y="2093120"/>
-            <a:ext cx="1834457" cy="471488"/>
+            <a:off x="10246548" y="2089811"/>
+            <a:ext cx="1834457" cy="589593"/>
           </a:xfrm>
           <a:prstGeom prst="snip2DiagRect">
             <a:avLst/>
@@ -4508,6 +4540,722 @@
               <a:t>scripts</a:t>
             </a:r>
             <a:endParaRPr lang="de-DE" sz="1200" dirty="0"/>
+          </a:p>
+        </p:txBody>
+      </p:sp>
+      <p:sp>
+        <p:nvSpPr>
+          <p:cNvPr id="22" name="Diagonal liegende Ecken des Rechtecks schneiden 21">
+            <a:extLst>
+              <a:ext uri="{FF2B5EF4-FFF2-40B4-BE49-F238E27FC236}">
+                <a16:creationId xmlns:a16="http://schemas.microsoft.com/office/drawing/2014/main" id="{2A20AD75-0234-03CC-B2B4-D81D2B29C562}"/>
+              </a:ext>
+            </a:extLst>
+          </p:cNvPr>
+          <p:cNvSpPr/>
+          <p:nvPr/>
+        </p:nvSpPr>
+        <p:spPr>
+          <a:xfrm>
+            <a:off x="2998787" y="2957512"/>
+            <a:ext cx="1692277" cy="471488"/>
+          </a:xfrm>
+          <a:prstGeom prst="snip2DiagRect">
+            <a:avLst/>
+          </a:prstGeom>
+          <a:solidFill>
+            <a:schemeClr val="accent3"/>
+          </a:solidFill>
+          <a:ln>
+            <a:noFill/>
+          </a:ln>
+        </p:spPr>
+        <p:style>
+          <a:lnRef idx="2">
+            <a:schemeClr val="accent2">
+              <a:shade val="50000"/>
+            </a:schemeClr>
+          </a:lnRef>
+          <a:fillRef idx="1">
+            <a:schemeClr val="accent2"/>
+          </a:fillRef>
+          <a:effectRef idx="0">
+            <a:schemeClr val="accent2"/>
+          </a:effectRef>
+          <a:fontRef idx="minor">
+            <a:schemeClr val="lt1"/>
+          </a:fontRef>
+        </p:style>
+        <p:txBody>
+          <a:bodyPr rtlCol="0" anchor="ctr"/>
+          <a:lstStyle/>
+          <a:p>
+            <a:pPr algn="ctr"/>
+            <a:r>
+              <a:rPr lang="de-DE" sz="1200" dirty="0"/>
+              <a:t>find reliable </a:t>
+            </a:r>
+            <a:r>
+              <a:rPr lang="de-DE" sz="1200" dirty="0" err="1"/>
+              <a:t>metadata</a:t>
+            </a:r>
+            <a:r>
+              <a:rPr lang="de-DE" sz="1200" dirty="0"/>
+              <a:t> online</a:t>
+            </a:r>
+          </a:p>
+        </p:txBody>
+      </p:sp>
+      <p:sp>
+        <p:nvSpPr>
+          <p:cNvPr id="23" name="Diagonal liegende Ecken des Rechtecks schneiden 22">
+            <a:extLst>
+              <a:ext uri="{FF2B5EF4-FFF2-40B4-BE49-F238E27FC236}">
+                <a16:creationId xmlns:a16="http://schemas.microsoft.com/office/drawing/2014/main" id="{5B5D2698-0885-DA4D-6B00-AD61D88D125B}"/>
+              </a:ext>
+            </a:extLst>
+          </p:cNvPr>
+          <p:cNvSpPr/>
+          <p:nvPr/>
+        </p:nvSpPr>
+        <p:spPr>
+          <a:xfrm>
+            <a:off x="4903583" y="2957512"/>
+            <a:ext cx="1936502" cy="471488"/>
+          </a:xfrm>
+          <a:prstGeom prst="snip2DiagRect">
+            <a:avLst/>
+          </a:prstGeom>
+          <a:solidFill>
+            <a:schemeClr val="accent3"/>
+          </a:solidFill>
+          <a:ln>
+            <a:noFill/>
+          </a:ln>
+        </p:spPr>
+        <p:style>
+          <a:lnRef idx="2">
+            <a:schemeClr val="accent2">
+              <a:shade val="50000"/>
+            </a:schemeClr>
+          </a:lnRef>
+          <a:fillRef idx="1">
+            <a:schemeClr val="accent2"/>
+          </a:fillRef>
+          <a:effectRef idx="0">
+            <a:schemeClr val="accent2"/>
+          </a:effectRef>
+          <a:fontRef idx="minor">
+            <a:schemeClr val="lt1"/>
+          </a:fontRef>
+        </p:style>
+        <p:txBody>
+          <a:bodyPr rtlCol="0" anchor="ctr"/>
+          <a:lstStyle/>
+          <a:p>
+            <a:pPr algn="ctr"/>
+            <a:r>
+              <a:rPr lang="de-DE" sz="1200" dirty="0" err="1"/>
+              <a:t>write</a:t>
+            </a:r>
+            <a:r>
+              <a:rPr lang="de-DE" sz="1200" dirty="0"/>
+              <a:t> R </a:t>
+            </a:r>
+            <a:r>
+              <a:rPr lang="de-DE" sz="1200" dirty="0" err="1"/>
+              <a:t>script</a:t>
+            </a:r>
+            <a:r>
+              <a:rPr lang="de-DE" sz="1200" dirty="0"/>
+              <a:t> </a:t>
+            </a:r>
+            <a:r>
+              <a:rPr lang="de-DE" sz="1200" dirty="0" err="1"/>
+              <a:t>to</a:t>
+            </a:r>
+            <a:r>
+              <a:rPr lang="de-DE" sz="1200" dirty="0"/>
+              <a:t> web </a:t>
+            </a:r>
+            <a:r>
+              <a:rPr lang="de-DE" sz="1200" dirty="0" err="1"/>
+              <a:t>scrape</a:t>
+            </a:r>
+            <a:r>
+              <a:rPr lang="de-DE" sz="1200" dirty="0"/>
+              <a:t> </a:t>
+            </a:r>
+            <a:r>
+              <a:rPr lang="de-DE" sz="1200" dirty="0" err="1"/>
+              <a:t>the</a:t>
+            </a:r>
+            <a:r>
+              <a:rPr lang="de-DE" sz="1200" dirty="0"/>
+              <a:t>  </a:t>
+            </a:r>
+            <a:r>
+              <a:rPr lang="de-DE" sz="1200" dirty="0" err="1"/>
+              <a:t>metadata</a:t>
+            </a:r>
+            <a:endParaRPr lang="de-DE" sz="1200" dirty="0"/>
+          </a:p>
+        </p:txBody>
+      </p:sp>
+      <p:sp>
+        <p:nvSpPr>
+          <p:cNvPr id="24" name="Diagonal liegende Ecken des Rechtecks schneiden 23">
+            <a:extLst>
+              <a:ext uri="{FF2B5EF4-FFF2-40B4-BE49-F238E27FC236}">
+                <a16:creationId xmlns:a16="http://schemas.microsoft.com/office/drawing/2014/main" id="{8663A63D-EC2A-64BD-8C8D-B9FFB03E9362}"/>
+              </a:ext>
+            </a:extLst>
+          </p:cNvPr>
+          <p:cNvSpPr/>
+          <p:nvPr/>
+        </p:nvSpPr>
+        <p:spPr>
+          <a:xfrm>
+            <a:off x="7052603" y="2957512"/>
+            <a:ext cx="2038233" cy="471488"/>
+          </a:xfrm>
+          <a:prstGeom prst="snip2DiagRect">
+            <a:avLst/>
+          </a:prstGeom>
+          <a:solidFill>
+            <a:schemeClr val="accent3"/>
+          </a:solidFill>
+          <a:ln>
+            <a:noFill/>
+          </a:ln>
+        </p:spPr>
+        <p:style>
+          <a:lnRef idx="2">
+            <a:schemeClr val="accent2">
+              <a:shade val="50000"/>
+            </a:schemeClr>
+          </a:lnRef>
+          <a:fillRef idx="1">
+            <a:schemeClr val="accent2"/>
+          </a:fillRef>
+          <a:effectRef idx="0">
+            <a:schemeClr val="accent2"/>
+          </a:effectRef>
+          <a:fontRef idx="minor">
+            <a:schemeClr val="lt1"/>
+          </a:fontRef>
+        </p:style>
+        <p:txBody>
+          <a:bodyPr rtlCol="0" anchor="ctr"/>
+          <a:lstStyle/>
+          <a:p>
+            <a:pPr algn="ctr"/>
+            <a:r>
+              <a:rPr lang="de-DE" sz="1200" dirty="0"/>
+              <a:t>clean </a:t>
+            </a:r>
+            <a:r>
+              <a:rPr lang="de-DE" sz="1200" dirty="0" err="1"/>
+              <a:t>up</a:t>
+            </a:r>
+            <a:r>
+              <a:rPr lang="de-DE" sz="1200" dirty="0"/>
+              <a:t> </a:t>
+            </a:r>
+            <a:r>
+              <a:rPr lang="de-DE" sz="1200" dirty="0" err="1"/>
+              <a:t>imported</a:t>
+            </a:r>
+            <a:r>
+              <a:rPr lang="de-DE" sz="1200" dirty="0"/>
+              <a:t> </a:t>
+            </a:r>
+            <a:r>
+              <a:rPr lang="de-DE" sz="1200" dirty="0" err="1"/>
+              <a:t>table</a:t>
+            </a:r>
+            <a:r>
+              <a:rPr lang="de-DE" sz="1200" dirty="0"/>
+              <a:t>(s), clean and </a:t>
+            </a:r>
+            <a:r>
+              <a:rPr lang="de-DE" sz="1200" dirty="0" err="1"/>
+              <a:t>combine</a:t>
+            </a:r>
+            <a:r>
+              <a:rPr lang="de-DE" sz="1200" dirty="0"/>
+              <a:t> </a:t>
+            </a:r>
+            <a:r>
+              <a:rPr lang="de-DE" sz="1200" dirty="0" err="1"/>
+              <a:t>table</a:t>
+            </a:r>
+            <a:r>
+              <a:rPr lang="de-DE" sz="1200" dirty="0"/>
+              <a:t>(s)</a:t>
+            </a:r>
+          </a:p>
+        </p:txBody>
+      </p:sp>
+      <p:sp>
+        <p:nvSpPr>
+          <p:cNvPr id="9" name="Rechteck 8">
+            <a:extLst>
+              <a:ext uri="{FF2B5EF4-FFF2-40B4-BE49-F238E27FC236}">
+                <a16:creationId xmlns:a16="http://schemas.microsoft.com/office/drawing/2014/main" id="{94E1476E-A136-24AB-5461-47B7C6836460}"/>
+              </a:ext>
+            </a:extLst>
+          </p:cNvPr>
+          <p:cNvSpPr/>
+          <p:nvPr/>
+        </p:nvSpPr>
+        <p:spPr>
+          <a:xfrm>
+            <a:off x="10889194" y="6221412"/>
+            <a:ext cx="84626" cy="471488"/>
+          </a:xfrm>
+          <a:prstGeom prst="rect">
+            <a:avLst/>
+          </a:prstGeom>
+          <a:solidFill>
+            <a:schemeClr val="tx1">
+              <a:lumMod val="75000"/>
+              <a:lumOff val="25000"/>
+            </a:schemeClr>
+          </a:solidFill>
+          <a:ln>
+            <a:noFill/>
+          </a:ln>
+        </p:spPr>
+        <p:style>
+          <a:lnRef idx="2">
+            <a:schemeClr val="accent1">
+              <a:shade val="50000"/>
+            </a:schemeClr>
+          </a:lnRef>
+          <a:fillRef idx="1">
+            <a:schemeClr val="accent1"/>
+          </a:fillRef>
+          <a:effectRef idx="0">
+            <a:schemeClr val="accent1"/>
+          </a:effectRef>
+          <a:fontRef idx="minor">
+            <a:schemeClr val="lt1"/>
+          </a:fontRef>
+        </p:style>
+        <p:txBody>
+          <a:bodyPr rtlCol="0" anchor="ctr"/>
+          <a:lstStyle/>
+          <a:p>
+            <a:pPr algn="ctr"/>
+            <a:endParaRPr lang="de-DE"/>
+          </a:p>
+        </p:txBody>
+      </p:sp>
+      <p:sp>
+        <p:nvSpPr>
+          <p:cNvPr id="10" name="Rechteck 9">
+            <a:extLst>
+              <a:ext uri="{FF2B5EF4-FFF2-40B4-BE49-F238E27FC236}">
+                <a16:creationId xmlns:a16="http://schemas.microsoft.com/office/drawing/2014/main" id="{6B5FAB31-E596-F5BD-06DB-CF4EC4CB80DD}"/>
+              </a:ext>
+            </a:extLst>
+          </p:cNvPr>
+          <p:cNvSpPr/>
+          <p:nvPr/>
+        </p:nvSpPr>
+        <p:spPr>
+          <a:xfrm>
+            <a:off x="11037341" y="6323806"/>
+            <a:ext cx="1066800" cy="266700"/>
+          </a:xfrm>
+          <a:prstGeom prst="rect">
+            <a:avLst/>
+          </a:prstGeom>
+          <a:solidFill>
+            <a:schemeClr val="tx1">
+              <a:lumMod val="75000"/>
+              <a:lumOff val="25000"/>
+            </a:schemeClr>
+          </a:solidFill>
+          <a:ln>
+            <a:noFill/>
+          </a:ln>
+        </p:spPr>
+        <p:style>
+          <a:lnRef idx="2">
+            <a:schemeClr val="accent1">
+              <a:shade val="50000"/>
+            </a:schemeClr>
+          </a:lnRef>
+          <a:fillRef idx="1">
+            <a:schemeClr val="accent1"/>
+          </a:fillRef>
+          <a:effectRef idx="0">
+            <a:schemeClr val="accent1"/>
+          </a:effectRef>
+          <a:fontRef idx="minor">
+            <a:schemeClr val="lt1"/>
+          </a:fontRef>
+        </p:style>
+        <p:txBody>
+          <a:bodyPr rtlCol="0" anchor="ctr"/>
+          <a:lstStyle/>
+          <a:p>
+            <a:pPr algn="ctr"/>
+            <a:r>
+              <a:rPr lang="de-DE" sz="1200" dirty="0" err="1"/>
+              <a:t>troubleshoot</a:t>
+            </a:r>
+            <a:endParaRPr lang="de-DE" sz="1200" dirty="0"/>
+          </a:p>
+        </p:txBody>
+      </p:sp>
+      <p:sp>
+        <p:nvSpPr>
+          <p:cNvPr id="34" name="Rechteck 33">
+            <a:extLst>
+              <a:ext uri="{FF2B5EF4-FFF2-40B4-BE49-F238E27FC236}">
+                <a16:creationId xmlns:a16="http://schemas.microsoft.com/office/drawing/2014/main" id="{CF845B23-CA39-2FEF-64BD-90A2EE814F57}"/>
+              </a:ext>
+            </a:extLst>
+          </p:cNvPr>
+          <p:cNvSpPr/>
+          <p:nvPr/>
+        </p:nvSpPr>
+        <p:spPr>
+          <a:xfrm>
+            <a:off x="9865069" y="2089812"/>
+            <a:ext cx="84626" cy="471488"/>
+          </a:xfrm>
+          <a:prstGeom prst="rect">
+            <a:avLst/>
+          </a:prstGeom>
+          <a:solidFill>
+            <a:schemeClr val="tx1">
+              <a:lumMod val="75000"/>
+              <a:lumOff val="25000"/>
+            </a:schemeClr>
+          </a:solidFill>
+          <a:ln>
+            <a:noFill/>
+          </a:ln>
+        </p:spPr>
+        <p:style>
+          <a:lnRef idx="2">
+            <a:schemeClr val="accent1">
+              <a:shade val="50000"/>
+            </a:schemeClr>
+          </a:lnRef>
+          <a:fillRef idx="1">
+            <a:schemeClr val="accent1"/>
+          </a:fillRef>
+          <a:effectRef idx="0">
+            <a:schemeClr val="accent1"/>
+          </a:effectRef>
+          <a:fontRef idx="minor">
+            <a:schemeClr val="lt1"/>
+          </a:fontRef>
+        </p:style>
+        <p:txBody>
+          <a:bodyPr rtlCol="0" anchor="ctr"/>
+          <a:lstStyle/>
+          <a:p>
+            <a:pPr algn="ctr"/>
+            <a:endParaRPr lang="de-DE"/>
+          </a:p>
+        </p:txBody>
+      </p:sp>
+      <p:sp>
+        <p:nvSpPr>
+          <p:cNvPr id="35" name="Rechteck 34">
+            <a:extLst>
+              <a:ext uri="{FF2B5EF4-FFF2-40B4-BE49-F238E27FC236}">
+                <a16:creationId xmlns:a16="http://schemas.microsoft.com/office/drawing/2014/main" id="{CF17A2A0-A754-9377-8427-9E60DA5EC60E}"/>
+              </a:ext>
+            </a:extLst>
+          </p:cNvPr>
+          <p:cNvSpPr/>
+          <p:nvPr/>
+        </p:nvSpPr>
+        <p:spPr>
+          <a:xfrm>
+            <a:off x="10048082" y="2089812"/>
+            <a:ext cx="84626" cy="471488"/>
+          </a:xfrm>
+          <a:prstGeom prst="rect">
+            <a:avLst/>
+          </a:prstGeom>
+          <a:solidFill>
+            <a:schemeClr val="tx1">
+              <a:lumMod val="75000"/>
+              <a:lumOff val="25000"/>
+            </a:schemeClr>
+          </a:solidFill>
+          <a:ln>
+            <a:noFill/>
+          </a:ln>
+        </p:spPr>
+        <p:style>
+          <a:lnRef idx="2">
+            <a:schemeClr val="accent1">
+              <a:shade val="50000"/>
+            </a:schemeClr>
+          </a:lnRef>
+          <a:fillRef idx="1">
+            <a:schemeClr val="accent1"/>
+          </a:fillRef>
+          <a:effectRef idx="0">
+            <a:schemeClr val="accent1"/>
+          </a:effectRef>
+          <a:fontRef idx="minor">
+            <a:schemeClr val="lt1"/>
+          </a:fontRef>
+        </p:style>
+        <p:txBody>
+          <a:bodyPr rtlCol="0" anchor="ctr"/>
+          <a:lstStyle/>
+          <a:p>
+            <a:pPr algn="ctr"/>
+            <a:endParaRPr lang="de-DE" dirty="0"/>
+          </a:p>
+        </p:txBody>
+      </p:sp>
+      <p:sp>
+        <p:nvSpPr>
+          <p:cNvPr id="36" name="Rechteck 35">
+            <a:extLst>
+              <a:ext uri="{FF2B5EF4-FFF2-40B4-BE49-F238E27FC236}">
+                <a16:creationId xmlns:a16="http://schemas.microsoft.com/office/drawing/2014/main" id="{BD52C3B7-7729-1B4A-41BB-828681394A90}"/>
+              </a:ext>
+            </a:extLst>
+          </p:cNvPr>
+          <p:cNvSpPr/>
+          <p:nvPr/>
+        </p:nvSpPr>
+        <p:spPr>
+          <a:xfrm>
+            <a:off x="9303354" y="2957512"/>
+            <a:ext cx="84626" cy="471488"/>
+          </a:xfrm>
+          <a:prstGeom prst="rect">
+            <a:avLst/>
+          </a:prstGeom>
+          <a:solidFill>
+            <a:schemeClr val="tx1">
+              <a:lumMod val="75000"/>
+              <a:lumOff val="25000"/>
+            </a:schemeClr>
+          </a:solidFill>
+          <a:ln>
+            <a:noFill/>
+          </a:ln>
+        </p:spPr>
+        <p:style>
+          <a:lnRef idx="2">
+            <a:schemeClr val="accent1">
+              <a:shade val="50000"/>
+            </a:schemeClr>
+          </a:lnRef>
+          <a:fillRef idx="1">
+            <a:schemeClr val="accent1"/>
+          </a:fillRef>
+          <a:effectRef idx="0">
+            <a:schemeClr val="accent1"/>
+          </a:effectRef>
+          <a:fontRef idx="minor">
+            <a:schemeClr val="lt1"/>
+          </a:fontRef>
+        </p:style>
+        <p:txBody>
+          <a:bodyPr rtlCol="0" anchor="ctr"/>
+          <a:lstStyle/>
+          <a:p>
+            <a:pPr algn="ctr"/>
+            <a:endParaRPr lang="de-DE" dirty="0"/>
+          </a:p>
+        </p:txBody>
+      </p:sp>
+      <p:sp>
+        <p:nvSpPr>
+          <p:cNvPr id="38" name="Diagonal liegende Ecken des Rechtecks schneiden 37">
+            <a:extLst>
+              <a:ext uri="{FF2B5EF4-FFF2-40B4-BE49-F238E27FC236}">
+                <a16:creationId xmlns:a16="http://schemas.microsoft.com/office/drawing/2014/main" id="{3C2B6A07-B76A-B702-9825-0CE04B65B597}"/>
+              </a:ext>
+            </a:extLst>
+          </p:cNvPr>
+          <p:cNvSpPr/>
+          <p:nvPr/>
+        </p:nvSpPr>
+        <p:spPr>
+          <a:xfrm>
+            <a:off x="9600499" y="2957512"/>
+            <a:ext cx="2480505" cy="589592"/>
+          </a:xfrm>
+          <a:prstGeom prst="snip2DiagRect">
+            <a:avLst/>
+          </a:prstGeom>
+          <a:solidFill>
+            <a:schemeClr val="accent6">
+              <a:lumMod val="75000"/>
+            </a:schemeClr>
+          </a:solidFill>
+          <a:ln>
+            <a:noFill/>
+          </a:ln>
+        </p:spPr>
+        <p:style>
+          <a:lnRef idx="2">
+            <a:schemeClr val="accent2">
+              <a:shade val="50000"/>
+            </a:schemeClr>
+          </a:lnRef>
+          <a:fillRef idx="1">
+            <a:schemeClr val="accent2"/>
+          </a:fillRef>
+          <a:effectRef idx="0">
+            <a:schemeClr val="accent2"/>
+          </a:effectRef>
+          <a:fontRef idx="minor">
+            <a:schemeClr val="lt1"/>
+          </a:fontRef>
+        </p:style>
+        <p:txBody>
+          <a:bodyPr rtlCol="0" anchor="ctr"/>
+          <a:lstStyle/>
+          <a:p>
+            <a:pPr algn="ctr"/>
+            <a:r>
+              <a:rPr lang="de-DE" sz="1200" dirty="0" err="1"/>
+              <a:t>complete</a:t>
+            </a:r>
+            <a:r>
+              <a:rPr lang="de-DE" sz="1200" dirty="0"/>
+              <a:t> </a:t>
+            </a:r>
+            <a:r>
+              <a:rPr lang="de-DE" sz="1200" dirty="0" err="1"/>
+              <a:t>process</a:t>
+            </a:r>
+            <a:endParaRPr lang="de-DE" sz="1200" dirty="0"/>
+          </a:p>
+          <a:p>
+            <a:pPr algn="ctr"/>
+            <a:r>
+              <a:rPr lang="de-DE" sz="1200" dirty="0" err="1"/>
+              <a:t>result</a:t>
+            </a:r>
+            <a:r>
+              <a:rPr lang="de-DE" sz="1200" dirty="0"/>
+              <a:t>: </a:t>
+            </a:r>
+            <a:r>
+              <a:rPr lang="de-DE" sz="1200" dirty="0" err="1"/>
+              <a:t>metadata</a:t>
+            </a:r>
+            <a:r>
+              <a:rPr lang="de-DE" sz="1200" dirty="0"/>
+              <a:t> </a:t>
+            </a:r>
+            <a:r>
+              <a:rPr lang="de-DE" sz="1200" dirty="0" err="1"/>
+              <a:t>scripts</a:t>
+            </a:r>
+            <a:r>
+              <a:rPr lang="de-DE" sz="1200" dirty="0"/>
+              <a:t>, </a:t>
+            </a:r>
+            <a:br>
+              <a:rPr lang="de-DE" sz="1200" dirty="0"/>
+            </a:br>
+            <a:r>
+              <a:rPr lang="de-DE" sz="1200" dirty="0" err="1"/>
+              <a:t>lookup</a:t>
+            </a:r>
+            <a:r>
+              <a:rPr lang="de-DE" sz="1200" dirty="0"/>
+              <a:t> </a:t>
+            </a:r>
+            <a:r>
+              <a:rPr lang="de-DE" sz="1200" dirty="0" err="1"/>
+              <a:t>tables</a:t>
+            </a:r>
+            <a:r>
+              <a:rPr lang="de-DE" sz="1200" dirty="0"/>
+              <a:t> </a:t>
+            </a:r>
+            <a:r>
+              <a:rPr lang="de-DE" sz="1200" dirty="0" err="1"/>
+              <a:t>for</a:t>
+            </a:r>
+            <a:r>
+              <a:rPr lang="de-DE" sz="1200" dirty="0"/>
+              <a:t> D</a:t>
+            </a:r>
+          </a:p>
+        </p:txBody>
+      </p:sp>
+      <p:sp>
+        <p:nvSpPr>
+          <p:cNvPr id="42" name="Diagonal liegende Ecken des Rechtecks schneiden 41">
+            <a:extLst>
+              <a:ext uri="{FF2B5EF4-FFF2-40B4-BE49-F238E27FC236}">
+                <a16:creationId xmlns:a16="http://schemas.microsoft.com/office/drawing/2014/main" id="{60F75EB8-1FD6-DB95-FC2C-7ED8F1278CC1}"/>
+              </a:ext>
+            </a:extLst>
+          </p:cNvPr>
+          <p:cNvSpPr/>
+          <p:nvPr/>
+        </p:nvSpPr>
+        <p:spPr>
+          <a:xfrm>
+            <a:off x="2998786" y="3821904"/>
+            <a:ext cx="1692277" cy="471488"/>
+          </a:xfrm>
+          <a:prstGeom prst="snip2DiagRect">
+            <a:avLst/>
+          </a:prstGeom>
+          <a:solidFill>
+            <a:schemeClr val="accent4"/>
+          </a:solidFill>
+          <a:ln>
+            <a:noFill/>
+          </a:ln>
+        </p:spPr>
+        <p:style>
+          <a:lnRef idx="2">
+            <a:schemeClr val="accent2">
+              <a:shade val="50000"/>
+            </a:schemeClr>
+          </a:lnRef>
+          <a:fillRef idx="1">
+            <a:schemeClr val="accent2"/>
+          </a:fillRef>
+          <a:effectRef idx="0">
+            <a:schemeClr val="accent2"/>
+          </a:effectRef>
+          <a:fontRef idx="minor">
+            <a:schemeClr val="lt1"/>
+          </a:fontRef>
+        </p:style>
+        <p:txBody>
+          <a:bodyPr rtlCol="0" anchor="ctr"/>
+          <a:lstStyle/>
+          <a:p>
+            <a:pPr algn="ctr"/>
+            <a:r>
+              <a:rPr lang="de-DE" sz="1200" dirty="0"/>
+              <a:t>find reliable </a:t>
+            </a:r>
+            <a:r>
+              <a:rPr lang="de-DE" sz="1200" dirty="0" err="1"/>
+              <a:t>metadata</a:t>
+            </a:r>
+            <a:r>
+              <a:rPr lang="de-DE" sz="1200" dirty="0"/>
+              <a:t> online</a:t>
+            </a:r>
           </a:p>
         </p:txBody>
       </p:sp>

</xml_diff>

<commit_message>
character gender, cleaning update
</commit_message>
<xml_diff>
--- a/pipe diagram.pptx
+++ b/pipe diagram.pptx
@@ -259,7 +259,7 @@
           <a:p>
             <a:fld id="{FDBA45A5-DBC2-D449-BA1E-D23E556848F0}" type="datetimeFigureOut">
               <a:rPr lang="de-DE" smtClean="0"/>
-              <a:t>22.05.22</a:t>
+              <a:t>23.05.22</a:t>
             </a:fld>
             <a:endParaRPr lang="de-DE"/>
           </a:p>
@@ -457,7 +457,7 @@
           <a:p>
             <a:fld id="{FDBA45A5-DBC2-D449-BA1E-D23E556848F0}" type="datetimeFigureOut">
               <a:rPr lang="de-DE" smtClean="0"/>
-              <a:t>22.05.22</a:t>
+              <a:t>23.05.22</a:t>
             </a:fld>
             <a:endParaRPr lang="de-DE"/>
           </a:p>
@@ -665,7 +665,7 @@
           <a:p>
             <a:fld id="{FDBA45A5-DBC2-D449-BA1E-D23E556848F0}" type="datetimeFigureOut">
               <a:rPr lang="de-DE" smtClean="0"/>
-              <a:t>22.05.22</a:t>
+              <a:t>23.05.22</a:t>
             </a:fld>
             <a:endParaRPr lang="de-DE"/>
           </a:p>
@@ -863,7 +863,7 @@
           <a:p>
             <a:fld id="{FDBA45A5-DBC2-D449-BA1E-D23E556848F0}" type="datetimeFigureOut">
               <a:rPr lang="de-DE" smtClean="0"/>
-              <a:t>22.05.22</a:t>
+              <a:t>23.05.22</a:t>
             </a:fld>
             <a:endParaRPr lang="de-DE"/>
           </a:p>
@@ -1138,7 +1138,7 @@
           <a:p>
             <a:fld id="{FDBA45A5-DBC2-D449-BA1E-D23E556848F0}" type="datetimeFigureOut">
               <a:rPr lang="de-DE" smtClean="0"/>
-              <a:t>22.05.22</a:t>
+              <a:t>23.05.22</a:t>
             </a:fld>
             <a:endParaRPr lang="de-DE"/>
           </a:p>
@@ -1403,7 +1403,7 @@
           <a:p>
             <a:fld id="{FDBA45A5-DBC2-D449-BA1E-D23E556848F0}" type="datetimeFigureOut">
               <a:rPr lang="de-DE" smtClean="0"/>
-              <a:t>22.05.22</a:t>
+              <a:t>23.05.22</a:t>
             </a:fld>
             <a:endParaRPr lang="de-DE"/>
           </a:p>
@@ -1815,7 +1815,7 @@
           <a:p>
             <a:fld id="{FDBA45A5-DBC2-D449-BA1E-D23E556848F0}" type="datetimeFigureOut">
               <a:rPr lang="de-DE" smtClean="0"/>
-              <a:t>22.05.22</a:t>
+              <a:t>23.05.22</a:t>
             </a:fld>
             <a:endParaRPr lang="de-DE"/>
           </a:p>
@@ -1956,7 +1956,7 @@
           <a:p>
             <a:fld id="{FDBA45A5-DBC2-D449-BA1E-D23E556848F0}" type="datetimeFigureOut">
               <a:rPr lang="de-DE" smtClean="0"/>
-              <a:t>22.05.22</a:t>
+              <a:t>23.05.22</a:t>
             </a:fld>
             <a:endParaRPr lang="de-DE"/>
           </a:p>
@@ -2069,7 +2069,7 @@
           <a:p>
             <a:fld id="{FDBA45A5-DBC2-D449-BA1E-D23E556848F0}" type="datetimeFigureOut">
               <a:rPr lang="de-DE" smtClean="0"/>
-              <a:t>22.05.22</a:t>
+              <a:t>23.05.22</a:t>
             </a:fld>
             <a:endParaRPr lang="de-DE"/>
           </a:p>
@@ -2380,7 +2380,7 @@
           <a:p>
             <a:fld id="{FDBA45A5-DBC2-D449-BA1E-D23E556848F0}" type="datetimeFigureOut">
               <a:rPr lang="de-DE" smtClean="0"/>
-              <a:t>22.05.22</a:t>
+              <a:t>23.05.22</a:t>
             </a:fld>
             <a:endParaRPr lang="de-DE"/>
           </a:p>
@@ -2668,7 +2668,7 @@
           <a:p>
             <a:fld id="{FDBA45A5-DBC2-D449-BA1E-D23E556848F0}" type="datetimeFigureOut">
               <a:rPr lang="de-DE" smtClean="0"/>
-              <a:t>22.05.22</a:t>
+              <a:t>23.05.22</a:t>
             </a:fld>
             <a:endParaRPr lang="de-DE"/>
           </a:p>
@@ -2909,7 +2909,7 @@
           <a:p>
             <a:fld id="{FDBA45A5-DBC2-D449-BA1E-D23E556848F0}" type="datetimeFigureOut">
               <a:rPr lang="de-DE" smtClean="0"/>
-              <a:t>22.05.22</a:t>
+              <a:t>23.05.22</a:t>
             </a:fld>
             <a:endParaRPr lang="de-DE"/>
           </a:p>
@@ -3646,7 +3646,7 @@
             <a:avLst/>
           </a:prstGeom>
           <a:solidFill>
-            <a:schemeClr val="accent4">
+            <a:schemeClr val="accent6">
               <a:lumMod val="75000"/>
             </a:schemeClr>
           </a:solidFill>
@@ -5187,7 +5187,7 @@
             <a:avLst/>
           </a:prstGeom>
           <a:solidFill>
-            <a:schemeClr val="accent4"/>
+            <a:schemeClr val="accent6"/>
           </a:solidFill>
           <a:ln>
             <a:noFill/>
@@ -5216,16 +5216,13 @@
             <a:pPr algn="ctr"/>
             <a:r>
               <a:rPr lang="de-DE" sz="1200" dirty="0"/>
-              <a:t>find reliable </a:t>
-            </a:r>
-            <a:r>
-              <a:rPr lang="de-DE" sz="1200" dirty="0" err="1"/>
-              <a:t>metadata</a:t>
-            </a:r>
-            <a:r>
-              <a:rPr lang="de-DE" sz="1200" dirty="0"/>
-              <a:t> online</a:t>
-            </a:r>
+              <a:t>Analyse </a:t>
+            </a:r>
+            <a:r>
+              <a:rPr lang="de-DE" sz="1200" dirty="0" err="1"/>
+              <a:t>dialogs</a:t>
+            </a:r>
+            <a:endParaRPr lang="de-DE" sz="1200" dirty="0"/>
           </a:p>
         </p:txBody>
       </p:sp>
@@ -5250,7 +5247,7 @@
             <a:avLst/>
           </a:prstGeom>
           <a:solidFill>
-            <a:schemeClr val="accent3">
+            <a:schemeClr val="accent4">
               <a:lumMod val="75000"/>
             </a:schemeClr>
           </a:solidFill>
@@ -5323,7 +5320,7 @@
             <a:avLst/>
           </a:prstGeom>
           <a:solidFill>
-            <a:schemeClr val="accent3"/>
+            <a:schemeClr val="accent4"/>
           </a:solidFill>
           <a:ln>
             <a:noFill/>
@@ -5427,7 +5424,7 @@
             <a:avLst/>
           </a:prstGeom>
           <a:solidFill>
-            <a:schemeClr val="accent3"/>
+            <a:schemeClr val="accent4"/>
           </a:solidFill>
           <a:ln>
             <a:noFill/>
@@ -5742,6 +5739,126 @@
           <a:p>
             <a:pPr algn="ctr"/>
             <a:endParaRPr lang="de-DE" dirty="0"/>
+          </a:p>
+        </p:txBody>
+      </p:sp>
+      <p:sp>
+        <p:nvSpPr>
+          <p:cNvPr id="39" name="Diagonal liegende Ecken des Rechtecks schneiden 38">
+            <a:extLst>
+              <a:ext uri="{FF2B5EF4-FFF2-40B4-BE49-F238E27FC236}">
+                <a16:creationId xmlns:a16="http://schemas.microsoft.com/office/drawing/2014/main" id="{0A0E2ACD-1F5A-F228-B595-2D1C2C0205A1}"/>
+              </a:ext>
+            </a:extLst>
+          </p:cNvPr>
+          <p:cNvSpPr/>
+          <p:nvPr/>
+        </p:nvSpPr>
+        <p:spPr>
+          <a:xfrm>
+            <a:off x="2998785" y="5247578"/>
+            <a:ext cx="1692277" cy="471488"/>
+          </a:xfrm>
+          <a:prstGeom prst="snip2DiagRect">
+            <a:avLst/>
+          </a:prstGeom>
+          <a:solidFill>
+            <a:schemeClr val="accent6"/>
+          </a:solidFill>
+          <a:ln>
+            <a:noFill/>
+          </a:ln>
+        </p:spPr>
+        <p:style>
+          <a:lnRef idx="2">
+            <a:schemeClr val="accent2">
+              <a:shade val="50000"/>
+            </a:schemeClr>
+          </a:lnRef>
+          <a:fillRef idx="1">
+            <a:schemeClr val="accent2"/>
+          </a:fillRef>
+          <a:effectRef idx="0">
+            <a:schemeClr val="accent2"/>
+          </a:effectRef>
+          <a:fontRef idx="minor">
+            <a:schemeClr val="lt1"/>
+          </a:fontRef>
+        </p:style>
+        <p:txBody>
+          <a:bodyPr rtlCol="0" anchor="ctr"/>
+          <a:lstStyle/>
+          <a:p>
+            <a:pPr algn="ctr"/>
+            <a:r>
+              <a:rPr lang="de-DE" sz="1200" dirty="0"/>
+              <a:t>Analyse </a:t>
+            </a:r>
+            <a:r>
+              <a:rPr lang="de-DE" sz="1200" dirty="0" err="1"/>
+              <a:t>lines</a:t>
+            </a:r>
+            <a:endParaRPr lang="de-DE" sz="1200" dirty="0"/>
+          </a:p>
+        </p:txBody>
+      </p:sp>
+      <p:sp>
+        <p:nvSpPr>
+          <p:cNvPr id="46" name="Diagonal liegende Ecken des Rechtecks schneiden 45">
+            <a:extLst>
+              <a:ext uri="{FF2B5EF4-FFF2-40B4-BE49-F238E27FC236}">
+                <a16:creationId xmlns:a16="http://schemas.microsoft.com/office/drawing/2014/main" id="{1E8F92CA-1D04-41B4-128A-85F12141F62A}"/>
+              </a:ext>
+            </a:extLst>
+          </p:cNvPr>
+          <p:cNvSpPr/>
+          <p:nvPr/>
+        </p:nvSpPr>
+        <p:spPr>
+          <a:xfrm>
+            <a:off x="2990553" y="5799736"/>
+            <a:ext cx="1692277" cy="471488"/>
+          </a:xfrm>
+          <a:prstGeom prst="snip2DiagRect">
+            <a:avLst/>
+          </a:prstGeom>
+          <a:solidFill>
+            <a:schemeClr val="accent6"/>
+          </a:solidFill>
+          <a:ln>
+            <a:noFill/>
+          </a:ln>
+        </p:spPr>
+        <p:style>
+          <a:lnRef idx="2">
+            <a:schemeClr val="accent2">
+              <a:shade val="50000"/>
+            </a:schemeClr>
+          </a:lnRef>
+          <a:fillRef idx="1">
+            <a:schemeClr val="accent2"/>
+          </a:fillRef>
+          <a:effectRef idx="0">
+            <a:schemeClr val="accent2"/>
+          </a:effectRef>
+          <a:fontRef idx="minor">
+            <a:schemeClr val="lt1"/>
+          </a:fontRef>
+        </p:style>
+        <p:txBody>
+          <a:bodyPr rtlCol="0" anchor="ctr"/>
+          <a:lstStyle/>
+          <a:p>
+            <a:pPr algn="ctr"/>
+            <a:r>
+              <a:rPr lang="de-DE" sz="1200" dirty="0"/>
+              <a:t>Analyse </a:t>
+            </a:r>
+            <a:r>
+              <a:rPr lang="de-DE" sz="1200" dirty="0" err="1"/>
+              <a:t>sociogram</a:t>
+            </a:r>
+            <a:endParaRPr lang="de-DE" sz="1200" dirty="0"/>
           </a:p>
         </p:txBody>
       </p:sp>

</xml_diff>

<commit_message>
Update - calculation script
</commit_message>
<xml_diff>
--- a/pipe diagram.pptx
+++ b/pipe diagram.pptx
@@ -4,6 +4,9 @@
   <p:sldMasterIdLst>
     <p:sldMasterId id="2147483648" r:id="rId1"/>
   </p:sldMasterIdLst>
+  <p:notesMasterIdLst>
+    <p:notesMasterId r:id="rId3"/>
+  </p:notesMasterIdLst>
   <p:sldIdLst>
     <p:sldId id="256" r:id="rId2"/>
   </p:sldIdLst>
@@ -112,6 +115,439 @@
 </p:presentation>
 </file>
 
+<file path=ppt/notesMasters/notesMaster1.xml><?xml version="1.0" encoding="utf-8"?>
+<p:notesMaster xmlns:a="http://schemas.openxmlformats.org/drawingml/2006/main" xmlns:r="http://schemas.openxmlformats.org/officeDocument/2006/relationships" xmlns:p="http://schemas.openxmlformats.org/presentationml/2006/main">
+  <p:cSld>
+    <p:bg>
+      <p:bgRef idx="1001">
+        <a:schemeClr val="bg1"/>
+      </p:bgRef>
+    </p:bg>
+    <p:spTree>
+      <p:nvGrpSpPr>
+        <p:cNvPr id="1" name=""/>
+        <p:cNvGrpSpPr/>
+        <p:nvPr/>
+      </p:nvGrpSpPr>
+      <p:grpSpPr>
+        <a:xfrm>
+          <a:off x="0" y="0"/>
+          <a:ext cx="0" cy="0"/>
+          <a:chOff x="0" y="0"/>
+          <a:chExt cx="0" cy="0"/>
+        </a:xfrm>
+      </p:grpSpPr>
+      <p:sp>
+        <p:nvSpPr>
+          <p:cNvPr id="2" name="Kopfzeilenplatzhalter 1"/>
+          <p:cNvSpPr>
+            <a:spLocks noGrp="1"/>
+          </p:cNvSpPr>
+          <p:nvPr>
+            <p:ph type="hdr" sz="quarter"/>
+          </p:nvPr>
+        </p:nvSpPr>
+        <p:spPr>
+          <a:xfrm>
+            <a:off x="0" y="0"/>
+            <a:ext cx="2971800" cy="458788"/>
+          </a:xfrm>
+          <a:prstGeom prst="rect">
+            <a:avLst/>
+          </a:prstGeom>
+        </p:spPr>
+        <p:txBody>
+          <a:bodyPr vert="horz" lIns="91440" tIns="45720" rIns="91440" bIns="45720" rtlCol="0"/>
+          <a:lstStyle>
+            <a:lvl1pPr algn="l">
+              <a:defRPr sz="1200"/>
+            </a:lvl1pPr>
+          </a:lstStyle>
+          <a:p>
+            <a:endParaRPr lang="de-DE"/>
+          </a:p>
+        </p:txBody>
+      </p:sp>
+      <p:sp>
+        <p:nvSpPr>
+          <p:cNvPr id="3" name="Datumsplatzhalter 2"/>
+          <p:cNvSpPr>
+            <a:spLocks noGrp="1"/>
+          </p:cNvSpPr>
+          <p:nvPr>
+            <p:ph type="dt" idx="1"/>
+          </p:nvPr>
+        </p:nvSpPr>
+        <p:spPr>
+          <a:xfrm>
+            <a:off x="3884613" y="0"/>
+            <a:ext cx="2971800" cy="458788"/>
+          </a:xfrm>
+          <a:prstGeom prst="rect">
+            <a:avLst/>
+          </a:prstGeom>
+        </p:spPr>
+        <p:txBody>
+          <a:bodyPr vert="horz" lIns="91440" tIns="45720" rIns="91440" bIns="45720" rtlCol="0"/>
+          <a:lstStyle>
+            <a:lvl1pPr algn="r">
+              <a:defRPr sz="1200"/>
+            </a:lvl1pPr>
+          </a:lstStyle>
+          <a:p>
+            <a:fld id="{7D0593B1-3C8D-294C-96E5-4CC6B1EB5D20}" type="datetimeFigureOut">
+              <a:rPr lang="de-DE" smtClean="0"/>
+              <a:t>30.05.22</a:t>
+            </a:fld>
+            <a:endParaRPr lang="de-DE"/>
+          </a:p>
+        </p:txBody>
+      </p:sp>
+      <p:sp>
+        <p:nvSpPr>
+          <p:cNvPr id="4" name="Folienbildplatzhalter 3"/>
+          <p:cNvSpPr>
+            <a:spLocks noGrp="1" noRot="1" noChangeAspect="1"/>
+          </p:cNvSpPr>
+          <p:nvPr>
+            <p:ph type="sldImg" idx="2"/>
+          </p:nvPr>
+        </p:nvSpPr>
+        <p:spPr>
+          <a:xfrm>
+            <a:off x="685800" y="1143000"/>
+            <a:ext cx="5486400" cy="3086100"/>
+          </a:xfrm>
+          <a:prstGeom prst="rect">
+            <a:avLst/>
+          </a:prstGeom>
+          <a:noFill/>
+          <a:ln w="12700">
+            <a:solidFill>
+              <a:prstClr val="black"/>
+            </a:solidFill>
+          </a:ln>
+        </p:spPr>
+        <p:txBody>
+          <a:bodyPr vert="horz" lIns="91440" tIns="45720" rIns="91440" bIns="45720" rtlCol="0" anchor="ctr"/>
+          <a:lstStyle/>
+          <a:p>
+            <a:endParaRPr lang="de-DE"/>
+          </a:p>
+        </p:txBody>
+      </p:sp>
+      <p:sp>
+        <p:nvSpPr>
+          <p:cNvPr id="5" name="Notizenplatzhalter 4"/>
+          <p:cNvSpPr>
+            <a:spLocks noGrp="1"/>
+          </p:cNvSpPr>
+          <p:nvPr>
+            <p:ph type="body" sz="quarter" idx="3"/>
+          </p:nvPr>
+        </p:nvSpPr>
+        <p:spPr>
+          <a:xfrm>
+            <a:off x="685800" y="4400550"/>
+            <a:ext cx="5486400" cy="3600450"/>
+          </a:xfrm>
+          <a:prstGeom prst="rect">
+            <a:avLst/>
+          </a:prstGeom>
+        </p:spPr>
+        <p:txBody>
+          <a:bodyPr vert="horz" lIns="91440" tIns="45720" rIns="91440" bIns="45720" rtlCol="0"/>
+          <a:lstStyle/>
+          <a:p>
+            <a:pPr lvl="0"/>
+            <a:r>
+              <a:rPr lang="de-DE"/>
+              <a:t>Mastertextformat bearbeiten</a:t>
+            </a:r>
+          </a:p>
+          <a:p>
+            <a:pPr lvl="1"/>
+            <a:r>
+              <a:rPr lang="de-DE"/>
+              <a:t>Zweite Ebene</a:t>
+            </a:r>
+          </a:p>
+          <a:p>
+            <a:pPr lvl="2"/>
+            <a:r>
+              <a:rPr lang="de-DE"/>
+              <a:t>Dritte Ebene</a:t>
+            </a:r>
+          </a:p>
+          <a:p>
+            <a:pPr lvl="3"/>
+            <a:r>
+              <a:rPr lang="de-DE"/>
+              <a:t>Vierte Ebene</a:t>
+            </a:r>
+          </a:p>
+          <a:p>
+            <a:pPr lvl="4"/>
+            <a:r>
+              <a:rPr lang="de-DE"/>
+              <a:t>Fünfte Ebene</a:t>
+            </a:r>
+          </a:p>
+        </p:txBody>
+      </p:sp>
+      <p:sp>
+        <p:nvSpPr>
+          <p:cNvPr id="6" name="Fußzeilenplatzhalter 5"/>
+          <p:cNvSpPr>
+            <a:spLocks noGrp="1"/>
+          </p:cNvSpPr>
+          <p:nvPr>
+            <p:ph type="ftr" sz="quarter" idx="4"/>
+          </p:nvPr>
+        </p:nvSpPr>
+        <p:spPr>
+          <a:xfrm>
+            <a:off x="0" y="8685213"/>
+            <a:ext cx="2971800" cy="458787"/>
+          </a:xfrm>
+          <a:prstGeom prst="rect">
+            <a:avLst/>
+          </a:prstGeom>
+        </p:spPr>
+        <p:txBody>
+          <a:bodyPr vert="horz" lIns="91440" tIns="45720" rIns="91440" bIns="45720" rtlCol="0" anchor="b"/>
+          <a:lstStyle>
+            <a:lvl1pPr algn="l">
+              <a:defRPr sz="1200"/>
+            </a:lvl1pPr>
+          </a:lstStyle>
+          <a:p>
+            <a:endParaRPr lang="de-DE"/>
+          </a:p>
+        </p:txBody>
+      </p:sp>
+      <p:sp>
+        <p:nvSpPr>
+          <p:cNvPr id="7" name="Foliennummernplatzhalter 6"/>
+          <p:cNvSpPr>
+            <a:spLocks noGrp="1"/>
+          </p:cNvSpPr>
+          <p:nvPr>
+            <p:ph type="sldNum" sz="quarter" idx="5"/>
+          </p:nvPr>
+        </p:nvSpPr>
+        <p:spPr>
+          <a:xfrm>
+            <a:off x="3884613" y="8685213"/>
+            <a:ext cx="2971800" cy="458787"/>
+          </a:xfrm>
+          <a:prstGeom prst="rect">
+            <a:avLst/>
+          </a:prstGeom>
+        </p:spPr>
+        <p:txBody>
+          <a:bodyPr vert="horz" lIns="91440" tIns="45720" rIns="91440" bIns="45720" rtlCol="0" anchor="b"/>
+          <a:lstStyle>
+            <a:lvl1pPr algn="r">
+              <a:defRPr sz="1200"/>
+            </a:lvl1pPr>
+          </a:lstStyle>
+          <a:p>
+            <a:fld id="{CB2B88B4-6255-3347-B4F5-83500CA1B2E2}" type="slidenum">
+              <a:rPr lang="de-DE" smtClean="0"/>
+              <a:t>‹Nr.›</a:t>
+            </a:fld>
+            <a:endParaRPr lang="de-DE"/>
+          </a:p>
+        </p:txBody>
+      </p:sp>
+    </p:spTree>
+    <p:extLst>
+      <p:ext uri="{BB962C8B-B14F-4D97-AF65-F5344CB8AC3E}">
+        <p14:creationId xmlns:p14="http://schemas.microsoft.com/office/powerpoint/2010/main" val="332280411"/>
+      </p:ext>
+    </p:extLst>
+  </p:cSld>
+  <p:clrMap bg1="lt1" tx1="dk1" bg2="lt2" tx2="dk2" accent1="accent1" accent2="accent2" accent3="accent3" accent4="accent4" accent5="accent5" accent6="accent6" hlink="hlink" folHlink="folHlink"/>
+  <p:notesStyle>
+    <a:lvl1pPr marL="0" algn="l" defTabSz="914400" rtl="0" eaLnBrk="1" latinLnBrk="0" hangingPunct="1">
+      <a:defRPr sz="1200" kern="1200">
+        <a:solidFill>
+          <a:schemeClr val="tx1"/>
+        </a:solidFill>
+        <a:latin typeface="+mn-lt"/>
+        <a:ea typeface="+mn-ea"/>
+        <a:cs typeface="+mn-cs"/>
+      </a:defRPr>
+    </a:lvl1pPr>
+    <a:lvl2pPr marL="457200" algn="l" defTabSz="914400" rtl="0" eaLnBrk="1" latinLnBrk="0" hangingPunct="1">
+      <a:defRPr sz="1200" kern="1200">
+        <a:solidFill>
+          <a:schemeClr val="tx1"/>
+        </a:solidFill>
+        <a:latin typeface="+mn-lt"/>
+        <a:ea typeface="+mn-ea"/>
+        <a:cs typeface="+mn-cs"/>
+      </a:defRPr>
+    </a:lvl2pPr>
+    <a:lvl3pPr marL="914400" algn="l" defTabSz="914400" rtl="0" eaLnBrk="1" latinLnBrk="0" hangingPunct="1">
+      <a:defRPr sz="1200" kern="1200">
+        <a:solidFill>
+          <a:schemeClr val="tx1"/>
+        </a:solidFill>
+        <a:latin typeface="+mn-lt"/>
+        <a:ea typeface="+mn-ea"/>
+        <a:cs typeface="+mn-cs"/>
+      </a:defRPr>
+    </a:lvl3pPr>
+    <a:lvl4pPr marL="1371600" algn="l" defTabSz="914400" rtl="0" eaLnBrk="1" latinLnBrk="0" hangingPunct="1">
+      <a:defRPr sz="1200" kern="1200">
+        <a:solidFill>
+          <a:schemeClr val="tx1"/>
+        </a:solidFill>
+        <a:latin typeface="+mn-lt"/>
+        <a:ea typeface="+mn-ea"/>
+        <a:cs typeface="+mn-cs"/>
+      </a:defRPr>
+    </a:lvl4pPr>
+    <a:lvl5pPr marL="1828800" algn="l" defTabSz="914400" rtl="0" eaLnBrk="1" latinLnBrk="0" hangingPunct="1">
+      <a:defRPr sz="1200" kern="1200">
+        <a:solidFill>
+          <a:schemeClr val="tx1"/>
+        </a:solidFill>
+        <a:latin typeface="+mn-lt"/>
+        <a:ea typeface="+mn-ea"/>
+        <a:cs typeface="+mn-cs"/>
+      </a:defRPr>
+    </a:lvl5pPr>
+    <a:lvl6pPr marL="2286000" algn="l" defTabSz="914400" rtl="0" eaLnBrk="1" latinLnBrk="0" hangingPunct="1">
+      <a:defRPr sz="1200" kern="1200">
+        <a:solidFill>
+          <a:schemeClr val="tx1"/>
+        </a:solidFill>
+        <a:latin typeface="+mn-lt"/>
+        <a:ea typeface="+mn-ea"/>
+        <a:cs typeface="+mn-cs"/>
+      </a:defRPr>
+    </a:lvl6pPr>
+    <a:lvl7pPr marL="2743200" algn="l" defTabSz="914400" rtl="0" eaLnBrk="1" latinLnBrk="0" hangingPunct="1">
+      <a:defRPr sz="1200" kern="1200">
+        <a:solidFill>
+          <a:schemeClr val="tx1"/>
+        </a:solidFill>
+        <a:latin typeface="+mn-lt"/>
+        <a:ea typeface="+mn-ea"/>
+        <a:cs typeface="+mn-cs"/>
+      </a:defRPr>
+    </a:lvl7pPr>
+    <a:lvl8pPr marL="3200400" algn="l" defTabSz="914400" rtl="0" eaLnBrk="1" latinLnBrk="0" hangingPunct="1">
+      <a:defRPr sz="1200" kern="1200">
+        <a:solidFill>
+          <a:schemeClr val="tx1"/>
+        </a:solidFill>
+        <a:latin typeface="+mn-lt"/>
+        <a:ea typeface="+mn-ea"/>
+        <a:cs typeface="+mn-cs"/>
+      </a:defRPr>
+    </a:lvl8pPr>
+    <a:lvl9pPr marL="3657600" algn="l" defTabSz="914400" rtl="0" eaLnBrk="1" latinLnBrk="0" hangingPunct="1">
+      <a:defRPr sz="1200" kern="1200">
+        <a:solidFill>
+          <a:schemeClr val="tx1"/>
+        </a:solidFill>
+        <a:latin typeface="+mn-lt"/>
+        <a:ea typeface="+mn-ea"/>
+        <a:cs typeface="+mn-cs"/>
+      </a:defRPr>
+    </a:lvl9pPr>
+  </p:notesStyle>
+</p:notesMaster>
+</file>
+
+<file path=ppt/notesSlides/notesSlide1.xml><?xml version="1.0" encoding="utf-8"?>
+<p:notes xmlns:a="http://schemas.openxmlformats.org/drawingml/2006/main" xmlns:r="http://schemas.openxmlformats.org/officeDocument/2006/relationships" xmlns:p="http://schemas.openxmlformats.org/presentationml/2006/main">
+  <p:cSld>
+    <p:spTree>
+      <p:nvGrpSpPr>
+        <p:cNvPr id="1" name=""/>
+        <p:cNvGrpSpPr/>
+        <p:nvPr/>
+      </p:nvGrpSpPr>
+      <p:grpSpPr>
+        <a:xfrm>
+          <a:off x="0" y="0"/>
+          <a:ext cx="0" cy="0"/>
+          <a:chOff x="0" y="0"/>
+          <a:chExt cx="0" cy="0"/>
+        </a:xfrm>
+      </p:grpSpPr>
+      <p:sp>
+        <p:nvSpPr>
+          <p:cNvPr id="2" name="Folienbildplatzhalter 1"/>
+          <p:cNvSpPr>
+            <a:spLocks noGrp="1" noRot="1" noChangeAspect="1"/>
+          </p:cNvSpPr>
+          <p:nvPr>
+            <p:ph type="sldImg"/>
+          </p:nvPr>
+        </p:nvSpPr>
+        <p:spPr/>
+      </p:sp>
+      <p:sp>
+        <p:nvSpPr>
+          <p:cNvPr id="3" name="Notizenplatzhalter 2"/>
+          <p:cNvSpPr>
+            <a:spLocks noGrp="1"/>
+          </p:cNvSpPr>
+          <p:nvPr>
+            <p:ph type="body" idx="1"/>
+          </p:nvPr>
+        </p:nvSpPr>
+        <p:spPr/>
+        <p:txBody>
+          <a:bodyPr/>
+          <a:lstStyle/>
+          <a:p>
+            <a:endParaRPr lang="de-DE" dirty="0"/>
+          </a:p>
+        </p:txBody>
+      </p:sp>
+      <p:sp>
+        <p:nvSpPr>
+          <p:cNvPr id="4" name="Foliennummernplatzhalter 3"/>
+          <p:cNvSpPr>
+            <a:spLocks noGrp="1"/>
+          </p:cNvSpPr>
+          <p:nvPr>
+            <p:ph type="sldNum" sz="quarter" idx="5"/>
+          </p:nvPr>
+        </p:nvSpPr>
+        <p:spPr/>
+        <p:txBody>
+          <a:bodyPr/>
+          <a:lstStyle/>
+          <a:p>
+            <a:fld id="{CB2B88B4-6255-3347-B4F5-83500CA1B2E2}" type="slidenum">
+              <a:rPr lang="de-DE" smtClean="0"/>
+              <a:t>1</a:t>
+            </a:fld>
+            <a:endParaRPr lang="de-DE"/>
+          </a:p>
+        </p:txBody>
+      </p:sp>
+    </p:spTree>
+    <p:extLst>
+      <p:ext uri="{BB962C8B-B14F-4D97-AF65-F5344CB8AC3E}">
+        <p14:creationId xmlns:p14="http://schemas.microsoft.com/office/powerpoint/2010/main" val="2927824992"/>
+      </p:ext>
+    </p:extLst>
+  </p:cSld>
+  <p:clrMapOvr>
+    <a:masterClrMapping/>
+  </p:clrMapOvr>
+</p:notes>
+</file>
+
 <file path=ppt/slideLayouts/slideLayout1.xml><?xml version="1.0" encoding="utf-8"?>
 <p:sldLayout xmlns:a="http://schemas.openxmlformats.org/drawingml/2006/main" xmlns:r="http://schemas.openxmlformats.org/officeDocument/2006/relationships" xmlns:p="http://schemas.openxmlformats.org/presentationml/2006/main" type="title" preserve="1">
   <p:cSld name="Titelfolie">
@@ -259,7 +695,7 @@
           <a:p>
             <a:fld id="{FDBA45A5-DBC2-D449-BA1E-D23E556848F0}" type="datetimeFigureOut">
               <a:rPr lang="de-DE" smtClean="0"/>
-              <a:t>23.05.22</a:t>
+              <a:t>30.05.22</a:t>
             </a:fld>
             <a:endParaRPr lang="de-DE"/>
           </a:p>
@@ -457,7 +893,7 @@
           <a:p>
             <a:fld id="{FDBA45A5-DBC2-D449-BA1E-D23E556848F0}" type="datetimeFigureOut">
               <a:rPr lang="de-DE" smtClean="0"/>
-              <a:t>23.05.22</a:t>
+              <a:t>30.05.22</a:t>
             </a:fld>
             <a:endParaRPr lang="de-DE"/>
           </a:p>
@@ -665,7 +1101,7 @@
           <a:p>
             <a:fld id="{FDBA45A5-DBC2-D449-BA1E-D23E556848F0}" type="datetimeFigureOut">
               <a:rPr lang="de-DE" smtClean="0"/>
-              <a:t>23.05.22</a:t>
+              <a:t>30.05.22</a:t>
             </a:fld>
             <a:endParaRPr lang="de-DE"/>
           </a:p>
@@ -863,7 +1299,7 @@
           <a:p>
             <a:fld id="{FDBA45A5-DBC2-D449-BA1E-D23E556848F0}" type="datetimeFigureOut">
               <a:rPr lang="de-DE" smtClean="0"/>
-              <a:t>23.05.22</a:t>
+              <a:t>30.05.22</a:t>
             </a:fld>
             <a:endParaRPr lang="de-DE"/>
           </a:p>
@@ -1138,7 +1574,7 @@
           <a:p>
             <a:fld id="{FDBA45A5-DBC2-D449-BA1E-D23E556848F0}" type="datetimeFigureOut">
               <a:rPr lang="de-DE" smtClean="0"/>
-              <a:t>23.05.22</a:t>
+              <a:t>30.05.22</a:t>
             </a:fld>
             <a:endParaRPr lang="de-DE"/>
           </a:p>
@@ -1403,7 +1839,7 @@
           <a:p>
             <a:fld id="{FDBA45A5-DBC2-D449-BA1E-D23E556848F0}" type="datetimeFigureOut">
               <a:rPr lang="de-DE" smtClean="0"/>
-              <a:t>23.05.22</a:t>
+              <a:t>30.05.22</a:t>
             </a:fld>
             <a:endParaRPr lang="de-DE"/>
           </a:p>
@@ -1815,7 +2251,7 @@
           <a:p>
             <a:fld id="{FDBA45A5-DBC2-D449-BA1E-D23E556848F0}" type="datetimeFigureOut">
               <a:rPr lang="de-DE" smtClean="0"/>
-              <a:t>23.05.22</a:t>
+              <a:t>30.05.22</a:t>
             </a:fld>
             <a:endParaRPr lang="de-DE"/>
           </a:p>
@@ -1956,7 +2392,7 @@
           <a:p>
             <a:fld id="{FDBA45A5-DBC2-D449-BA1E-D23E556848F0}" type="datetimeFigureOut">
               <a:rPr lang="de-DE" smtClean="0"/>
-              <a:t>23.05.22</a:t>
+              <a:t>30.05.22</a:t>
             </a:fld>
             <a:endParaRPr lang="de-DE"/>
           </a:p>
@@ -2069,7 +2505,7 @@
           <a:p>
             <a:fld id="{FDBA45A5-DBC2-D449-BA1E-D23E556848F0}" type="datetimeFigureOut">
               <a:rPr lang="de-DE" smtClean="0"/>
-              <a:t>23.05.22</a:t>
+              <a:t>30.05.22</a:t>
             </a:fld>
             <a:endParaRPr lang="de-DE"/>
           </a:p>
@@ -2380,7 +2816,7 @@
           <a:p>
             <a:fld id="{FDBA45A5-DBC2-D449-BA1E-D23E556848F0}" type="datetimeFigureOut">
               <a:rPr lang="de-DE" smtClean="0"/>
-              <a:t>23.05.22</a:t>
+              <a:t>30.05.22</a:t>
             </a:fld>
             <a:endParaRPr lang="de-DE"/>
           </a:p>
@@ -2668,7 +3104,7 @@
           <a:p>
             <a:fld id="{FDBA45A5-DBC2-D449-BA1E-D23E556848F0}" type="datetimeFigureOut">
               <a:rPr lang="de-DE" smtClean="0"/>
-              <a:t>23.05.22</a:t>
+              <a:t>30.05.22</a:t>
             </a:fld>
             <a:endParaRPr lang="de-DE"/>
           </a:p>
@@ -2909,7 +3345,7 @@
           <a:p>
             <a:fld id="{FDBA45A5-DBC2-D449-BA1E-D23E556848F0}" type="datetimeFigureOut">
               <a:rPr lang="de-DE" smtClean="0"/>
-              <a:t>23.05.22</a:t>
+              <a:t>30.05.22</a:t>
             </a:fld>
             <a:endParaRPr lang="de-DE"/>
           </a:p>
@@ -3512,8 +3948,8 @@
         </p:nvSpPr>
         <p:spPr>
           <a:xfrm>
-            <a:off x="962818" y="1243012"/>
-            <a:ext cx="1450486" cy="471488"/>
+            <a:off x="962818" y="1243011"/>
+            <a:ext cx="1450486" cy="568691"/>
           </a:xfrm>
           <a:prstGeom prst="roundRect">
             <a:avLst/>
@@ -5869,7 +6305,7 @@
             <a:pPr algn="ctr"/>
             <a:r>
               <a:rPr lang="de-DE" sz="1200" dirty="0" err="1"/>
-              <a:t>which</a:t>
+              <a:t>who</a:t>
             </a:r>
             <a:r>
               <a:rPr lang="de-DE" sz="1200" dirty="0"/>
@@ -6032,7 +6468,7 @@
           <p:nvPr/>
         </p:nvPicPr>
         <p:blipFill>
-          <a:blip r:embed="rId2"/>
+          <a:blip r:embed="rId3"/>
           <a:stretch>
             <a:fillRect/>
           </a:stretch>
@@ -6409,6 +6845,14 @@
             </a:r>
             <a:r>
               <a:rPr lang="de-DE" sz="1200" dirty="0"/>
+              <a:t>/</a:t>
+            </a:r>
+            <a:r>
+              <a:rPr lang="de-DE" sz="1200" dirty="0" err="1"/>
+              <a:t>role</a:t>
+            </a:r>
+            <a:r>
+              <a:rPr lang="de-DE" sz="1200" dirty="0"/>
               <a:t> </a:t>
             </a:r>
             <a:r>
@@ -6422,6 +6866,33 @@
             <a:r>
               <a:rPr lang="de-DE" sz="1200" dirty="0"/>
               <a:t>…</a:t>
+            </a:r>
+          </a:p>
+          <a:p>
+            <a:pPr algn="ctr"/>
+            <a:r>
+              <a:rPr lang="de-DE" sz="1200" dirty="0" err="1"/>
+              <a:t>calculation</a:t>
+            </a:r>
+            <a:r>
+              <a:rPr lang="de-DE" sz="1200" dirty="0"/>
+              <a:t> </a:t>
+            </a:r>
+            <a:r>
+              <a:rPr lang="de-DE" sz="1200" dirty="0" err="1"/>
+              <a:t>scripts</a:t>
+            </a:r>
+            <a:r>
+              <a:rPr lang="de-DE" sz="1200" dirty="0"/>
+              <a:t> (</a:t>
+            </a:r>
+            <a:r>
+              <a:rPr lang="de-DE" sz="1200" dirty="0" err="1"/>
+              <a:t>hypothesis</a:t>
+            </a:r>
+            <a:r>
+              <a:rPr lang="de-DE" sz="1200" dirty="0"/>
+              <a:t>)</a:t>
             </a:r>
           </a:p>
           <a:p>
@@ -6495,10 +6966,10 @@
       </p:sp>
       <p:sp>
         <p:nvSpPr>
-          <p:cNvPr id="55" name="Rechteck 54">
-            <a:extLst>
-              <a:ext uri="{FF2B5EF4-FFF2-40B4-BE49-F238E27FC236}">
-                <a16:creationId xmlns:a16="http://schemas.microsoft.com/office/drawing/2014/main" id="{8AEA4F45-DD70-EB6C-3026-C59300AE679C}"/>
+          <p:cNvPr id="56" name="Rechteck 55">
+            <a:extLst>
+              <a:ext uri="{FF2B5EF4-FFF2-40B4-BE49-F238E27FC236}">
+                <a16:creationId xmlns:a16="http://schemas.microsoft.com/office/drawing/2014/main" id="{051CB0BD-FA06-6312-480C-5686DB8B86F1}"/>
               </a:ext>
             </a:extLst>
           </p:cNvPr>
@@ -6507,63 +6978,8 @@
         </p:nvSpPr>
         <p:spPr>
           <a:xfrm>
-            <a:off x="9438011" y="4674389"/>
-            <a:ext cx="84626" cy="471488"/>
-          </a:xfrm>
-          <a:prstGeom prst="rect">
-            <a:avLst/>
-          </a:prstGeom>
-          <a:solidFill>
-            <a:schemeClr val="tx1">
-              <a:lumMod val="75000"/>
-              <a:lumOff val="25000"/>
-            </a:schemeClr>
-          </a:solidFill>
-          <a:ln>
-            <a:noFill/>
-          </a:ln>
-        </p:spPr>
-        <p:style>
-          <a:lnRef idx="2">
-            <a:schemeClr val="accent1">
-              <a:shade val="50000"/>
-            </a:schemeClr>
-          </a:lnRef>
-          <a:fillRef idx="1">
-            <a:schemeClr val="accent1"/>
-          </a:fillRef>
-          <a:effectRef idx="0">
-            <a:schemeClr val="accent1"/>
-          </a:effectRef>
-          <a:fontRef idx="minor">
-            <a:schemeClr val="lt1"/>
-          </a:fontRef>
-        </p:style>
-        <p:txBody>
-          <a:bodyPr rtlCol="0" anchor="ctr"/>
-          <a:lstStyle/>
-          <a:p>
-            <a:pPr algn="ctr"/>
-            <a:endParaRPr lang="de-DE" dirty="0"/>
-          </a:p>
-        </p:txBody>
-      </p:sp>
-      <p:sp>
-        <p:nvSpPr>
-          <p:cNvPr id="56" name="Rechteck 55">
-            <a:extLst>
-              <a:ext uri="{FF2B5EF4-FFF2-40B4-BE49-F238E27FC236}">
-                <a16:creationId xmlns:a16="http://schemas.microsoft.com/office/drawing/2014/main" id="{051CB0BD-FA06-6312-480C-5686DB8B86F1}"/>
-              </a:ext>
-            </a:extLst>
-          </p:cNvPr>
-          <p:cNvSpPr/>
-          <p:nvPr/>
-        </p:nvSpPr>
-        <p:spPr>
-          <a:xfrm>
             <a:off x="9271237" y="4674389"/>
-            <a:ext cx="84626" cy="471488"/>
+            <a:ext cx="74430" cy="1617866"/>
           </a:xfrm>
           <a:prstGeom prst="rect">
             <a:avLst/>
@@ -6661,10 +7077,10 @@
       </p:sp>
       <p:sp>
         <p:nvSpPr>
-          <p:cNvPr id="58" name="Rechteck 57">
-            <a:extLst>
-              <a:ext uri="{FF2B5EF4-FFF2-40B4-BE49-F238E27FC236}">
-                <a16:creationId xmlns:a16="http://schemas.microsoft.com/office/drawing/2014/main" id="{B5315DC1-BDE3-ACEE-3AFE-2CAF5244E7F7}"/>
+          <p:cNvPr id="3" name="Pfeil nach rechts 2">
+            <a:extLst>
+              <a:ext uri="{FF2B5EF4-FFF2-40B4-BE49-F238E27FC236}">
+                <a16:creationId xmlns:a16="http://schemas.microsoft.com/office/drawing/2014/main" id="{6A282F36-0A68-EC08-E1BE-F24D7BBFD6A3}"/>
               </a:ext>
             </a:extLst>
           </p:cNvPr>
@@ -6672,22 +7088,19 @@
           <p:nvPr/>
         </p:nvSpPr>
         <p:spPr>
-          <a:xfrm>
-            <a:off x="9436979" y="5261168"/>
-            <a:ext cx="84626" cy="471488"/>
-          </a:xfrm>
-          <a:prstGeom prst="rect">
+          <a:xfrm flipV="1">
+            <a:off x="2413304" y="1463610"/>
+            <a:ext cx="370713" cy="45719"/>
+          </a:xfrm>
+          <a:prstGeom prst="rightArrow">
             <a:avLst/>
           </a:prstGeom>
           <a:solidFill>
-            <a:schemeClr val="tx1">
+            <a:schemeClr val="accent1">
               <a:lumMod val="75000"/>
-              <a:lumOff val="25000"/>
-            </a:schemeClr>
-          </a:solidFill>
-          <a:ln>
-            <a:noFill/>
-          </a:ln>
+            </a:schemeClr>
+          </a:solidFill>
+          <a:ln w="12700"/>
         </p:spPr>
         <p:style>
           <a:lnRef idx="2">
@@ -6710,16 +7123,16 @@
           <a:lstStyle/>
           <a:p>
             <a:pPr algn="ctr"/>
-            <a:endParaRPr lang="de-DE" dirty="0"/>
-          </a:p>
-        </p:txBody>
-      </p:sp>
-      <p:sp>
-        <p:nvSpPr>
-          <p:cNvPr id="59" name="Rechteck 58">
-            <a:extLst>
-              <a:ext uri="{FF2B5EF4-FFF2-40B4-BE49-F238E27FC236}">
-                <a16:creationId xmlns:a16="http://schemas.microsoft.com/office/drawing/2014/main" id="{D38D3C33-0909-14AE-1C31-ACF82079E48B}"/>
+            <a:endParaRPr lang="de-DE"/>
+          </a:p>
+        </p:txBody>
+      </p:sp>
+      <p:sp>
+        <p:nvSpPr>
+          <p:cNvPr id="64" name="Pfeil nach rechts 63">
+            <a:extLst>
+              <a:ext uri="{FF2B5EF4-FFF2-40B4-BE49-F238E27FC236}">
+                <a16:creationId xmlns:a16="http://schemas.microsoft.com/office/drawing/2014/main" id="{A0EC10F6-9826-2CA2-0739-1F69DEF68FE5}"/>
               </a:ext>
             </a:extLst>
           </p:cNvPr>
@@ -6727,21 +7140,20 @@
           <p:nvPr/>
         </p:nvSpPr>
         <p:spPr>
-          <a:xfrm>
-            <a:off x="9270205" y="5261168"/>
-            <a:ext cx="84626" cy="471488"/>
-          </a:xfrm>
-          <a:prstGeom prst="rect">
+          <a:xfrm flipV="1">
+            <a:off x="4902892" y="1463610"/>
+            <a:ext cx="451412" cy="45719"/>
+          </a:xfrm>
+          <a:prstGeom prst="rightArrow">
             <a:avLst/>
           </a:prstGeom>
           <a:solidFill>
-            <a:schemeClr val="tx1">
-              <a:lumMod val="75000"/>
-              <a:lumOff val="25000"/>
-            </a:schemeClr>
-          </a:solidFill>
-          <a:ln>
-            <a:noFill/>
+            <a:schemeClr val="accent1"/>
+          </a:solidFill>
+          <a:ln w="12700">
+            <a:solidFill>
+              <a:schemeClr val="accent1"/>
+            </a:solidFill>
           </a:ln>
         </p:spPr>
         <p:style>
@@ -6765,16 +7177,16 @@
           <a:lstStyle/>
           <a:p>
             <a:pPr algn="ctr"/>
-            <a:endParaRPr lang="de-DE" dirty="0"/>
-          </a:p>
-        </p:txBody>
-      </p:sp>
-      <p:sp>
-        <p:nvSpPr>
-          <p:cNvPr id="60" name="Rechteck 59">
-            <a:extLst>
-              <a:ext uri="{FF2B5EF4-FFF2-40B4-BE49-F238E27FC236}">
-                <a16:creationId xmlns:a16="http://schemas.microsoft.com/office/drawing/2014/main" id="{7C8C0E03-AC8D-649C-44AE-6FE6839AACB8}"/>
+            <a:endParaRPr lang="de-DE"/>
+          </a:p>
+        </p:txBody>
+      </p:sp>
+      <p:sp>
+        <p:nvSpPr>
+          <p:cNvPr id="65" name="Pfeil nach rechts 64">
+            <a:extLst>
+              <a:ext uri="{FF2B5EF4-FFF2-40B4-BE49-F238E27FC236}">
+                <a16:creationId xmlns:a16="http://schemas.microsoft.com/office/drawing/2014/main" id="{4214EE41-E143-F17E-4FF7-215CD5388FE0}"/>
               </a:ext>
             </a:extLst>
           </p:cNvPr>
@@ -6782,21 +7194,20 @@
           <p:nvPr/>
         </p:nvSpPr>
         <p:spPr>
-          <a:xfrm>
-            <a:off x="9448782" y="5820767"/>
-            <a:ext cx="84626" cy="471488"/>
-          </a:xfrm>
-          <a:prstGeom prst="rect">
+          <a:xfrm flipV="1">
+            <a:off x="7561594" y="1457271"/>
+            <a:ext cx="370713" cy="51488"/>
+          </a:xfrm>
+          <a:prstGeom prst="rightArrow">
             <a:avLst/>
           </a:prstGeom>
           <a:solidFill>
-            <a:schemeClr val="tx1">
-              <a:lumMod val="75000"/>
-              <a:lumOff val="25000"/>
-            </a:schemeClr>
-          </a:solidFill>
-          <a:ln>
-            <a:noFill/>
+            <a:schemeClr val="accent1"/>
+          </a:solidFill>
+          <a:ln w="12700">
+            <a:solidFill>
+              <a:schemeClr val="accent1"/>
+            </a:solidFill>
           </a:ln>
         </p:spPr>
         <p:style>
@@ -6820,16 +7231,16 @@
           <a:lstStyle/>
           <a:p>
             <a:pPr algn="ctr"/>
-            <a:endParaRPr lang="de-DE" dirty="0"/>
-          </a:p>
-        </p:txBody>
-      </p:sp>
-      <p:sp>
-        <p:nvSpPr>
-          <p:cNvPr id="61" name="Rechteck 60">
-            <a:extLst>
-              <a:ext uri="{FF2B5EF4-FFF2-40B4-BE49-F238E27FC236}">
-                <a16:creationId xmlns:a16="http://schemas.microsoft.com/office/drawing/2014/main" id="{0D098DD8-0214-9274-4E30-31F75DAFE992}"/>
+            <a:endParaRPr lang="de-DE"/>
+          </a:p>
+        </p:txBody>
+      </p:sp>
+      <p:sp>
+        <p:nvSpPr>
+          <p:cNvPr id="66" name="Pfeil nach rechts 65">
+            <a:extLst>
+              <a:ext uri="{FF2B5EF4-FFF2-40B4-BE49-F238E27FC236}">
+                <a16:creationId xmlns:a16="http://schemas.microsoft.com/office/drawing/2014/main" id="{1C4AB421-BE96-2B9F-270F-06991502F8A0}"/>
               </a:ext>
             </a:extLst>
           </p:cNvPr>
@@ -6837,21 +7248,20 @@
           <p:nvPr/>
         </p:nvSpPr>
         <p:spPr>
-          <a:xfrm>
-            <a:off x="9282008" y="5820767"/>
-            <a:ext cx="84626" cy="471488"/>
-          </a:xfrm>
-          <a:prstGeom prst="rect">
+          <a:xfrm flipV="1">
+            <a:off x="9949695" y="1463040"/>
+            <a:ext cx="463609" cy="45719"/>
+          </a:xfrm>
+          <a:prstGeom prst="rightArrow">
             <a:avLst/>
           </a:prstGeom>
           <a:solidFill>
-            <a:schemeClr val="tx1">
-              <a:lumMod val="75000"/>
-              <a:lumOff val="25000"/>
-            </a:schemeClr>
-          </a:solidFill>
-          <a:ln>
-            <a:noFill/>
+            <a:schemeClr val="accent1"/>
+          </a:solidFill>
+          <a:ln w="25400">
+            <a:solidFill>
+              <a:schemeClr val="accent1"/>
+            </a:solidFill>
           </a:ln>
         </p:spPr>
         <p:style>
@@ -6875,7 +7285,3193 @@
           <a:lstStyle/>
           <a:p>
             <a:pPr algn="ctr"/>
+            <a:endParaRPr lang="de-DE"/>
+          </a:p>
+        </p:txBody>
+      </p:sp>
+      <p:sp>
+        <p:nvSpPr>
+          <p:cNvPr id="67" name="Pfeil nach rechts 66">
+            <a:extLst>
+              <a:ext uri="{FF2B5EF4-FFF2-40B4-BE49-F238E27FC236}">
+                <a16:creationId xmlns:a16="http://schemas.microsoft.com/office/drawing/2014/main" id="{D2406304-A996-0614-615D-FE1511903CB1}"/>
+              </a:ext>
+            </a:extLst>
+          </p:cNvPr>
+          <p:cNvSpPr/>
+          <p:nvPr/>
+        </p:nvSpPr>
+        <p:spPr>
+          <a:xfrm flipV="1">
+            <a:off x="2701800" y="2319099"/>
+            <a:ext cx="147176" cy="45719"/>
+          </a:xfrm>
+          <a:prstGeom prst="rightArrow">
+            <a:avLst/>
+          </a:prstGeom>
+          <a:solidFill>
+            <a:schemeClr val="accent2">
+              <a:lumMod val="75000"/>
+            </a:schemeClr>
+          </a:solidFill>
+          <a:ln w="12700">
+            <a:solidFill>
+              <a:schemeClr val="accent2">
+                <a:lumMod val="75000"/>
+              </a:schemeClr>
+            </a:solidFill>
+          </a:ln>
+        </p:spPr>
+        <p:style>
+          <a:lnRef idx="2">
+            <a:schemeClr val="accent1">
+              <a:shade val="50000"/>
+            </a:schemeClr>
+          </a:lnRef>
+          <a:fillRef idx="1">
+            <a:schemeClr val="accent1"/>
+          </a:fillRef>
+          <a:effectRef idx="0">
+            <a:schemeClr val="accent1"/>
+          </a:effectRef>
+          <a:fontRef idx="minor">
+            <a:schemeClr val="lt1"/>
+          </a:fontRef>
+        </p:style>
+        <p:txBody>
+          <a:bodyPr rtlCol="0" anchor="ctr"/>
+          <a:lstStyle/>
+          <a:p>
+            <a:pPr algn="ctr"/>
+            <a:endParaRPr lang="de-DE"/>
+          </a:p>
+        </p:txBody>
+      </p:sp>
+      <p:sp>
+        <p:nvSpPr>
+          <p:cNvPr id="68" name="Pfeil nach rechts 67">
+            <a:extLst>
+              <a:ext uri="{FF2B5EF4-FFF2-40B4-BE49-F238E27FC236}">
+                <a16:creationId xmlns:a16="http://schemas.microsoft.com/office/drawing/2014/main" id="{082C9522-FF17-B70E-8F02-F08AF0BEDE9C}"/>
+              </a:ext>
+            </a:extLst>
+          </p:cNvPr>
+          <p:cNvSpPr/>
+          <p:nvPr/>
+        </p:nvSpPr>
+        <p:spPr>
+          <a:xfrm flipV="1">
+            <a:off x="4218383" y="2316690"/>
+            <a:ext cx="147176" cy="45719"/>
+          </a:xfrm>
+          <a:prstGeom prst="rightArrow">
+            <a:avLst/>
+          </a:prstGeom>
+          <a:solidFill>
+            <a:schemeClr val="accent2"/>
+          </a:solidFill>
+          <a:ln w="12700">
+            <a:solidFill>
+              <a:schemeClr val="accent2"/>
+            </a:solidFill>
+          </a:ln>
+        </p:spPr>
+        <p:style>
+          <a:lnRef idx="2">
+            <a:schemeClr val="accent1">
+              <a:shade val="50000"/>
+            </a:schemeClr>
+          </a:lnRef>
+          <a:fillRef idx="1">
+            <a:schemeClr val="accent1"/>
+          </a:fillRef>
+          <a:effectRef idx="0">
+            <a:schemeClr val="accent1"/>
+          </a:effectRef>
+          <a:fontRef idx="minor">
+            <a:schemeClr val="lt1"/>
+          </a:fontRef>
+        </p:style>
+        <p:txBody>
+          <a:bodyPr rtlCol="0" anchor="ctr"/>
+          <a:lstStyle/>
+          <a:p>
+            <a:pPr algn="ctr"/>
+            <a:endParaRPr lang="de-DE"/>
+          </a:p>
+        </p:txBody>
+      </p:sp>
+      <p:sp>
+        <p:nvSpPr>
+          <p:cNvPr id="69" name="Pfeil nach rechts 68">
+            <a:extLst>
+              <a:ext uri="{FF2B5EF4-FFF2-40B4-BE49-F238E27FC236}">
+                <a16:creationId xmlns:a16="http://schemas.microsoft.com/office/drawing/2014/main" id="{36A69E8A-5192-0A24-A43D-6BE4D040DE8F}"/>
+              </a:ext>
+            </a:extLst>
+          </p:cNvPr>
+          <p:cNvSpPr/>
+          <p:nvPr/>
+        </p:nvSpPr>
+        <p:spPr>
+          <a:xfrm flipV="1">
+            <a:off x="6112121" y="2316690"/>
+            <a:ext cx="147176" cy="45719"/>
+          </a:xfrm>
+          <a:prstGeom prst="rightArrow">
+            <a:avLst/>
+          </a:prstGeom>
+          <a:solidFill>
+            <a:schemeClr val="accent2"/>
+          </a:solidFill>
+          <a:ln w="12700">
+            <a:solidFill>
+              <a:schemeClr val="accent2"/>
+            </a:solidFill>
+          </a:ln>
+        </p:spPr>
+        <p:style>
+          <a:lnRef idx="2">
+            <a:schemeClr val="accent1">
+              <a:shade val="50000"/>
+            </a:schemeClr>
+          </a:lnRef>
+          <a:fillRef idx="1">
+            <a:schemeClr val="accent1"/>
+          </a:fillRef>
+          <a:effectRef idx="0">
+            <a:schemeClr val="accent1"/>
+          </a:effectRef>
+          <a:fontRef idx="minor">
+            <a:schemeClr val="lt1"/>
+          </a:fontRef>
+        </p:style>
+        <p:txBody>
+          <a:bodyPr rtlCol="0" anchor="ctr"/>
+          <a:lstStyle/>
+          <a:p>
+            <a:pPr algn="ctr"/>
+            <a:endParaRPr lang="de-DE"/>
+          </a:p>
+        </p:txBody>
+      </p:sp>
+      <p:sp>
+        <p:nvSpPr>
+          <p:cNvPr id="70" name="Pfeil nach rechts 69">
+            <a:extLst>
+              <a:ext uri="{FF2B5EF4-FFF2-40B4-BE49-F238E27FC236}">
+                <a16:creationId xmlns:a16="http://schemas.microsoft.com/office/drawing/2014/main" id="{9EABFDEE-59D1-7E42-5B5E-63940D2607CE}"/>
+              </a:ext>
+            </a:extLst>
+          </p:cNvPr>
+          <p:cNvSpPr/>
+          <p:nvPr/>
+        </p:nvSpPr>
+        <p:spPr>
+          <a:xfrm flipV="1">
+            <a:off x="8361980" y="2326244"/>
+            <a:ext cx="147176" cy="45719"/>
+          </a:xfrm>
+          <a:prstGeom prst="rightArrow">
+            <a:avLst/>
+          </a:prstGeom>
+          <a:solidFill>
+            <a:schemeClr val="accent2"/>
+          </a:solidFill>
+          <a:ln w="12700">
+            <a:solidFill>
+              <a:schemeClr val="accent2"/>
+            </a:solidFill>
+          </a:ln>
+        </p:spPr>
+        <p:style>
+          <a:lnRef idx="2">
+            <a:schemeClr val="accent1">
+              <a:shade val="50000"/>
+            </a:schemeClr>
+          </a:lnRef>
+          <a:fillRef idx="1">
+            <a:schemeClr val="accent1"/>
+          </a:fillRef>
+          <a:effectRef idx="0">
+            <a:schemeClr val="accent1"/>
+          </a:effectRef>
+          <a:fontRef idx="minor">
+            <a:schemeClr val="lt1"/>
+          </a:fontRef>
+        </p:style>
+        <p:txBody>
+          <a:bodyPr rtlCol="0" anchor="ctr"/>
+          <a:lstStyle/>
+          <a:p>
+            <a:pPr algn="ctr"/>
+            <a:endParaRPr lang="de-DE"/>
+          </a:p>
+        </p:txBody>
+      </p:sp>
+      <p:sp>
+        <p:nvSpPr>
+          <p:cNvPr id="71" name="Pfeil nach rechts 70">
+            <a:extLst>
+              <a:ext uri="{FF2B5EF4-FFF2-40B4-BE49-F238E27FC236}">
+                <a16:creationId xmlns:a16="http://schemas.microsoft.com/office/drawing/2014/main" id="{53D57FCE-402D-B601-7FF9-74083C79ADC8}"/>
+              </a:ext>
+            </a:extLst>
+          </p:cNvPr>
+          <p:cNvSpPr/>
+          <p:nvPr/>
+        </p:nvSpPr>
+        <p:spPr>
+          <a:xfrm flipV="1">
+            <a:off x="9665780" y="2312225"/>
+            <a:ext cx="147176" cy="45719"/>
+          </a:xfrm>
+          <a:prstGeom prst="rightArrow">
+            <a:avLst/>
+          </a:prstGeom>
+          <a:solidFill>
+            <a:schemeClr val="accent2"/>
+          </a:solidFill>
+          <a:ln w="12700">
+            <a:solidFill>
+              <a:schemeClr val="accent2"/>
+            </a:solidFill>
+          </a:ln>
+        </p:spPr>
+        <p:style>
+          <a:lnRef idx="2">
+            <a:schemeClr val="accent1">
+              <a:shade val="50000"/>
+            </a:schemeClr>
+          </a:lnRef>
+          <a:fillRef idx="1">
+            <a:schemeClr val="accent1"/>
+          </a:fillRef>
+          <a:effectRef idx="0">
+            <a:schemeClr val="accent1"/>
+          </a:effectRef>
+          <a:fontRef idx="minor">
+            <a:schemeClr val="lt1"/>
+          </a:fontRef>
+        </p:style>
+        <p:txBody>
+          <a:bodyPr rtlCol="0" anchor="ctr"/>
+          <a:lstStyle/>
+          <a:p>
+            <a:pPr algn="ctr"/>
+            <a:endParaRPr lang="de-DE"/>
+          </a:p>
+        </p:txBody>
+      </p:sp>
+      <p:sp>
+        <p:nvSpPr>
+          <p:cNvPr id="72" name="Pfeil nach rechts 71">
+            <a:extLst>
+              <a:ext uri="{FF2B5EF4-FFF2-40B4-BE49-F238E27FC236}">
+                <a16:creationId xmlns:a16="http://schemas.microsoft.com/office/drawing/2014/main" id="{434C70AF-A77B-0CC9-8CC1-0FFA1303E81E}"/>
+              </a:ext>
+            </a:extLst>
+          </p:cNvPr>
+          <p:cNvSpPr/>
+          <p:nvPr/>
+        </p:nvSpPr>
+        <p:spPr>
+          <a:xfrm flipV="1">
+            <a:off x="10048082" y="2312225"/>
+            <a:ext cx="147176" cy="45719"/>
+          </a:xfrm>
+          <a:prstGeom prst="rightArrow">
+            <a:avLst/>
+          </a:prstGeom>
+          <a:solidFill>
+            <a:schemeClr val="tx1">
+              <a:lumMod val="75000"/>
+              <a:lumOff val="25000"/>
+            </a:schemeClr>
+          </a:solidFill>
+          <a:ln w="12700">
+            <a:solidFill>
+              <a:schemeClr val="tx1">
+                <a:lumMod val="75000"/>
+                <a:lumOff val="25000"/>
+              </a:schemeClr>
+            </a:solidFill>
+          </a:ln>
+        </p:spPr>
+        <p:style>
+          <a:lnRef idx="2">
+            <a:schemeClr val="accent1">
+              <a:shade val="50000"/>
+            </a:schemeClr>
+          </a:lnRef>
+          <a:fillRef idx="1">
+            <a:schemeClr val="accent1"/>
+          </a:fillRef>
+          <a:effectRef idx="0">
+            <a:schemeClr val="accent1"/>
+          </a:effectRef>
+          <a:fontRef idx="minor">
+            <a:schemeClr val="lt1"/>
+          </a:fontRef>
+        </p:style>
+        <p:txBody>
+          <a:bodyPr rtlCol="0" anchor="ctr"/>
+          <a:lstStyle/>
+          <a:p>
+            <a:pPr algn="ctr"/>
+            <a:endParaRPr lang="de-DE"/>
+          </a:p>
+        </p:txBody>
+      </p:sp>
+      <p:sp>
+        <p:nvSpPr>
+          <p:cNvPr id="79" name="Pfeil nach rechts 78">
+            <a:extLst>
+              <a:ext uri="{FF2B5EF4-FFF2-40B4-BE49-F238E27FC236}">
+                <a16:creationId xmlns:a16="http://schemas.microsoft.com/office/drawing/2014/main" id="{922A391C-A275-458C-4CF3-4FAA295A5DED}"/>
+              </a:ext>
+            </a:extLst>
+          </p:cNvPr>
+          <p:cNvSpPr/>
+          <p:nvPr/>
+        </p:nvSpPr>
+        <p:spPr>
+          <a:xfrm flipV="1">
+            <a:off x="9866527" y="2313551"/>
+            <a:ext cx="147176" cy="45719"/>
+          </a:xfrm>
+          <a:prstGeom prst="rightArrow">
+            <a:avLst/>
+          </a:prstGeom>
+          <a:solidFill>
+            <a:schemeClr val="tx1">
+              <a:lumMod val="75000"/>
+              <a:lumOff val="25000"/>
+            </a:schemeClr>
+          </a:solidFill>
+          <a:ln w="12700">
+            <a:solidFill>
+              <a:schemeClr val="tx1">
+                <a:lumMod val="75000"/>
+                <a:lumOff val="25000"/>
+              </a:schemeClr>
+            </a:solidFill>
+          </a:ln>
+        </p:spPr>
+        <p:style>
+          <a:lnRef idx="2">
+            <a:schemeClr val="accent1">
+              <a:shade val="50000"/>
+            </a:schemeClr>
+          </a:lnRef>
+          <a:fillRef idx="1">
+            <a:schemeClr val="accent1"/>
+          </a:fillRef>
+          <a:effectRef idx="0">
+            <a:schemeClr val="accent1"/>
+          </a:effectRef>
+          <a:fontRef idx="minor">
+            <a:schemeClr val="lt1"/>
+          </a:fontRef>
+        </p:style>
+        <p:txBody>
+          <a:bodyPr rtlCol="0" anchor="ctr"/>
+          <a:lstStyle/>
+          <a:p>
+            <a:pPr algn="ctr"/>
+            <a:endParaRPr lang="de-DE"/>
+          </a:p>
+        </p:txBody>
+      </p:sp>
+      <p:cxnSp>
+        <p:nvCxnSpPr>
+          <p:cNvPr id="83" name="Gekrümmte Verbindung 82">
+            <a:extLst>
+              <a:ext uri="{FF2B5EF4-FFF2-40B4-BE49-F238E27FC236}">
+                <a16:creationId xmlns:a16="http://schemas.microsoft.com/office/drawing/2014/main" id="{80E625A9-99E1-BFD6-1666-38B16FF39A99}"/>
+              </a:ext>
+            </a:extLst>
+          </p:cNvPr>
+          <p:cNvCxnSpPr>
+            <a:cxnSpLocks/>
+            <a:stCxn id="34" idx="0"/>
+          </p:cNvCxnSpPr>
+          <p:nvPr/>
+        </p:nvCxnSpPr>
+        <p:spPr>
+          <a:xfrm rot="16200000" flipH="1" flipV="1">
+            <a:off x="8282976" y="481807"/>
+            <a:ext cx="16402" cy="3232411"/>
+          </a:xfrm>
+          <a:prstGeom prst="curvedConnector4">
+            <a:avLst>
+              <a:gd name="adj1" fmla="val -1636130"/>
+              <a:gd name="adj2" fmla="val 99852"/>
+            </a:avLst>
+          </a:prstGeom>
+          <a:ln>
+            <a:solidFill>
+              <a:schemeClr val="accent2"/>
+            </a:solidFill>
+            <a:tailEnd type="triangle"/>
+          </a:ln>
+        </p:spPr>
+        <p:style>
+          <a:lnRef idx="1">
+            <a:schemeClr val="accent1"/>
+          </a:lnRef>
+          <a:fillRef idx="0">
+            <a:schemeClr val="accent1"/>
+          </a:fillRef>
+          <a:effectRef idx="0">
+            <a:schemeClr val="accent1"/>
+          </a:effectRef>
+          <a:fontRef idx="minor">
+            <a:schemeClr val="tx1"/>
+          </a:fontRef>
+        </p:style>
+      </p:cxnSp>
+      <p:cxnSp>
+        <p:nvCxnSpPr>
+          <p:cNvPr id="91" name="Gekrümmte Verbindung 90">
+            <a:extLst>
+              <a:ext uri="{FF2B5EF4-FFF2-40B4-BE49-F238E27FC236}">
+                <a16:creationId xmlns:a16="http://schemas.microsoft.com/office/drawing/2014/main" id="{6147C74D-705D-351C-18D0-0BED249F473F}"/>
+              </a:ext>
+            </a:extLst>
+          </p:cNvPr>
+          <p:cNvCxnSpPr>
+            <a:cxnSpLocks/>
+            <a:stCxn id="32" idx="1"/>
+            <a:endCxn id="34" idx="2"/>
+          </p:cNvCxnSpPr>
+          <p:nvPr/>
+        </p:nvCxnSpPr>
+        <p:spPr>
+          <a:xfrm rot="5400000" flipH="1" flipV="1">
+            <a:off x="8628909" y="1306375"/>
+            <a:ext cx="23548" cy="2533397"/>
+          </a:xfrm>
+          <a:prstGeom prst="curvedConnector3">
+            <a:avLst>
+              <a:gd name="adj1" fmla="val -970783"/>
+            </a:avLst>
+          </a:prstGeom>
+          <a:ln>
+            <a:solidFill>
+              <a:schemeClr val="accent2"/>
+            </a:solidFill>
+            <a:tailEnd type="triangle"/>
+          </a:ln>
+        </p:spPr>
+        <p:style>
+          <a:lnRef idx="1">
+            <a:schemeClr val="accent1"/>
+          </a:lnRef>
+          <a:fillRef idx="0">
+            <a:schemeClr val="accent1"/>
+          </a:fillRef>
+          <a:effectRef idx="0">
+            <a:schemeClr val="accent1"/>
+          </a:effectRef>
+          <a:fontRef idx="minor">
+            <a:schemeClr val="tx1"/>
+          </a:fontRef>
+        </p:style>
+      </p:cxnSp>
+      <p:cxnSp>
+        <p:nvCxnSpPr>
+          <p:cNvPr id="96" name="Gekrümmte Verbindung 95">
+            <a:extLst>
+              <a:ext uri="{FF2B5EF4-FFF2-40B4-BE49-F238E27FC236}">
+                <a16:creationId xmlns:a16="http://schemas.microsoft.com/office/drawing/2014/main" id="{E1834928-962C-F18D-2DA5-F944A15E38E9}"/>
+              </a:ext>
+            </a:extLst>
+          </p:cNvPr>
+          <p:cNvCxnSpPr>
+            <a:cxnSpLocks/>
+            <a:stCxn id="35" idx="0"/>
+            <a:endCxn id="32" idx="3"/>
+          </p:cNvCxnSpPr>
+          <p:nvPr/>
+        </p:nvCxnSpPr>
+        <p:spPr>
+          <a:xfrm rot="16200000" flipH="1" flipV="1">
+            <a:off x="8720416" y="743381"/>
+            <a:ext cx="23548" cy="2716410"/>
+          </a:xfrm>
+          <a:prstGeom prst="curvedConnector3">
+            <a:avLst>
+              <a:gd name="adj1" fmla="val -970783"/>
+            </a:avLst>
+          </a:prstGeom>
+          <a:ln>
+            <a:solidFill>
+              <a:schemeClr val="accent2"/>
+            </a:solidFill>
+            <a:tailEnd type="triangle"/>
+          </a:ln>
+        </p:spPr>
+        <p:style>
+          <a:lnRef idx="1">
+            <a:schemeClr val="accent1"/>
+          </a:lnRef>
+          <a:fillRef idx="0">
+            <a:schemeClr val="accent1"/>
+          </a:fillRef>
+          <a:effectRef idx="0">
+            <a:schemeClr val="accent1"/>
+          </a:effectRef>
+          <a:fontRef idx="minor">
+            <a:schemeClr val="tx1"/>
+          </a:fontRef>
+        </p:style>
+      </p:cxnSp>
+      <p:cxnSp>
+        <p:nvCxnSpPr>
+          <p:cNvPr id="99" name="Gekrümmte Verbindung 98">
+            <a:extLst>
+              <a:ext uri="{FF2B5EF4-FFF2-40B4-BE49-F238E27FC236}">
+                <a16:creationId xmlns:a16="http://schemas.microsoft.com/office/drawing/2014/main" id="{D18B39E1-3D72-B8AB-8D9B-46062D5242BD}"/>
+              </a:ext>
+            </a:extLst>
+          </p:cNvPr>
+          <p:cNvCxnSpPr>
+            <a:cxnSpLocks/>
+          </p:cNvCxnSpPr>
+          <p:nvPr/>
+        </p:nvCxnSpPr>
+        <p:spPr>
+          <a:xfrm rot="5400000" flipH="1" flipV="1">
+            <a:off x="8819649" y="1308936"/>
+            <a:ext cx="23548" cy="2533397"/>
+          </a:xfrm>
+          <a:prstGeom prst="curvedConnector3">
+            <a:avLst>
+              <a:gd name="adj1" fmla="val -970783"/>
+            </a:avLst>
+          </a:prstGeom>
+          <a:ln>
+            <a:solidFill>
+              <a:schemeClr val="accent2"/>
+            </a:solidFill>
+            <a:tailEnd type="triangle"/>
+          </a:ln>
+        </p:spPr>
+        <p:style>
+          <a:lnRef idx="1">
+            <a:schemeClr val="accent1"/>
+          </a:lnRef>
+          <a:fillRef idx="0">
+            <a:schemeClr val="accent1"/>
+          </a:fillRef>
+          <a:effectRef idx="0">
+            <a:schemeClr val="accent1"/>
+          </a:effectRef>
+          <a:fontRef idx="minor">
+            <a:schemeClr val="tx1"/>
+          </a:fontRef>
+        </p:style>
+      </p:cxnSp>
+      <p:sp>
+        <p:nvSpPr>
+          <p:cNvPr id="100" name="Pfeil nach rechts 99">
+            <a:extLst>
+              <a:ext uri="{FF2B5EF4-FFF2-40B4-BE49-F238E27FC236}">
+                <a16:creationId xmlns:a16="http://schemas.microsoft.com/office/drawing/2014/main" id="{1EAEDAF3-1168-C7EF-D8C7-2A3CE55605A3}"/>
+              </a:ext>
+            </a:extLst>
+          </p:cNvPr>
+          <p:cNvSpPr/>
+          <p:nvPr/>
+        </p:nvSpPr>
+        <p:spPr>
+          <a:xfrm flipV="1">
+            <a:off x="2771639" y="3170396"/>
+            <a:ext cx="147176" cy="45719"/>
+          </a:xfrm>
+          <a:prstGeom prst="rightArrow">
+            <a:avLst/>
+          </a:prstGeom>
+          <a:solidFill>
+            <a:schemeClr val="tx1">
+              <a:lumMod val="50000"/>
+              <a:lumOff val="50000"/>
+            </a:schemeClr>
+          </a:solidFill>
+          <a:ln w="12700">
+            <a:solidFill>
+              <a:schemeClr val="tx1">
+                <a:lumMod val="50000"/>
+                <a:lumOff val="50000"/>
+              </a:schemeClr>
+            </a:solidFill>
+          </a:ln>
+        </p:spPr>
+        <p:style>
+          <a:lnRef idx="2">
+            <a:schemeClr val="accent1">
+              <a:shade val="50000"/>
+            </a:schemeClr>
+          </a:lnRef>
+          <a:fillRef idx="1">
+            <a:schemeClr val="accent1"/>
+          </a:fillRef>
+          <a:effectRef idx="0">
+            <a:schemeClr val="accent1"/>
+          </a:effectRef>
+          <a:fontRef idx="minor">
+            <a:schemeClr val="lt1"/>
+          </a:fontRef>
+        </p:style>
+        <p:txBody>
+          <a:bodyPr rtlCol="0" anchor="ctr"/>
+          <a:lstStyle/>
+          <a:p>
+            <a:pPr algn="ctr"/>
+            <a:endParaRPr lang="de-DE"/>
+          </a:p>
+        </p:txBody>
+      </p:sp>
+      <p:sp>
+        <p:nvSpPr>
+          <p:cNvPr id="101" name="Pfeil nach rechts 100">
+            <a:extLst>
+              <a:ext uri="{FF2B5EF4-FFF2-40B4-BE49-F238E27FC236}">
+                <a16:creationId xmlns:a16="http://schemas.microsoft.com/office/drawing/2014/main" id="{600FE895-FD36-5DAE-16D7-F9D160DC96D9}"/>
+              </a:ext>
+            </a:extLst>
+          </p:cNvPr>
+          <p:cNvSpPr/>
+          <p:nvPr/>
+        </p:nvSpPr>
+        <p:spPr>
+          <a:xfrm flipV="1">
+            <a:off x="4682830" y="3170396"/>
+            <a:ext cx="147176" cy="45719"/>
+          </a:xfrm>
+          <a:prstGeom prst="rightArrow">
+            <a:avLst/>
+          </a:prstGeom>
+          <a:solidFill>
+            <a:schemeClr val="bg1">
+              <a:lumMod val="65000"/>
+            </a:schemeClr>
+          </a:solidFill>
+          <a:ln w="12700">
+            <a:solidFill>
+              <a:schemeClr val="bg1">
+                <a:lumMod val="65000"/>
+              </a:schemeClr>
+            </a:solidFill>
+          </a:ln>
+        </p:spPr>
+        <p:style>
+          <a:lnRef idx="2">
+            <a:schemeClr val="accent1">
+              <a:shade val="50000"/>
+            </a:schemeClr>
+          </a:lnRef>
+          <a:fillRef idx="1">
+            <a:schemeClr val="accent1"/>
+          </a:fillRef>
+          <a:effectRef idx="0">
+            <a:schemeClr val="accent1"/>
+          </a:effectRef>
+          <a:fontRef idx="minor">
+            <a:schemeClr val="lt1"/>
+          </a:fontRef>
+        </p:style>
+        <p:txBody>
+          <a:bodyPr rtlCol="0" anchor="ctr"/>
+          <a:lstStyle/>
+          <a:p>
+            <a:pPr algn="ctr"/>
+            <a:endParaRPr lang="de-DE"/>
+          </a:p>
+        </p:txBody>
+      </p:sp>
+      <p:sp>
+        <p:nvSpPr>
+          <p:cNvPr id="102" name="Pfeil nach rechts 101">
+            <a:extLst>
+              <a:ext uri="{FF2B5EF4-FFF2-40B4-BE49-F238E27FC236}">
+                <a16:creationId xmlns:a16="http://schemas.microsoft.com/office/drawing/2014/main" id="{CCD89AEF-A3A6-9DC5-8E94-3D46DCDD275A}"/>
+              </a:ext>
+            </a:extLst>
+          </p:cNvPr>
+          <p:cNvSpPr/>
+          <p:nvPr/>
+        </p:nvSpPr>
+        <p:spPr>
+          <a:xfrm flipV="1">
+            <a:off x="6821118" y="3170396"/>
+            <a:ext cx="147176" cy="45719"/>
+          </a:xfrm>
+          <a:prstGeom prst="rightArrow">
+            <a:avLst/>
+          </a:prstGeom>
+          <a:solidFill>
+            <a:schemeClr val="bg1">
+              <a:lumMod val="65000"/>
+            </a:schemeClr>
+          </a:solidFill>
+          <a:ln w="12700">
+            <a:solidFill>
+              <a:schemeClr val="bg1">
+                <a:lumMod val="65000"/>
+              </a:schemeClr>
+            </a:solidFill>
+          </a:ln>
+        </p:spPr>
+        <p:style>
+          <a:lnRef idx="2">
+            <a:schemeClr val="accent1">
+              <a:shade val="50000"/>
+            </a:schemeClr>
+          </a:lnRef>
+          <a:fillRef idx="1">
+            <a:schemeClr val="accent1"/>
+          </a:fillRef>
+          <a:effectRef idx="0">
+            <a:schemeClr val="accent1"/>
+          </a:effectRef>
+          <a:fontRef idx="minor">
+            <a:schemeClr val="lt1"/>
+          </a:fontRef>
+        </p:style>
+        <p:txBody>
+          <a:bodyPr rtlCol="0" anchor="ctr"/>
+          <a:lstStyle/>
+          <a:p>
+            <a:pPr algn="ctr"/>
+            <a:endParaRPr lang="de-DE"/>
+          </a:p>
+        </p:txBody>
+      </p:sp>
+      <p:sp>
+        <p:nvSpPr>
+          <p:cNvPr id="103" name="Pfeil nach rechts 102">
+            <a:extLst>
+              <a:ext uri="{FF2B5EF4-FFF2-40B4-BE49-F238E27FC236}">
+                <a16:creationId xmlns:a16="http://schemas.microsoft.com/office/drawing/2014/main" id="{BEE67D36-673A-CBD4-1C9F-DCB8B3FC5897}"/>
+              </a:ext>
+            </a:extLst>
+          </p:cNvPr>
+          <p:cNvSpPr/>
+          <p:nvPr/>
+        </p:nvSpPr>
+        <p:spPr>
+          <a:xfrm flipV="1">
+            <a:off x="9070839" y="3179830"/>
+            <a:ext cx="147176" cy="45719"/>
+          </a:xfrm>
+          <a:prstGeom prst="rightArrow">
+            <a:avLst/>
+          </a:prstGeom>
+          <a:solidFill>
+            <a:schemeClr val="bg1">
+              <a:lumMod val="65000"/>
+            </a:schemeClr>
+          </a:solidFill>
+          <a:ln w="12700">
+            <a:solidFill>
+              <a:schemeClr val="bg1">
+                <a:lumMod val="65000"/>
+              </a:schemeClr>
+            </a:solidFill>
+          </a:ln>
+        </p:spPr>
+        <p:style>
+          <a:lnRef idx="2">
+            <a:schemeClr val="accent1">
+              <a:shade val="50000"/>
+            </a:schemeClr>
+          </a:lnRef>
+          <a:fillRef idx="1">
+            <a:schemeClr val="accent1"/>
+          </a:fillRef>
+          <a:effectRef idx="0">
+            <a:schemeClr val="accent1"/>
+          </a:effectRef>
+          <a:fontRef idx="minor">
+            <a:schemeClr val="lt1"/>
+          </a:fontRef>
+        </p:style>
+        <p:txBody>
+          <a:bodyPr rtlCol="0" anchor="ctr"/>
+          <a:lstStyle/>
+          <a:p>
+            <a:pPr algn="ctr"/>
+            <a:endParaRPr lang="de-DE"/>
+          </a:p>
+        </p:txBody>
+      </p:sp>
+      <p:cxnSp>
+        <p:nvCxnSpPr>
+          <p:cNvPr id="104" name="Gekrümmte Verbindung 103">
+            <a:extLst>
+              <a:ext uri="{FF2B5EF4-FFF2-40B4-BE49-F238E27FC236}">
+                <a16:creationId xmlns:a16="http://schemas.microsoft.com/office/drawing/2014/main" id="{6539A3A1-7B11-2A55-4C5F-988E45F08C37}"/>
+              </a:ext>
+            </a:extLst>
+          </p:cNvPr>
+          <p:cNvCxnSpPr>
+            <a:cxnSpLocks/>
+            <a:stCxn id="36" idx="0"/>
+            <a:endCxn id="23" idx="3"/>
+          </p:cNvCxnSpPr>
+          <p:nvPr/>
+        </p:nvCxnSpPr>
+        <p:spPr>
+          <a:xfrm rot="16200000" flipV="1">
+            <a:off x="7608751" y="1220595"/>
+            <a:ext cx="12700" cy="3473833"/>
+          </a:xfrm>
+          <a:prstGeom prst="curvedConnector3">
+            <a:avLst>
+              <a:gd name="adj1" fmla="val 923465"/>
+            </a:avLst>
+          </a:prstGeom>
+          <a:ln>
+            <a:solidFill>
+              <a:schemeClr val="bg1">
+                <a:lumMod val="65000"/>
+              </a:schemeClr>
+            </a:solidFill>
+            <a:tailEnd type="triangle"/>
+          </a:ln>
+        </p:spPr>
+        <p:style>
+          <a:lnRef idx="1">
+            <a:schemeClr val="accent1"/>
+          </a:lnRef>
+          <a:fillRef idx="0">
+            <a:schemeClr val="accent1"/>
+          </a:fillRef>
+          <a:effectRef idx="0">
+            <a:schemeClr val="accent1"/>
+          </a:effectRef>
+          <a:fontRef idx="minor">
+            <a:schemeClr val="tx1"/>
+          </a:fontRef>
+        </p:style>
+      </p:cxnSp>
+      <p:cxnSp>
+        <p:nvCxnSpPr>
+          <p:cNvPr id="112" name="Gekrümmte Verbindung 111">
+            <a:extLst>
+              <a:ext uri="{FF2B5EF4-FFF2-40B4-BE49-F238E27FC236}">
+                <a16:creationId xmlns:a16="http://schemas.microsoft.com/office/drawing/2014/main" id="{A68FFAE4-4955-6C05-3392-EFBB3EDEF0C1}"/>
+              </a:ext>
+            </a:extLst>
+          </p:cNvPr>
+          <p:cNvCxnSpPr>
+            <a:cxnSpLocks/>
+            <a:endCxn id="36" idx="2"/>
+          </p:cNvCxnSpPr>
+          <p:nvPr/>
+        </p:nvCxnSpPr>
+        <p:spPr>
+          <a:xfrm>
+            <a:off x="5917110" y="3417352"/>
+            <a:ext cx="3428557" cy="11648"/>
+          </a:xfrm>
+          <a:prstGeom prst="curvedConnector4">
+            <a:avLst>
+              <a:gd name="adj1" fmla="val -247"/>
+              <a:gd name="adj2" fmla="val 1243407"/>
+            </a:avLst>
+          </a:prstGeom>
+          <a:ln>
+            <a:solidFill>
+              <a:schemeClr val="bg1">
+                <a:lumMod val="65000"/>
+              </a:schemeClr>
+            </a:solidFill>
+            <a:tailEnd type="triangle"/>
+          </a:ln>
+        </p:spPr>
+        <p:style>
+          <a:lnRef idx="1">
+            <a:schemeClr val="accent1"/>
+          </a:lnRef>
+          <a:fillRef idx="0">
+            <a:schemeClr val="accent1"/>
+          </a:fillRef>
+          <a:effectRef idx="0">
+            <a:schemeClr val="accent1"/>
+          </a:effectRef>
+          <a:fontRef idx="minor">
+            <a:schemeClr val="tx1"/>
+          </a:fontRef>
+        </p:style>
+      </p:cxnSp>
+      <p:sp>
+        <p:nvSpPr>
+          <p:cNvPr id="118" name="Pfeil nach rechts 117">
+            <a:extLst>
+              <a:ext uri="{FF2B5EF4-FFF2-40B4-BE49-F238E27FC236}">
+                <a16:creationId xmlns:a16="http://schemas.microsoft.com/office/drawing/2014/main" id="{CE7D0404-D1F0-02A1-CC06-357E84649D1A}"/>
+              </a:ext>
+            </a:extLst>
+          </p:cNvPr>
+          <p:cNvSpPr/>
+          <p:nvPr/>
+        </p:nvSpPr>
+        <p:spPr>
+          <a:xfrm flipV="1">
+            <a:off x="9364896" y="3180224"/>
+            <a:ext cx="147176" cy="45719"/>
+          </a:xfrm>
+          <a:prstGeom prst="rightArrow">
+            <a:avLst/>
+          </a:prstGeom>
+          <a:solidFill>
+            <a:schemeClr val="tx1">
+              <a:lumMod val="75000"/>
+              <a:lumOff val="25000"/>
+            </a:schemeClr>
+          </a:solidFill>
+          <a:ln w="12700">
+            <a:solidFill>
+              <a:schemeClr val="tx1">
+                <a:lumMod val="75000"/>
+                <a:lumOff val="25000"/>
+              </a:schemeClr>
+            </a:solidFill>
+          </a:ln>
+        </p:spPr>
+        <p:style>
+          <a:lnRef idx="2">
+            <a:schemeClr val="accent1">
+              <a:shade val="50000"/>
+            </a:schemeClr>
+          </a:lnRef>
+          <a:fillRef idx="1">
+            <a:schemeClr val="accent1"/>
+          </a:fillRef>
+          <a:effectRef idx="0">
+            <a:schemeClr val="accent1"/>
+          </a:effectRef>
+          <a:fontRef idx="minor">
+            <a:schemeClr val="lt1"/>
+          </a:fontRef>
+        </p:style>
+        <p:txBody>
+          <a:bodyPr rtlCol="0" anchor="ctr"/>
+          <a:lstStyle/>
+          <a:p>
+            <a:pPr algn="ctr"/>
+            <a:endParaRPr lang="de-DE"/>
+          </a:p>
+        </p:txBody>
+      </p:sp>
+      <p:sp>
+        <p:nvSpPr>
+          <p:cNvPr id="119" name="Pfeil nach rechts 118">
+            <a:extLst>
+              <a:ext uri="{FF2B5EF4-FFF2-40B4-BE49-F238E27FC236}">
+                <a16:creationId xmlns:a16="http://schemas.microsoft.com/office/drawing/2014/main" id="{115B755E-E585-C53A-AFE8-85560F7D9DD9}"/>
+              </a:ext>
+            </a:extLst>
+          </p:cNvPr>
+          <p:cNvSpPr/>
+          <p:nvPr/>
+        </p:nvSpPr>
+        <p:spPr>
+          <a:xfrm flipV="1">
+            <a:off x="2787541" y="4059861"/>
+            <a:ext cx="147176" cy="45719"/>
+          </a:xfrm>
+          <a:prstGeom prst="rightArrow">
+            <a:avLst/>
+          </a:prstGeom>
+          <a:solidFill>
+            <a:schemeClr val="accent4">
+              <a:lumMod val="75000"/>
+            </a:schemeClr>
+          </a:solidFill>
+          <a:ln w="12700">
+            <a:solidFill>
+              <a:schemeClr val="accent4">
+                <a:lumMod val="75000"/>
+              </a:schemeClr>
+            </a:solidFill>
+          </a:ln>
+        </p:spPr>
+        <p:style>
+          <a:lnRef idx="2">
+            <a:schemeClr val="accent1">
+              <a:shade val="50000"/>
+            </a:schemeClr>
+          </a:lnRef>
+          <a:fillRef idx="1">
+            <a:schemeClr val="accent1"/>
+          </a:fillRef>
+          <a:effectRef idx="0">
+            <a:schemeClr val="accent1"/>
+          </a:effectRef>
+          <a:fontRef idx="minor">
+            <a:schemeClr val="lt1"/>
+          </a:fontRef>
+        </p:style>
+        <p:txBody>
+          <a:bodyPr rtlCol="0" anchor="ctr"/>
+          <a:lstStyle/>
+          <a:p>
+            <a:pPr algn="ctr"/>
+            <a:endParaRPr lang="de-DE"/>
+          </a:p>
+        </p:txBody>
+      </p:sp>
+      <p:sp>
+        <p:nvSpPr>
+          <p:cNvPr id="120" name="Pfeil nach rechts 119">
+            <a:extLst>
+              <a:ext uri="{FF2B5EF4-FFF2-40B4-BE49-F238E27FC236}">
+                <a16:creationId xmlns:a16="http://schemas.microsoft.com/office/drawing/2014/main" id="{55F6B282-0497-CCCF-7760-969B4B36DD03}"/>
+              </a:ext>
+            </a:extLst>
+          </p:cNvPr>
+          <p:cNvSpPr/>
+          <p:nvPr/>
+        </p:nvSpPr>
+        <p:spPr>
+          <a:xfrm flipV="1">
+            <a:off x="5709944" y="4061982"/>
+            <a:ext cx="147176" cy="45719"/>
+          </a:xfrm>
+          <a:prstGeom prst="rightArrow">
+            <a:avLst/>
+          </a:prstGeom>
+          <a:solidFill>
+            <a:schemeClr val="accent4"/>
+          </a:solidFill>
+          <a:ln w="12700">
+            <a:solidFill>
+              <a:schemeClr val="accent4"/>
+            </a:solidFill>
+          </a:ln>
+        </p:spPr>
+        <p:style>
+          <a:lnRef idx="2">
+            <a:schemeClr val="accent1">
+              <a:shade val="50000"/>
+            </a:schemeClr>
+          </a:lnRef>
+          <a:fillRef idx="1">
+            <a:schemeClr val="accent1"/>
+          </a:fillRef>
+          <a:effectRef idx="0">
+            <a:schemeClr val="accent1"/>
+          </a:effectRef>
+          <a:fontRef idx="minor">
+            <a:schemeClr val="lt1"/>
+          </a:fontRef>
+        </p:style>
+        <p:txBody>
+          <a:bodyPr rtlCol="0" anchor="ctr"/>
+          <a:lstStyle/>
+          <a:p>
+            <a:pPr algn="ctr"/>
+            <a:endParaRPr lang="de-DE"/>
+          </a:p>
+        </p:txBody>
+      </p:sp>
+      <p:sp>
+        <p:nvSpPr>
+          <p:cNvPr id="121" name="Pfeil nach rechts 120">
+            <a:extLst>
+              <a:ext uri="{FF2B5EF4-FFF2-40B4-BE49-F238E27FC236}">
+                <a16:creationId xmlns:a16="http://schemas.microsoft.com/office/drawing/2014/main" id="{F2897F72-D823-2809-17D3-D59F8D1924F2}"/>
+              </a:ext>
+            </a:extLst>
+          </p:cNvPr>
+          <p:cNvSpPr/>
+          <p:nvPr/>
+        </p:nvSpPr>
+        <p:spPr>
+          <a:xfrm flipV="1">
+            <a:off x="8874326" y="4059320"/>
+            <a:ext cx="147176" cy="45719"/>
+          </a:xfrm>
+          <a:prstGeom prst="rightArrow">
+            <a:avLst/>
+          </a:prstGeom>
+          <a:solidFill>
+            <a:schemeClr val="accent4"/>
+          </a:solidFill>
+          <a:ln w="12700">
+            <a:solidFill>
+              <a:schemeClr val="accent4"/>
+            </a:solidFill>
+          </a:ln>
+        </p:spPr>
+        <p:style>
+          <a:lnRef idx="2">
+            <a:schemeClr val="accent1">
+              <a:shade val="50000"/>
+            </a:schemeClr>
+          </a:lnRef>
+          <a:fillRef idx="1">
+            <a:schemeClr val="accent1"/>
+          </a:fillRef>
+          <a:effectRef idx="0">
+            <a:schemeClr val="accent1"/>
+          </a:effectRef>
+          <a:fontRef idx="minor">
+            <a:schemeClr val="lt1"/>
+          </a:fontRef>
+        </p:style>
+        <p:txBody>
+          <a:bodyPr rtlCol="0" anchor="ctr"/>
+          <a:lstStyle/>
+          <a:p>
+            <a:pPr algn="ctr"/>
+            <a:endParaRPr lang="de-DE"/>
+          </a:p>
+        </p:txBody>
+      </p:sp>
+      <p:cxnSp>
+        <p:nvCxnSpPr>
+          <p:cNvPr id="123" name="Gekrümmte Verbindung 122">
+            <a:extLst>
+              <a:ext uri="{FF2B5EF4-FFF2-40B4-BE49-F238E27FC236}">
+                <a16:creationId xmlns:a16="http://schemas.microsoft.com/office/drawing/2014/main" id="{16F3C770-47DC-E8B4-A430-3102110B02DE}"/>
+              </a:ext>
+            </a:extLst>
+          </p:cNvPr>
+          <p:cNvCxnSpPr>
+            <a:stCxn id="41" idx="0"/>
+            <a:endCxn id="31" idx="3"/>
+          </p:cNvCxnSpPr>
+          <p:nvPr/>
+        </p:nvCxnSpPr>
+        <p:spPr>
+          <a:xfrm rot="16200000" flipH="1" flipV="1">
+            <a:off x="8255967" y="2966247"/>
+            <a:ext cx="7427" cy="1721115"/>
+          </a:xfrm>
+          <a:prstGeom prst="curvedConnector3">
+            <a:avLst>
+              <a:gd name="adj1" fmla="val -3077959"/>
+            </a:avLst>
+          </a:prstGeom>
+          <a:ln>
+            <a:solidFill>
+              <a:schemeClr val="accent4"/>
+            </a:solidFill>
+            <a:tailEnd type="triangle"/>
+          </a:ln>
+        </p:spPr>
+        <p:style>
+          <a:lnRef idx="1">
+            <a:schemeClr val="accent1"/>
+          </a:lnRef>
+          <a:fillRef idx="0">
+            <a:schemeClr val="accent1"/>
+          </a:fillRef>
+          <a:effectRef idx="0">
+            <a:schemeClr val="accent1"/>
+          </a:effectRef>
+          <a:fontRef idx="minor">
+            <a:schemeClr val="tx1"/>
+          </a:fontRef>
+        </p:style>
+      </p:cxnSp>
+      <p:cxnSp>
+        <p:nvCxnSpPr>
+          <p:cNvPr id="124" name="Gekrümmte Verbindung 123">
+            <a:extLst>
+              <a:ext uri="{FF2B5EF4-FFF2-40B4-BE49-F238E27FC236}">
+                <a16:creationId xmlns:a16="http://schemas.microsoft.com/office/drawing/2014/main" id="{23351931-F637-9268-1BFA-4CEEBB385F2F}"/>
+              </a:ext>
+            </a:extLst>
+          </p:cNvPr>
+          <p:cNvCxnSpPr/>
+          <p:nvPr/>
+        </p:nvCxnSpPr>
+        <p:spPr>
+          <a:xfrm rot="16200000" flipH="1" flipV="1">
+            <a:off x="8413923" y="2977311"/>
+            <a:ext cx="7427" cy="1721115"/>
+          </a:xfrm>
+          <a:prstGeom prst="curvedConnector3">
+            <a:avLst>
+              <a:gd name="adj1" fmla="val -3077959"/>
+            </a:avLst>
+          </a:prstGeom>
+          <a:ln>
+            <a:solidFill>
+              <a:schemeClr val="accent4"/>
+            </a:solidFill>
+            <a:tailEnd type="triangle"/>
+          </a:ln>
+        </p:spPr>
+        <p:style>
+          <a:lnRef idx="1">
+            <a:schemeClr val="accent1"/>
+          </a:lnRef>
+          <a:fillRef idx="0">
+            <a:schemeClr val="accent1"/>
+          </a:fillRef>
+          <a:effectRef idx="0">
+            <a:schemeClr val="accent1"/>
+          </a:effectRef>
+          <a:fontRef idx="minor">
+            <a:schemeClr val="tx1"/>
+          </a:fontRef>
+        </p:style>
+      </p:cxnSp>
+      <p:cxnSp>
+        <p:nvCxnSpPr>
+          <p:cNvPr id="125" name="Gekrümmte Verbindung 124">
+            <a:extLst>
+              <a:ext uri="{FF2B5EF4-FFF2-40B4-BE49-F238E27FC236}">
+                <a16:creationId xmlns:a16="http://schemas.microsoft.com/office/drawing/2014/main" id="{718FA055-1E46-D38A-A526-00A50BCDBF14}"/>
+              </a:ext>
+            </a:extLst>
+          </p:cNvPr>
+          <p:cNvCxnSpPr/>
+          <p:nvPr/>
+        </p:nvCxnSpPr>
+        <p:spPr>
+          <a:xfrm rot="16200000" flipH="1" flipV="1">
+            <a:off x="8584200" y="2983972"/>
+            <a:ext cx="7427" cy="1721115"/>
+          </a:xfrm>
+          <a:prstGeom prst="curvedConnector3">
+            <a:avLst>
+              <a:gd name="adj1" fmla="val -3077959"/>
+            </a:avLst>
+          </a:prstGeom>
+          <a:ln>
+            <a:solidFill>
+              <a:schemeClr val="accent4"/>
+            </a:solidFill>
+            <a:tailEnd type="triangle"/>
+          </a:ln>
+        </p:spPr>
+        <p:style>
+          <a:lnRef idx="1">
+            <a:schemeClr val="accent1"/>
+          </a:lnRef>
+          <a:fillRef idx="0">
+            <a:schemeClr val="accent1"/>
+          </a:fillRef>
+          <a:effectRef idx="0">
+            <a:schemeClr val="accent1"/>
+          </a:effectRef>
+          <a:fontRef idx="minor">
+            <a:schemeClr val="tx1"/>
+          </a:fontRef>
+        </p:style>
+      </p:cxnSp>
+      <p:cxnSp>
+        <p:nvCxnSpPr>
+          <p:cNvPr id="126" name="Gekrümmte Verbindung 125">
+            <a:extLst>
+              <a:ext uri="{FF2B5EF4-FFF2-40B4-BE49-F238E27FC236}">
+                <a16:creationId xmlns:a16="http://schemas.microsoft.com/office/drawing/2014/main" id="{923D8661-DE0D-AF12-68A4-B10C3F097E48}"/>
+              </a:ext>
+            </a:extLst>
+          </p:cNvPr>
+          <p:cNvCxnSpPr>
+            <a:cxnSpLocks/>
+            <a:stCxn id="31" idx="1"/>
+            <a:endCxn id="41" idx="2"/>
+          </p:cNvCxnSpPr>
+          <p:nvPr/>
+        </p:nvCxnSpPr>
+        <p:spPr>
+          <a:xfrm rot="5400000" flipH="1" flipV="1">
+            <a:off x="8255966" y="3437736"/>
+            <a:ext cx="7427" cy="1721115"/>
+          </a:xfrm>
+          <a:prstGeom prst="curvedConnector3">
+            <a:avLst>
+              <a:gd name="adj1" fmla="val -3077959"/>
+            </a:avLst>
+          </a:prstGeom>
+          <a:ln>
+            <a:solidFill>
+              <a:schemeClr val="accent4"/>
+            </a:solidFill>
+            <a:tailEnd type="triangle"/>
+          </a:ln>
+        </p:spPr>
+        <p:style>
+          <a:lnRef idx="1">
+            <a:schemeClr val="accent1"/>
+          </a:lnRef>
+          <a:fillRef idx="0">
+            <a:schemeClr val="accent1"/>
+          </a:fillRef>
+          <a:effectRef idx="0">
+            <a:schemeClr val="accent1"/>
+          </a:effectRef>
+          <a:fontRef idx="minor">
+            <a:schemeClr val="tx1"/>
+          </a:fontRef>
+        </p:style>
+      </p:cxnSp>
+      <p:cxnSp>
+        <p:nvCxnSpPr>
+          <p:cNvPr id="131" name="Gekrümmte Verbindung 130">
+            <a:extLst>
+              <a:ext uri="{FF2B5EF4-FFF2-40B4-BE49-F238E27FC236}">
+                <a16:creationId xmlns:a16="http://schemas.microsoft.com/office/drawing/2014/main" id="{45EF4BB8-5C21-60DF-A346-69489BC4BE5B}"/>
+              </a:ext>
+            </a:extLst>
+          </p:cNvPr>
+          <p:cNvCxnSpPr>
+            <a:cxnSpLocks/>
+          </p:cNvCxnSpPr>
+          <p:nvPr/>
+        </p:nvCxnSpPr>
+        <p:spPr>
+          <a:xfrm rot="5400000" flipH="1" flipV="1">
+            <a:off x="8416317" y="3439062"/>
+            <a:ext cx="7427" cy="1721115"/>
+          </a:xfrm>
+          <a:prstGeom prst="curvedConnector3">
+            <a:avLst>
+              <a:gd name="adj1" fmla="val -3077959"/>
+            </a:avLst>
+          </a:prstGeom>
+          <a:ln>
+            <a:solidFill>
+              <a:schemeClr val="accent4"/>
+            </a:solidFill>
+            <a:tailEnd type="triangle"/>
+          </a:ln>
+        </p:spPr>
+        <p:style>
+          <a:lnRef idx="1">
+            <a:schemeClr val="accent1"/>
+          </a:lnRef>
+          <a:fillRef idx="0">
+            <a:schemeClr val="accent1"/>
+          </a:fillRef>
+          <a:effectRef idx="0">
+            <a:schemeClr val="accent1"/>
+          </a:effectRef>
+          <a:fontRef idx="minor">
+            <a:schemeClr val="tx1"/>
+          </a:fontRef>
+        </p:style>
+      </p:cxnSp>
+      <p:cxnSp>
+        <p:nvCxnSpPr>
+          <p:cNvPr id="132" name="Gekrümmte Verbindung 131">
+            <a:extLst>
+              <a:ext uri="{FF2B5EF4-FFF2-40B4-BE49-F238E27FC236}">
+                <a16:creationId xmlns:a16="http://schemas.microsoft.com/office/drawing/2014/main" id="{72C3ECFB-D4E9-A407-ED8E-F1049E9B7C63}"/>
+              </a:ext>
+            </a:extLst>
+          </p:cNvPr>
+          <p:cNvCxnSpPr>
+            <a:cxnSpLocks/>
+          </p:cNvCxnSpPr>
+          <p:nvPr/>
+        </p:nvCxnSpPr>
+        <p:spPr>
+          <a:xfrm rot="5400000" flipH="1" flipV="1">
+            <a:off x="8584200" y="3432349"/>
+            <a:ext cx="7427" cy="1721115"/>
+          </a:xfrm>
+          <a:prstGeom prst="curvedConnector3">
+            <a:avLst>
+              <a:gd name="adj1" fmla="val -3077959"/>
+            </a:avLst>
+          </a:prstGeom>
+          <a:ln>
+            <a:solidFill>
+              <a:schemeClr val="accent4"/>
+            </a:solidFill>
+            <a:tailEnd type="triangle"/>
+          </a:ln>
+        </p:spPr>
+        <p:style>
+          <a:lnRef idx="1">
+            <a:schemeClr val="accent1"/>
+          </a:lnRef>
+          <a:fillRef idx="0">
+            <a:schemeClr val="accent1"/>
+          </a:fillRef>
+          <a:effectRef idx="0">
+            <a:schemeClr val="accent1"/>
+          </a:effectRef>
+          <a:fontRef idx="minor">
+            <a:schemeClr val="tx1"/>
+          </a:fontRef>
+        </p:style>
+      </p:cxnSp>
+      <p:sp>
+        <p:nvSpPr>
+          <p:cNvPr id="133" name="Pfeil nach rechts 132">
+            <a:extLst>
+              <a:ext uri="{FF2B5EF4-FFF2-40B4-BE49-F238E27FC236}">
+                <a16:creationId xmlns:a16="http://schemas.microsoft.com/office/drawing/2014/main" id="{957E33A0-2AB8-4B4A-BC32-0D6E3E91CB85}"/>
+              </a:ext>
+            </a:extLst>
+          </p:cNvPr>
+          <p:cNvSpPr/>
+          <p:nvPr/>
+        </p:nvSpPr>
+        <p:spPr>
+          <a:xfrm flipV="1">
+            <a:off x="9471133" y="4059319"/>
+            <a:ext cx="147176" cy="45719"/>
+          </a:xfrm>
+          <a:prstGeom prst="rightArrow">
+            <a:avLst/>
+          </a:prstGeom>
+          <a:solidFill>
+            <a:schemeClr val="tx1">
+              <a:lumMod val="75000"/>
+              <a:lumOff val="25000"/>
+            </a:schemeClr>
+          </a:solidFill>
+          <a:ln w="12700">
+            <a:solidFill>
+              <a:schemeClr val="tx1">
+                <a:lumMod val="75000"/>
+                <a:lumOff val="25000"/>
+              </a:schemeClr>
+            </a:solidFill>
+          </a:ln>
+        </p:spPr>
+        <p:style>
+          <a:lnRef idx="2">
+            <a:schemeClr val="accent1">
+              <a:shade val="50000"/>
+            </a:schemeClr>
+          </a:lnRef>
+          <a:fillRef idx="1">
+            <a:schemeClr val="accent1"/>
+          </a:fillRef>
+          <a:effectRef idx="0">
+            <a:schemeClr val="accent1"/>
+          </a:effectRef>
+          <a:fontRef idx="minor">
+            <a:schemeClr val="lt1"/>
+          </a:fontRef>
+        </p:style>
+        <p:txBody>
+          <a:bodyPr rtlCol="0" anchor="ctr"/>
+          <a:lstStyle/>
+          <a:p>
+            <a:pPr algn="ctr"/>
+            <a:endParaRPr lang="de-DE"/>
+          </a:p>
+        </p:txBody>
+      </p:sp>
+      <p:sp>
+        <p:nvSpPr>
+          <p:cNvPr id="134" name="Pfeil nach rechts 133">
+            <a:extLst>
+              <a:ext uri="{FF2B5EF4-FFF2-40B4-BE49-F238E27FC236}">
+                <a16:creationId xmlns:a16="http://schemas.microsoft.com/office/drawing/2014/main" id="{F40155EA-3875-AD75-460C-8DA00BB7CF4F}"/>
+              </a:ext>
+            </a:extLst>
+          </p:cNvPr>
+          <p:cNvSpPr/>
+          <p:nvPr/>
+        </p:nvSpPr>
+        <p:spPr>
+          <a:xfrm flipV="1">
+            <a:off x="9094105" y="4064513"/>
+            <a:ext cx="118172" cy="45719"/>
+          </a:xfrm>
+          <a:prstGeom prst="rightArrow">
+            <a:avLst/>
+          </a:prstGeom>
+          <a:solidFill>
+            <a:schemeClr val="tx1">
+              <a:lumMod val="75000"/>
+              <a:lumOff val="25000"/>
+            </a:schemeClr>
+          </a:solidFill>
+          <a:ln w="12700">
+            <a:solidFill>
+              <a:schemeClr val="tx1">
+                <a:lumMod val="75000"/>
+                <a:lumOff val="25000"/>
+              </a:schemeClr>
+            </a:solidFill>
+          </a:ln>
+        </p:spPr>
+        <p:style>
+          <a:lnRef idx="2">
+            <a:schemeClr val="accent1">
+              <a:shade val="50000"/>
+            </a:schemeClr>
+          </a:lnRef>
+          <a:fillRef idx="1">
+            <a:schemeClr val="accent1"/>
+          </a:fillRef>
+          <a:effectRef idx="0">
+            <a:schemeClr val="accent1"/>
+          </a:effectRef>
+          <a:fontRef idx="minor">
+            <a:schemeClr val="lt1"/>
+          </a:fontRef>
+        </p:style>
+        <p:txBody>
+          <a:bodyPr rtlCol="0" anchor="ctr"/>
+          <a:lstStyle/>
+          <a:p>
+            <a:pPr algn="ctr"/>
+            <a:endParaRPr lang="de-DE"/>
+          </a:p>
+        </p:txBody>
+      </p:sp>
+      <p:sp>
+        <p:nvSpPr>
+          <p:cNvPr id="135" name="Pfeil nach rechts 134">
+            <a:extLst>
+              <a:ext uri="{FF2B5EF4-FFF2-40B4-BE49-F238E27FC236}">
+                <a16:creationId xmlns:a16="http://schemas.microsoft.com/office/drawing/2014/main" id="{6A788A54-6BA7-33CB-E612-82CF11DAEA3A}"/>
+              </a:ext>
+            </a:extLst>
+          </p:cNvPr>
+          <p:cNvSpPr/>
+          <p:nvPr/>
+        </p:nvSpPr>
+        <p:spPr>
+          <a:xfrm flipV="1">
+            <a:off x="9253132" y="4064513"/>
+            <a:ext cx="118172" cy="45719"/>
+          </a:xfrm>
+          <a:prstGeom prst="rightArrow">
+            <a:avLst/>
+          </a:prstGeom>
+          <a:solidFill>
+            <a:schemeClr val="tx1">
+              <a:lumMod val="75000"/>
+              <a:lumOff val="25000"/>
+            </a:schemeClr>
+          </a:solidFill>
+          <a:ln w="12700">
+            <a:solidFill>
+              <a:schemeClr val="tx1">
+                <a:lumMod val="75000"/>
+                <a:lumOff val="25000"/>
+              </a:schemeClr>
+            </a:solidFill>
+          </a:ln>
+        </p:spPr>
+        <p:style>
+          <a:lnRef idx="2">
+            <a:schemeClr val="accent1">
+              <a:shade val="50000"/>
+            </a:schemeClr>
+          </a:lnRef>
+          <a:fillRef idx="1">
+            <a:schemeClr val="accent1"/>
+          </a:fillRef>
+          <a:effectRef idx="0">
+            <a:schemeClr val="accent1"/>
+          </a:effectRef>
+          <a:fontRef idx="minor">
+            <a:schemeClr val="lt1"/>
+          </a:fontRef>
+        </p:style>
+        <p:txBody>
+          <a:bodyPr rtlCol="0" anchor="ctr"/>
+          <a:lstStyle/>
+          <a:p>
+            <a:pPr algn="ctr"/>
+            <a:endParaRPr lang="de-DE"/>
+          </a:p>
+        </p:txBody>
+      </p:sp>
+      <p:sp>
+        <p:nvSpPr>
+          <p:cNvPr id="136" name="Pfeil nach rechts 135">
+            <a:extLst>
+              <a:ext uri="{FF2B5EF4-FFF2-40B4-BE49-F238E27FC236}">
+                <a16:creationId xmlns:a16="http://schemas.microsoft.com/office/drawing/2014/main" id="{9262E088-3E7D-C1B1-2C1F-AFAF4EA4A1DD}"/>
+              </a:ext>
+            </a:extLst>
+          </p:cNvPr>
+          <p:cNvSpPr/>
+          <p:nvPr/>
+        </p:nvSpPr>
+        <p:spPr>
+          <a:xfrm flipV="1">
+            <a:off x="2769462" y="4921629"/>
+            <a:ext cx="147176" cy="45719"/>
+          </a:xfrm>
+          <a:prstGeom prst="rightArrow">
+            <a:avLst/>
+          </a:prstGeom>
+          <a:solidFill>
+            <a:schemeClr val="accent6">
+              <a:lumMod val="75000"/>
+            </a:schemeClr>
+          </a:solidFill>
+          <a:ln w="12700">
+            <a:solidFill>
+              <a:schemeClr val="accent6">
+                <a:lumMod val="75000"/>
+              </a:schemeClr>
+            </a:solidFill>
+          </a:ln>
+        </p:spPr>
+        <p:style>
+          <a:lnRef idx="2">
+            <a:schemeClr val="accent1">
+              <a:shade val="50000"/>
+            </a:schemeClr>
+          </a:lnRef>
+          <a:fillRef idx="1">
+            <a:schemeClr val="accent1"/>
+          </a:fillRef>
+          <a:effectRef idx="0">
+            <a:schemeClr val="accent1"/>
+          </a:effectRef>
+          <a:fontRef idx="minor">
+            <a:schemeClr val="lt1"/>
+          </a:fontRef>
+        </p:style>
+        <p:txBody>
+          <a:bodyPr rtlCol="0" anchor="ctr"/>
+          <a:lstStyle/>
+          <a:p>
+            <a:pPr algn="ctr"/>
+            <a:endParaRPr lang="de-DE"/>
+          </a:p>
+        </p:txBody>
+      </p:sp>
+      <p:sp>
+        <p:nvSpPr>
+          <p:cNvPr id="137" name="Pfeil nach rechts 136">
+            <a:extLst>
+              <a:ext uri="{FF2B5EF4-FFF2-40B4-BE49-F238E27FC236}">
+                <a16:creationId xmlns:a16="http://schemas.microsoft.com/office/drawing/2014/main" id="{82C12690-64BE-4F4D-5033-C0C26CCCFB3A}"/>
+              </a:ext>
+            </a:extLst>
+          </p:cNvPr>
+          <p:cNvSpPr/>
+          <p:nvPr/>
+        </p:nvSpPr>
+        <p:spPr>
+          <a:xfrm flipV="1">
+            <a:off x="2779692" y="5464516"/>
+            <a:ext cx="147176" cy="45719"/>
+          </a:xfrm>
+          <a:prstGeom prst="rightArrow">
+            <a:avLst/>
+          </a:prstGeom>
+          <a:solidFill>
+            <a:schemeClr val="accent6">
+              <a:lumMod val="75000"/>
+            </a:schemeClr>
+          </a:solidFill>
+          <a:ln w="12700">
+            <a:solidFill>
+              <a:schemeClr val="accent6">
+                <a:lumMod val="75000"/>
+              </a:schemeClr>
+            </a:solidFill>
+          </a:ln>
+        </p:spPr>
+        <p:style>
+          <a:lnRef idx="2">
+            <a:schemeClr val="accent1">
+              <a:shade val="50000"/>
+            </a:schemeClr>
+          </a:lnRef>
+          <a:fillRef idx="1">
+            <a:schemeClr val="accent1"/>
+          </a:fillRef>
+          <a:effectRef idx="0">
+            <a:schemeClr val="accent1"/>
+          </a:effectRef>
+          <a:fontRef idx="minor">
+            <a:schemeClr val="lt1"/>
+          </a:fontRef>
+        </p:style>
+        <p:txBody>
+          <a:bodyPr rtlCol="0" anchor="ctr"/>
+          <a:lstStyle/>
+          <a:p>
+            <a:pPr algn="ctr"/>
+            <a:endParaRPr lang="de-DE"/>
+          </a:p>
+        </p:txBody>
+      </p:sp>
+      <p:sp>
+        <p:nvSpPr>
+          <p:cNvPr id="138" name="Pfeil nach rechts 137">
+            <a:extLst>
+              <a:ext uri="{FF2B5EF4-FFF2-40B4-BE49-F238E27FC236}">
+                <a16:creationId xmlns:a16="http://schemas.microsoft.com/office/drawing/2014/main" id="{57D0410E-CAE4-80AB-7E46-F99315EA4A7C}"/>
+              </a:ext>
+            </a:extLst>
+          </p:cNvPr>
+          <p:cNvSpPr/>
+          <p:nvPr/>
+        </p:nvSpPr>
+        <p:spPr>
+          <a:xfrm flipV="1">
+            <a:off x="2779692" y="6054849"/>
+            <a:ext cx="147176" cy="45719"/>
+          </a:xfrm>
+          <a:prstGeom prst="rightArrow">
+            <a:avLst/>
+          </a:prstGeom>
+          <a:solidFill>
+            <a:schemeClr val="accent6">
+              <a:lumMod val="75000"/>
+            </a:schemeClr>
+          </a:solidFill>
+          <a:ln w="12700">
+            <a:solidFill>
+              <a:schemeClr val="accent6">
+                <a:lumMod val="75000"/>
+              </a:schemeClr>
+            </a:solidFill>
+          </a:ln>
+        </p:spPr>
+        <p:style>
+          <a:lnRef idx="2">
+            <a:schemeClr val="accent1">
+              <a:shade val="50000"/>
+            </a:schemeClr>
+          </a:lnRef>
+          <a:fillRef idx="1">
+            <a:schemeClr val="accent1"/>
+          </a:fillRef>
+          <a:effectRef idx="0">
+            <a:schemeClr val="accent1"/>
+          </a:effectRef>
+          <a:fontRef idx="minor">
+            <a:schemeClr val="lt1"/>
+          </a:fontRef>
+        </p:style>
+        <p:txBody>
+          <a:bodyPr rtlCol="0" anchor="ctr"/>
+          <a:lstStyle/>
+          <a:p>
+            <a:pPr algn="ctr"/>
+            <a:endParaRPr lang="de-DE"/>
+          </a:p>
+        </p:txBody>
+      </p:sp>
+      <p:sp>
+        <p:nvSpPr>
+          <p:cNvPr id="139" name="Pfeil nach rechts 138">
+            <a:extLst>
+              <a:ext uri="{FF2B5EF4-FFF2-40B4-BE49-F238E27FC236}">
+                <a16:creationId xmlns:a16="http://schemas.microsoft.com/office/drawing/2014/main" id="{617B86A9-4707-95D3-2AE3-94F9D5E22BCF}"/>
+              </a:ext>
+            </a:extLst>
+          </p:cNvPr>
+          <p:cNvSpPr/>
+          <p:nvPr/>
+        </p:nvSpPr>
+        <p:spPr>
+          <a:xfrm flipV="1">
+            <a:off x="4696877" y="4916680"/>
+            <a:ext cx="147176" cy="45719"/>
+          </a:xfrm>
+          <a:prstGeom prst="rightArrow">
+            <a:avLst/>
+          </a:prstGeom>
+          <a:solidFill>
+            <a:schemeClr val="accent6"/>
+          </a:solidFill>
+          <a:ln w="12700">
+            <a:solidFill>
+              <a:schemeClr val="accent6"/>
+            </a:solidFill>
+          </a:ln>
+        </p:spPr>
+        <p:style>
+          <a:lnRef idx="2">
+            <a:schemeClr val="accent1">
+              <a:shade val="50000"/>
+            </a:schemeClr>
+          </a:lnRef>
+          <a:fillRef idx="1">
+            <a:schemeClr val="accent1"/>
+          </a:fillRef>
+          <a:effectRef idx="0">
+            <a:schemeClr val="accent1"/>
+          </a:effectRef>
+          <a:fontRef idx="minor">
+            <a:schemeClr val="lt1"/>
+          </a:fontRef>
+        </p:style>
+        <p:txBody>
+          <a:bodyPr rtlCol="0" anchor="ctr"/>
+          <a:lstStyle/>
+          <a:p>
+            <a:pPr algn="ctr"/>
+            <a:endParaRPr lang="de-DE"/>
+          </a:p>
+        </p:txBody>
+      </p:sp>
+      <p:sp>
+        <p:nvSpPr>
+          <p:cNvPr id="140" name="Pfeil nach rechts 139">
+            <a:extLst>
+              <a:ext uri="{FF2B5EF4-FFF2-40B4-BE49-F238E27FC236}">
+                <a16:creationId xmlns:a16="http://schemas.microsoft.com/office/drawing/2014/main" id="{3734609A-5895-E0A0-1DAC-CF583323F96D}"/>
+              </a:ext>
+            </a:extLst>
+          </p:cNvPr>
+          <p:cNvSpPr/>
+          <p:nvPr/>
+        </p:nvSpPr>
+        <p:spPr>
+          <a:xfrm flipV="1">
+            <a:off x="6900092" y="4893820"/>
+            <a:ext cx="147176" cy="45719"/>
+          </a:xfrm>
+          <a:prstGeom prst="rightArrow">
+            <a:avLst/>
+          </a:prstGeom>
+          <a:solidFill>
+            <a:schemeClr val="accent6"/>
+          </a:solidFill>
+          <a:ln w="12700">
+            <a:solidFill>
+              <a:schemeClr val="accent6"/>
+            </a:solidFill>
+          </a:ln>
+        </p:spPr>
+        <p:style>
+          <a:lnRef idx="2">
+            <a:schemeClr val="accent1">
+              <a:shade val="50000"/>
+            </a:schemeClr>
+          </a:lnRef>
+          <a:fillRef idx="1">
+            <a:schemeClr val="accent1"/>
+          </a:fillRef>
+          <a:effectRef idx="0">
+            <a:schemeClr val="accent1"/>
+          </a:effectRef>
+          <a:fontRef idx="minor">
+            <a:schemeClr val="lt1"/>
+          </a:fontRef>
+        </p:style>
+        <p:txBody>
+          <a:bodyPr rtlCol="0" anchor="ctr"/>
+          <a:lstStyle/>
+          <a:p>
+            <a:pPr algn="ctr"/>
+            <a:endParaRPr lang="de-DE"/>
+          </a:p>
+        </p:txBody>
+      </p:sp>
+      <p:sp>
+        <p:nvSpPr>
+          <p:cNvPr id="141" name="Pfeil nach rechts 140">
+            <a:extLst>
+              <a:ext uri="{FF2B5EF4-FFF2-40B4-BE49-F238E27FC236}">
+                <a16:creationId xmlns:a16="http://schemas.microsoft.com/office/drawing/2014/main" id="{8A5AFED9-7F4E-6C40-2B48-510914AA27F0}"/>
+              </a:ext>
+            </a:extLst>
+          </p:cNvPr>
+          <p:cNvSpPr/>
+          <p:nvPr/>
+        </p:nvSpPr>
+        <p:spPr>
+          <a:xfrm flipV="1">
+            <a:off x="8164165" y="4893820"/>
+            <a:ext cx="147176" cy="45719"/>
+          </a:xfrm>
+          <a:prstGeom prst="rightArrow">
+            <a:avLst/>
+          </a:prstGeom>
+          <a:solidFill>
+            <a:schemeClr val="accent6"/>
+          </a:solidFill>
+          <a:ln w="12700">
+            <a:solidFill>
+              <a:schemeClr val="accent6"/>
+            </a:solidFill>
+          </a:ln>
+        </p:spPr>
+        <p:style>
+          <a:lnRef idx="2">
+            <a:schemeClr val="accent1">
+              <a:shade val="50000"/>
+            </a:schemeClr>
+          </a:lnRef>
+          <a:fillRef idx="1">
+            <a:schemeClr val="accent1"/>
+          </a:fillRef>
+          <a:effectRef idx="0">
+            <a:schemeClr val="accent1"/>
+          </a:effectRef>
+          <a:fontRef idx="minor">
+            <a:schemeClr val="lt1"/>
+          </a:fontRef>
+        </p:style>
+        <p:txBody>
+          <a:bodyPr rtlCol="0" anchor="ctr"/>
+          <a:lstStyle/>
+          <a:p>
+            <a:pPr algn="ctr"/>
+            <a:endParaRPr lang="de-DE"/>
+          </a:p>
+        </p:txBody>
+      </p:sp>
+      <p:sp>
+        <p:nvSpPr>
+          <p:cNvPr id="142" name="Pfeil nach rechts 141">
+            <a:extLst>
+              <a:ext uri="{FF2B5EF4-FFF2-40B4-BE49-F238E27FC236}">
+                <a16:creationId xmlns:a16="http://schemas.microsoft.com/office/drawing/2014/main" id="{5EC66F61-EE61-3F9B-3418-567D473DFBC7}"/>
+              </a:ext>
+            </a:extLst>
+          </p:cNvPr>
+          <p:cNvSpPr/>
+          <p:nvPr/>
+        </p:nvSpPr>
+        <p:spPr>
+          <a:xfrm flipV="1">
+            <a:off x="9054042" y="4901771"/>
+            <a:ext cx="147176" cy="45719"/>
+          </a:xfrm>
+          <a:prstGeom prst="rightArrow">
+            <a:avLst/>
+          </a:prstGeom>
+          <a:solidFill>
+            <a:schemeClr val="accent6"/>
+          </a:solidFill>
+          <a:ln w="12700">
+            <a:solidFill>
+              <a:schemeClr val="accent6"/>
+            </a:solidFill>
+          </a:ln>
+        </p:spPr>
+        <p:style>
+          <a:lnRef idx="2">
+            <a:schemeClr val="accent1">
+              <a:shade val="50000"/>
+            </a:schemeClr>
+          </a:lnRef>
+          <a:fillRef idx="1">
+            <a:schemeClr val="accent1"/>
+          </a:fillRef>
+          <a:effectRef idx="0">
+            <a:schemeClr val="accent1"/>
+          </a:effectRef>
+          <a:fontRef idx="minor">
+            <a:schemeClr val="lt1"/>
+          </a:fontRef>
+        </p:style>
+        <p:txBody>
+          <a:bodyPr rtlCol="0" anchor="ctr"/>
+          <a:lstStyle/>
+          <a:p>
+            <a:pPr algn="ctr"/>
+            <a:endParaRPr lang="de-DE"/>
+          </a:p>
+        </p:txBody>
+      </p:sp>
+      <p:sp>
+        <p:nvSpPr>
+          <p:cNvPr id="143" name="Pfeil nach rechts 142">
+            <a:extLst>
+              <a:ext uri="{FF2B5EF4-FFF2-40B4-BE49-F238E27FC236}">
+                <a16:creationId xmlns:a16="http://schemas.microsoft.com/office/drawing/2014/main" id="{80FC4152-76AA-3CA1-F91E-D321C80713E5}"/>
+              </a:ext>
+            </a:extLst>
+          </p:cNvPr>
+          <p:cNvSpPr/>
+          <p:nvPr/>
+        </p:nvSpPr>
+        <p:spPr>
+          <a:xfrm flipV="1">
+            <a:off x="4626173" y="5483322"/>
+            <a:ext cx="147176" cy="45719"/>
+          </a:xfrm>
+          <a:prstGeom prst="rightArrow">
+            <a:avLst/>
+          </a:prstGeom>
+          <a:solidFill>
+            <a:schemeClr val="accent6"/>
+          </a:solidFill>
+          <a:ln w="12700">
+            <a:solidFill>
+              <a:schemeClr val="accent6"/>
+            </a:solidFill>
+          </a:ln>
+        </p:spPr>
+        <p:style>
+          <a:lnRef idx="2">
+            <a:schemeClr val="accent1">
+              <a:shade val="50000"/>
+            </a:schemeClr>
+          </a:lnRef>
+          <a:fillRef idx="1">
+            <a:schemeClr val="accent1"/>
+          </a:fillRef>
+          <a:effectRef idx="0">
+            <a:schemeClr val="accent1"/>
+          </a:effectRef>
+          <a:fontRef idx="minor">
+            <a:schemeClr val="lt1"/>
+          </a:fontRef>
+        </p:style>
+        <p:txBody>
+          <a:bodyPr rtlCol="0" anchor="ctr"/>
+          <a:lstStyle/>
+          <a:p>
+            <a:pPr algn="ctr"/>
+            <a:endParaRPr lang="de-DE"/>
+          </a:p>
+        </p:txBody>
+      </p:sp>
+      <p:sp>
+        <p:nvSpPr>
+          <p:cNvPr id="144" name="Pfeil nach rechts 143">
+            <a:extLst>
+              <a:ext uri="{FF2B5EF4-FFF2-40B4-BE49-F238E27FC236}">
+                <a16:creationId xmlns:a16="http://schemas.microsoft.com/office/drawing/2014/main" id="{9C7FCB2F-E2D6-953E-3050-517FEB4BD83B}"/>
+              </a:ext>
+            </a:extLst>
+          </p:cNvPr>
+          <p:cNvSpPr/>
+          <p:nvPr/>
+        </p:nvSpPr>
+        <p:spPr>
+          <a:xfrm flipV="1">
+            <a:off x="4612274" y="6036473"/>
+            <a:ext cx="147176" cy="45719"/>
+          </a:xfrm>
+          <a:prstGeom prst="rightArrow">
+            <a:avLst/>
+          </a:prstGeom>
+          <a:solidFill>
+            <a:schemeClr val="accent6"/>
+          </a:solidFill>
+          <a:ln w="12700">
+            <a:solidFill>
+              <a:schemeClr val="accent6"/>
+            </a:solidFill>
+          </a:ln>
+        </p:spPr>
+        <p:style>
+          <a:lnRef idx="2">
+            <a:schemeClr val="accent1">
+              <a:shade val="50000"/>
+            </a:schemeClr>
+          </a:lnRef>
+          <a:fillRef idx="1">
+            <a:schemeClr val="accent1"/>
+          </a:fillRef>
+          <a:effectRef idx="0">
+            <a:schemeClr val="accent1"/>
+          </a:effectRef>
+          <a:fontRef idx="minor">
+            <a:schemeClr val="lt1"/>
+          </a:fontRef>
+        </p:style>
+        <p:txBody>
+          <a:bodyPr rtlCol="0" anchor="ctr"/>
+          <a:lstStyle/>
+          <a:p>
+            <a:pPr algn="ctr"/>
+            <a:endParaRPr lang="de-DE"/>
+          </a:p>
+        </p:txBody>
+      </p:sp>
+      <p:sp>
+        <p:nvSpPr>
+          <p:cNvPr id="145" name="Pfeil nach rechts 144">
+            <a:extLst>
+              <a:ext uri="{FF2B5EF4-FFF2-40B4-BE49-F238E27FC236}">
+                <a16:creationId xmlns:a16="http://schemas.microsoft.com/office/drawing/2014/main" id="{12DFCB10-5398-E70A-C768-A8911AD523B4}"/>
+              </a:ext>
+            </a:extLst>
+          </p:cNvPr>
+          <p:cNvSpPr/>
+          <p:nvPr/>
+        </p:nvSpPr>
+        <p:spPr>
+          <a:xfrm flipV="1">
+            <a:off x="6901852" y="5483322"/>
+            <a:ext cx="147176" cy="45719"/>
+          </a:xfrm>
+          <a:prstGeom prst="rightArrow">
+            <a:avLst/>
+          </a:prstGeom>
+          <a:solidFill>
+            <a:schemeClr val="accent6"/>
+          </a:solidFill>
+          <a:ln w="12700">
+            <a:solidFill>
+              <a:schemeClr val="accent6"/>
+            </a:solidFill>
+          </a:ln>
+        </p:spPr>
+        <p:style>
+          <a:lnRef idx="2">
+            <a:schemeClr val="accent1">
+              <a:shade val="50000"/>
+            </a:schemeClr>
+          </a:lnRef>
+          <a:fillRef idx="1">
+            <a:schemeClr val="accent1"/>
+          </a:fillRef>
+          <a:effectRef idx="0">
+            <a:schemeClr val="accent1"/>
+          </a:effectRef>
+          <a:fontRef idx="minor">
+            <a:schemeClr val="lt1"/>
+          </a:fontRef>
+        </p:style>
+        <p:txBody>
+          <a:bodyPr rtlCol="0" anchor="ctr"/>
+          <a:lstStyle/>
+          <a:p>
+            <a:pPr algn="ctr"/>
+            <a:endParaRPr lang="de-DE"/>
+          </a:p>
+        </p:txBody>
+      </p:sp>
+      <p:sp>
+        <p:nvSpPr>
+          <p:cNvPr id="146" name="Pfeil nach rechts 145">
+            <a:extLst>
+              <a:ext uri="{FF2B5EF4-FFF2-40B4-BE49-F238E27FC236}">
+                <a16:creationId xmlns:a16="http://schemas.microsoft.com/office/drawing/2014/main" id="{8416DA46-1A33-CCC0-88CE-E3E15A47A557}"/>
+              </a:ext>
+            </a:extLst>
+          </p:cNvPr>
+          <p:cNvSpPr/>
+          <p:nvPr/>
+        </p:nvSpPr>
+        <p:spPr>
+          <a:xfrm flipV="1">
+            <a:off x="6875695" y="6039220"/>
+            <a:ext cx="147176" cy="45719"/>
+          </a:xfrm>
+          <a:prstGeom prst="rightArrow">
+            <a:avLst/>
+          </a:prstGeom>
+          <a:solidFill>
+            <a:schemeClr val="accent6"/>
+          </a:solidFill>
+          <a:ln w="12700">
+            <a:solidFill>
+              <a:schemeClr val="accent6"/>
+            </a:solidFill>
+          </a:ln>
+        </p:spPr>
+        <p:style>
+          <a:lnRef idx="2">
+            <a:schemeClr val="accent1">
+              <a:shade val="50000"/>
+            </a:schemeClr>
+          </a:lnRef>
+          <a:fillRef idx="1">
+            <a:schemeClr val="accent1"/>
+          </a:fillRef>
+          <a:effectRef idx="0">
+            <a:schemeClr val="accent1"/>
+          </a:effectRef>
+          <a:fontRef idx="minor">
+            <a:schemeClr val="lt1"/>
+          </a:fontRef>
+        </p:style>
+        <p:txBody>
+          <a:bodyPr rtlCol="0" anchor="ctr"/>
+          <a:lstStyle/>
+          <a:p>
+            <a:pPr algn="ctr"/>
+            <a:endParaRPr lang="de-DE"/>
+          </a:p>
+        </p:txBody>
+      </p:sp>
+      <p:sp>
+        <p:nvSpPr>
+          <p:cNvPr id="147" name="Pfeil nach rechts 146">
+            <a:extLst>
+              <a:ext uri="{FF2B5EF4-FFF2-40B4-BE49-F238E27FC236}">
+                <a16:creationId xmlns:a16="http://schemas.microsoft.com/office/drawing/2014/main" id="{6D3497EB-EF2C-43B0-7F39-0D56BB0A6E38}"/>
+              </a:ext>
+            </a:extLst>
+          </p:cNvPr>
+          <p:cNvSpPr/>
+          <p:nvPr/>
+        </p:nvSpPr>
+        <p:spPr>
+          <a:xfrm flipV="1">
+            <a:off x="9074679" y="6062079"/>
+            <a:ext cx="147176" cy="45719"/>
+          </a:xfrm>
+          <a:prstGeom prst="rightArrow">
+            <a:avLst/>
+          </a:prstGeom>
+          <a:solidFill>
+            <a:schemeClr val="accent6"/>
+          </a:solidFill>
+          <a:ln w="12700">
+            <a:solidFill>
+              <a:schemeClr val="accent6"/>
+            </a:solidFill>
+          </a:ln>
+        </p:spPr>
+        <p:style>
+          <a:lnRef idx="2">
+            <a:schemeClr val="accent1">
+              <a:shade val="50000"/>
+            </a:schemeClr>
+          </a:lnRef>
+          <a:fillRef idx="1">
+            <a:schemeClr val="accent1"/>
+          </a:fillRef>
+          <a:effectRef idx="0">
+            <a:schemeClr val="accent1"/>
+          </a:effectRef>
+          <a:fontRef idx="minor">
+            <a:schemeClr val="lt1"/>
+          </a:fontRef>
+        </p:style>
+        <p:txBody>
+          <a:bodyPr rtlCol="0" anchor="ctr"/>
+          <a:lstStyle/>
+          <a:p>
+            <a:pPr algn="ctr"/>
+            <a:endParaRPr lang="de-DE"/>
+          </a:p>
+        </p:txBody>
+      </p:sp>
+      <p:sp>
+        <p:nvSpPr>
+          <p:cNvPr id="149" name="Pfeil nach rechts 148">
+            <a:extLst>
+              <a:ext uri="{FF2B5EF4-FFF2-40B4-BE49-F238E27FC236}">
+                <a16:creationId xmlns:a16="http://schemas.microsoft.com/office/drawing/2014/main" id="{33AF34F3-BDEC-4EEF-D365-91DE3D911007}"/>
+              </a:ext>
+            </a:extLst>
+          </p:cNvPr>
+          <p:cNvSpPr/>
+          <p:nvPr/>
+        </p:nvSpPr>
+        <p:spPr>
+          <a:xfrm flipV="1">
+            <a:off x="8151217" y="5483749"/>
+            <a:ext cx="147176" cy="45719"/>
+          </a:xfrm>
+          <a:prstGeom prst="rightArrow">
+            <a:avLst/>
+          </a:prstGeom>
+          <a:solidFill>
+            <a:schemeClr val="accent6"/>
+          </a:solidFill>
+          <a:ln w="12700">
+            <a:solidFill>
+              <a:schemeClr val="accent6"/>
+            </a:solidFill>
+          </a:ln>
+        </p:spPr>
+        <p:style>
+          <a:lnRef idx="2">
+            <a:schemeClr val="accent1">
+              <a:shade val="50000"/>
+            </a:schemeClr>
+          </a:lnRef>
+          <a:fillRef idx="1">
+            <a:schemeClr val="accent1"/>
+          </a:fillRef>
+          <a:effectRef idx="0">
+            <a:schemeClr val="accent1"/>
+          </a:effectRef>
+          <a:fontRef idx="minor">
+            <a:schemeClr val="lt1"/>
+          </a:fontRef>
+        </p:style>
+        <p:txBody>
+          <a:bodyPr rtlCol="0" anchor="ctr"/>
+          <a:lstStyle/>
+          <a:p>
+            <a:pPr algn="ctr"/>
+            <a:endParaRPr lang="de-DE"/>
+          </a:p>
+        </p:txBody>
+      </p:sp>
+      <p:sp>
+        <p:nvSpPr>
+          <p:cNvPr id="150" name="Pfeil nach rechts 149">
+            <a:extLst>
+              <a:ext uri="{FF2B5EF4-FFF2-40B4-BE49-F238E27FC236}">
+                <a16:creationId xmlns:a16="http://schemas.microsoft.com/office/drawing/2014/main" id="{B054814F-25AE-C07A-CDBF-007C67613A3F}"/>
+              </a:ext>
+            </a:extLst>
+          </p:cNvPr>
+          <p:cNvSpPr/>
+          <p:nvPr/>
+        </p:nvSpPr>
+        <p:spPr>
+          <a:xfrm flipV="1">
+            <a:off x="9065652" y="5489940"/>
+            <a:ext cx="147176" cy="45719"/>
+          </a:xfrm>
+          <a:prstGeom prst="rightArrow">
+            <a:avLst/>
+          </a:prstGeom>
+          <a:solidFill>
+            <a:schemeClr val="accent6"/>
+          </a:solidFill>
+          <a:ln w="12700">
+            <a:solidFill>
+              <a:schemeClr val="accent6"/>
+            </a:solidFill>
+          </a:ln>
+        </p:spPr>
+        <p:style>
+          <a:lnRef idx="2">
+            <a:schemeClr val="accent1">
+              <a:shade val="50000"/>
+            </a:schemeClr>
+          </a:lnRef>
+          <a:fillRef idx="1">
+            <a:schemeClr val="accent1"/>
+          </a:fillRef>
+          <a:effectRef idx="0">
+            <a:schemeClr val="accent1"/>
+          </a:effectRef>
+          <a:fontRef idx="minor">
+            <a:schemeClr val="lt1"/>
+          </a:fontRef>
+        </p:style>
+        <p:txBody>
+          <a:bodyPr rtlCol="0" anchor="ctr"/>
+          <a:lstStyle/>
+          <a:p>
+            <a:pPr algn="ctr"/>
+            <a:endParaRPr lang="de-DE"/>
+          </a:p>
+        </p:txBody>
+      </p:sp>
+      <p:sp>
+        <p:nvSpPr>
+          <p:cNvPr id="151" name="Pfeil nach rechts 150">
+            <a:extLst>
+              <a:ext uri="{FF2B5EF4-FFF2-40B4-BE49-F238E27FC236}">
+                <a16:creationId xmlns:a16="http://schemas.microsoft.com/office/drawing/2014/main" id="{8254B71F-14A8-D828-820F-DBBB3E477162}"/>
+              </a:ext>
+            </a:extLst>
+          </p:cNvPr>
+          <p:cNvSpPr/>
+          <p:nvPr/>
+        </p:nvSpPr>
+        <p:spPr>
+          <a:xfrm flipV="1">
+            <a:off x="9513654" y="4894894"/>
+            <a:ext cx="147176" cy="45719"/>
+          </a:xfrm>
+          <a:prstGeom prst="rightArrow">
+            <a:avLst/>
+          </a:prstGeom>
+          <a:solidFill>
+            <a:schemeClr val="tx1">
+              <a:lumMod val="75000"/>
+              <a:lumOff val="25000"/>
+            </a:schemeClr>
+          </a:solidFill>
+          <a:ln w="12700">
+            <a:solidFill>
+              <a:schemeClr val="tx1">
+                <a:lumMod val="75000"/>
+                <a:lumOff val="25000"/>
+              </a:schemeClr>
+            </a:solidFill>
+          </a:ln>
+        </p:spPr>
+        <p:style>
+          <a:lnRef idx="2">
+            <a:schemeClr val="accent1">
+              <a:shade val="50000"/>
+            </a:schemeClr>
+          </a:lnRef>
+          <a:fillRef idx="1">
+            <a:schemeClr val="accent1"/>
+          </a:fillRef>
+          <a:effectRef idx="0">
+            <a:schemeClr val="accent1"/>
+          </a:effectRef>
+          <a:fontRef idx="minor">
+            <a:schemeClr val="lt1"/>
+          </a:fontRef>
+        </p:style>
+        <p:txBody>
+          <a:bodyPr rtlCol="0" anchor="ctr"/>
+          <a:lstStyle/>
+          <a:p>
+            <a:pPr algn="ctr"/>
+            <a:endParaRPr lang="de-DE"/>
+          </a:p>
+        </p:txBody>
+      </p:sp>
+      <p:sp>
+        <p:nvSpPr>
+          <p:cNvPr id="152" name="Pfeil nach rechts 151">
+            <a:extLst>
+              <a:ext uri="{FF2B5EF4-FFF2-40B4-BE49-F238E27FC236}">
+                <a16:creationId xmlns:a16="http://schemas.microsoft.com/office/drawing/2014/main" id="{4933C6E7-FDBA-6C8A-8AF2-A15565F469C3}"/>
+              </a:ext>
+            </a:extLst>
+          </p:cNvPr>
+          <p:cNvSpPr/>
+          <p:nvPr/>
+        </p:nvSpPr>
+        <p:spPr>
+          <a:xfrm flipV="1">
+            <a:off x="9503141" y="5483322"/>
+            <a:ext cx="147176" cy="45719"/>
+          </a:xfrm>
+          <a:prstGeom prst="rightArrow">
+            <a:avLst/>
+          </a:prstGeom>
+          <a:solidFill>
+            <a:schemeClr val="tx1">
+              <a:lumMod val="75000"/>
+              <a:lumOff val="25000"/>
+            </a:schemeClr>
+          </a:solidFill>
+          <a:ln w="12700">
+            <a:solidFill>
+              <a:schemeClr val="tx1">
+                <a:lumMod val="75000"/>
+                <a:lumOff val="25000"/>
+              </a:schemeClr>
+            </a:solidFill>
+          </a:ln>
+        </p:spPr>
+        <p:style>
+          <a:lnRef idx="2">
+            <a:schemeClr val="accent1">
+              <a:shade val="50000"/>
+            </a:schemeClr>
+          </a:lnRef>
+          <a:fillRef idx="1">
+            <a:schemeClr val="accent1"/>
+          </a:fillRef>
+          <a:effectRef idx="0">
+            <a:schemeClr val="accent1"/>
+          </a:effectRef>
+          <a:fontRef idx="minor">
+            <a:schemeClr val="lt1"/>
+          </a:fontRef>
+        </p:style>
+        <p:txBody>
+          <a:bodyPr rtlCol="0" anchor="ctr"/>
+          <a:lstStyle/>
+          <a:p>
+            <a:pPr algn="ctr"/>
+            <a:endParaRPr lang="de-DE"/>
+          </a:p>
+        </p:txBody>
+      </p:sp>
+      <p:sp>
+        <p:nvSpPr>
+          <p:cNvPr id="153" name="Pfeil nach rechts 152">
+            <a:extLst>
+              <a:ext uri="{FF2B5EF4-FFF2-40B4-BE49-F238E27FC236}">
+                <a16:creationId xmlns:a16="http://schemas.microsoft.com/office/drawing/2014/main" id="{E8B4D8E9-42D3-C503-25E8-DA65EB411F67}"/>
+              </a:ext>
+            </a:extLst>
+          </p:cNvPr>
+          <p:cNvSpPr/>
+          <p:nvPr/>
+        </p:nvSpPr>
+        <p:spPr>
+          <a:xfrm flipV="1">
+            <a:off x="9493200" y="6062800"/>
+            <a:ext cx="147176" cy="45719"/>
+          </a:xfrm>
+          <a:prstGeom prst="rightArrow">
+            <a:avLst/>
+          </a:prstGeom>
+          <a:solidFill>
+            <a:schemeClr val="tx1">
+              <a:lumMod val="75000"/>
+              <a:lumOff val="25000"/>
+            </a:schemeClr>
+          </a:solidFill>
+          <a:ln w="12700">
+            <a:solidFill>
+              <a:schemeClr val="tx1">
+                <a:lumMod val="75000"/>
+                <a:lumOff val="25000"/>
+              </a:schemeClr>
+            </a:solidFill>
+          </a:ln>
+        </p:spPr>
+        <p:style>
+          <a:lnRef idx="2">
+            <a:schemeClr val="accent1">
+              <a:shade val="50000"/>
+            </a:schemeClr>
+          </a:lnRef>
+          <a:fillRef idx="1">
+            <a:schemeClr val="accent1"/>
+          </a:fillRef>
+          <a:effectRef idx="0">
+            <a:schemeClr val="accent1"/>
+          </a:effectRef>
+          <a:fontRef idx="minor">
+            <a:schemeClr val="lt1"/>
+          </a:fontRef>
+        </p:style>
+        <p:txBody>
+          <a:bodyPr rtlCol="0" anchor="ctr"/>
+          <a:lstStyle/>
+          <a:p>
+            <a:pPr algn="ctr"/>
+            <a:endParaRPr lang="de-DE"/>
+          </a:p>
+        </p:txBody>
+      </p:sp>
+      <p:sp>
+        <p:nvSpPr>
+          <p:cNvPr id="154" name="Pfeil nach rechts 153">
+            <a:extLst>
+              <a:ext uri="{FF2B5EF4-FFF2-40B4-BE49-F238E27FC236}">
+                <a16:creationId xmlns:a16="http://schemas.microsoft.com/office/drawing/2014/main" id="{8B88268E-75DC-2204-1172-B7BF71C876EB}"/>
+              </a:ext>
+            </a:extLst>
+          </p:cNvPr>
+          <p:cNvSpPr/>
+          <p:nvPr/>
+        </p:nvSpPr>
+        <p:spPr>
+          <a:xfrm flipV="1">
+            <a:off x="9301059" y="4900864"/>
+            <a:ext cx="118172" cy="45719"/>
+          </a:xfrm>
+          <a:prstGeom prst="rightArrow">
+            <a:avLst/>
+          </a:prstGeom>
+          <a:solidFill>
+            <a:schemeClr val="tx1">
+              <a:lumMod val="75000"/>
+              <a:lumOff val="25000"/>
+            </a:schemeClr>
+          </a:solidFill>
+          <a:ln w="12700">
+            <a:solidFill>
+              <a:schemeClr val="tx1">
+                <a:lumMod val="75000"/>
+                <a:lumOff val="25000"/>
+              </a:schemeClr>
+            </a:solidFill>
+          </a:ln>
+        </p:spPr>
+        <p:style>
+          <a:lnRef idx="2">
+            <a:schemeClr val="accent1">
+              <a:shade val="50000"/>
+            </a:schemeClr>
+          </a:lnRef>
+          <a:fillRef idx="1">
+            <a:schemeClr val="accent1"/>
+          </a:fillRef>
+          <a:effectRef idx="0">
+            <a:schemeClr val="accent1"/>
+          </a:effectRef>
+          <a:fontRef idx="minor">
+            <a:schemeClr val="lt1"/>
+          </a:fontRef>
+        </p:style>
+        <p:txBody>
+          <a:bodyPr rtlCol="0" anchor="ctr"/>
+          <a:lstStyle/>
+          <a:p>
+            <a:pPr algn="ctr"/>
+            <a:endParaRPr lang="de-DE"/>
+          </a:p>
+        </p:txBody>
+      </p:sp>
+      <p:sp>
+        <p:nvSpPr>
+          <p:cNvPr id="155" name="Pfeil nach rechts 154">
+            <a:extLst>
+              <a:ext uri="{FF2B5EF4-FFF2-40B4-BE49-F238E27FC236}">
+                <a16:creationId xmlns:a16="http://schemas.microsoft.com/office/drawing/2014/main" id="{EA2929DA-0F30-F3C2-D75B-BF466E046962}"/>
+              </a:ext>
+            </a:extLst>
+          </p:cNvPr>
+          <p:cNvSpPr/>
+          <p:nvPr/>
+        </p:nvSpPr>
+        <p:spPr>
+          <a:xfrm flipV="1">
+            <a:off x="9294427" y="5483026"/>
+            <a:ext cx="118172" cy="45719"/>
+          </a:xfrm>
+          <a:prstGeom prst="rightArrow">
+            <a:avLst/>
+          </a:prstGeom>
+          <a:solidFill>
+            <a:schemeClr val="tx1">
+              <a:lumMod val="75000"/>
+              <a:lumOff val="25000"/>
+            </a:schemeClr>
+          </a:solidFill>
+          <a:ln w="12700">
+            <a:solidFill>
+              <a:schemeClr val="tx1">
+                <a:lumMod val="75000"/>
+                <a:lumOff val="25000"/>
+              </a:schemeClr>
+            </a:solidFill>
+          </a:ln>
+        </p:spPr>
+        <p:style>
+          <a:lnRef idx="2">
+            <a:schemeClr val="accent1">
+              <a:shade val="50000"/>
+            </a:schemeClr>
+          </a:lnRef>
+          <a:fillRef idx="1">
+            <a:schemeClr val="accent1"/>
+          </a:fillRef>
+          <a:effectRef idx="0">
+            <a:schemeClr val="accent1"/>
+          </a:effectRef>
+          <a:fontRef idx="minor">
+            <a:schemeClr val="lt1"/>
+          </a:fontRef>
+        </p:style>
+        <p:txBody>
+          <a:bodyPr rtlCol="0" anchor="ctr"/>
+          <a:lstStyle/>
+          <a:p>
+            <a:pPr algn="ctr"/>
+            <a:endParaRPr lang="de-DE"/>
+          </a:p>
+        </p:txBody>
+      </p:sp>
+      <p:sp>
+        <p:nvSpPr>
+          <p:cNvPr id="157" name="Pfeil nach rechts 156">
+            <a:extLst>
+              <a:ext uri="{FF2B5EF4-FFF2-40B4-BE49-F238E27FC236}">
+                <a16:creationId xmlns:a16="http://schemas.microsoft.com/office/drawing/2014/main" id="{BABD3194-BA3E-F018-C6E8-43BBA1750F2B}"/>
+              </a:ext>
+            </a:extLst>
+          </p:cNvPr>
+          <p:cNvSpPr/>
+          <p:nvPr/>
+        </p:nvSpPr>
+        <p:spPr>
+          <a:xfrm flipV="1">
+            <a:off x="9309875" y="6063669"/>
+            <a:ext cx="118172" cy="45719"/>
+          </a:xfrm>
+          <a:prstGeom prst="rightArrow">
+            <a:avLst/>
+          </a:prstGeom>
+          <a:solidFill>
+            <a:schemeClr val="tx1">
+              <a:lumMod val="75000"/>
+              <a:lumOff val="25000"/>
+            </a:schemeClr>
+          </a:solidFill>
+          <a:ln w="12700">
+            <a:solidFill>
+              <a:schemeClr val="tx1">
+                <a:lumMod val="75000"/>
+                <a:lumOff val="25000"/>
+              </a:schemeClr>
+            </a:solidFill>
+          </a:ln>
+        </p:spPr>
+        <p:style>
+          <a:lnRef idx="2">
+            <a:schemeClr val="accent1">
+              <a:shade val="50000"/>
+            </a:schemeClr>
+          </a:lnRef>
+          <a:fillRef idx="1">
+            <a:schemeClr val="accent1"/>
+          </a:fillRef>
+          <a:effectRef idx="0">
+            <a:schemeClr val="accent1"/>
+          </a:effectRef>
+          <a:fontRef idx="minor">
+            <a:schemeClr val="lt1"/>
+          </a:fontRef>
+        </p:style>
+        <p:txBody>
+          <a:bodyPr rtlCol="0" anchor="ctr"/>
+          <a:lstStyle/>
+          <a:p>
+            <a:pPr algn="ctr"/>
+            <a:endParaRPr lang="de-DE"/>
+          </a:p>
+        </p:txBody>
+      </p:sp>
+      <p:cxnSp>
+        <p:nvCxnSpPr>
+          <p:cNvPr id="159" name="Gekrümmte Verbindung 158">
+            <a:extLst>
+              <a:ext uri="{FF2B5EF4-FFF2-40B4-BE49-F238E27FC236}">
+                <a16:creationId xmlns:a16="http://schemas.microsoft.com/office/drawing/2014/main" id="{E2660D09-9EC8-D06C-CD68-1BF0BC242DC7}"/>
+              </a:ext>
+            </a:extLst>
+          </p:cNvPr>
+          <p:cNvCxnSpPr>
+            <a:cxnSpLocks/>
+            <a:stCxn id="56" idx="0"/>
+            <a:endCxn id="42" idx="3"/>
+          </p:cNvCxnSpPr>
+          <p:nvPr/>
+        </p:nvCxnSpPr>
+        <p:spPr>
+          <a:xfrm rot="16200000" flipH="1" flipV="1">
+            <a:off x="6570141" y="1949172"/>
+            <a:ext cx="13095" cy="5463527"/>
+          </a:xfrm>
+          <a:prstGeom prst="curvedConnector3">
+            <a:avLst>
+              <a:gd name="adj1" fmla="val -1745704"/>
+            </a:avLst>
+          </a:prstGeom>
+          <a:ln>
+            <a:solidFill>
+              <a:schemeClr val="accent6"/>
+            </a:solidFill>
+            <a:tailEnd type="triangle"/>
+          </a:ln>
+        </p:spPr>
+        <p:style>
+          <a:lnRef idx="1">
+            <a:schemeClr val="accent1"/>
+          </a:lnRef>
+          <a:fillRef idx="0">
+            <a:schemeClr val="accent1"/>
+          </a:fillRef>
+          <a:effectRef idx="0">
+            <a:schemeClr val="accent1"/>
+          </a:effectRef>
+          <a:fontRef idx="minor">
+            <a:schemeClr val="tx1"/>
+          </a:fontRef>
+        </p:style>
+      </p:cxnSp>
+      <p:cxnSp>
+        <p:nvCxnSpPr>
+          <p:cNvPr id="162" name="Gekrümmte Verbindung 161">
+            <a:extLst>
+              <a:ext uri="{FF2B5EF4-FFF2-40B4-BE49-F238E27FC236}">
+                <a16:creationId xmlns:a16="http://schemas.microsoft.com/office/drawing/2014/main" id="{67D31C0A-BF9A-5B2A-B842-1B9BCF63DB16}"/>
+              </a:ext>
+            </a:extLst>
+          </p:cNvPr>
+          <p:cNvCxnSpPr>
+            <a:cxnSpLocks/>
+          </p:cNvCxnSpPr>
+          <p:nvPr/>
+        </p:nvCxnSpPr>
+        <p:spPr>
+          <a:xfrm rot="16200000" flipH="1" flipV="1">
+            <a:off x="6730273" y="1947948"/>
+            <a:ext cx="13095" cy="5468625"/>
+          </a:xfrm>
+          <a:prstGeom prst="curvedConnector3">
+            <a:avLst>
+              <a:gd name="adj1" fmla="val -1745704"/>
+            </a:avLst>
+          </a:prstGeom>
+          <a:ln>
+            <a:solidFill>
+              <a:schemeClr val="accent6"/>
+            </a:solidFill>
+            <a:tailEnd type="triangle"/>
+          </a:ln>
+        </p:spPr>
+        <p:style>
+          <a:lnRef idx="1">
+            <a:schemeClr val="accent1"/>
+          </a:lnRef>
+          <a:fillRef idx="0">
+            <a:schemeClr val="accent1"/>
+          </a:fillRef>
+          <a:effectRef idx="0">
+            <a:schemeClr val="accent1"/>
+          </a:effectRef>
+          <a:fontRef idx="minor">
+            <a:schemeClr val="tx1"/>
+          </a:fontRef>
+        </p:style>
+      </p:cxnSp>
+      <p:sp>
+        <p:nvSpPr>
+          <p:cNvPr id="165" name="Rechteck 164">
+            <a:extLst>
+              <a:ext uri="{FF2B5EF4-FFF2-40B4-BE49-F238E27FC236}">
+                <a16:creationId xmlns:a16="http://schemas.microsoft.com/office/drawing/2014/main" id="{CFF783D3-EE35-D34B-EB94-0477E3EA6E61}"/>
+              </a:ext>
+            </a:extLst>
+          </p:cNvPr>
+          <p:cNvSpPr/>
+          <p:nvPr/>
+        </p:nvSpPr>
+        <p:spPr>
+          <a:xfrm>
+            <a:off x="9463392" y="4675714"/>
+            <a:ext cx="74430" cy="1617866"/>
+          </a:xfrm>
+          <a:prstGeom prst="rect">
+            <a:avLst/>
+          </a:prstGeom>
+          <a:solidFill>
+            <a:schemeClr val="tx1">
+              <a:lumMod val="75000"/>
+              <a:lumOff val="25000"/>
+            </a:schemeClr>
+          </a:solidFill>
+          <a:ln>
+            <a:noFill/>
+          </a:ln>
+        </p:spPr>
+        <p:style>
+          <a:lnRef idx="2">
+            <a:schemeClr val="accent1">
+              <a:shade val="50000"/>
+            </a:schemeClr>
+          </a:lnRef>
+          <a:fillRef idx="1">
+            <a:schemeClr val="accent1"/>
+          </a:fillRef>
+          <a:effectRef idx="0">
+            <a:schemeClr val="accent1"/>
+          </a:effectRef>
+          <a:fontRef idx="minor">
+            <a:schemeClr val="lt1"/>
+          </a:fontRef>
+        </p:style>
+        <p:txBody>
+          <a:bodyPr rtlCol="0" anchor="ctr"/>
+          <a:lstStyle/>
+          <a:p>
+            <a:pPr algn="ctr"/>
             <a:endParaRPr lang="de-DE" dirty="0"/>
+          </a:p>
+        </p:txBody>
+      </p:sp>
+      <p:cxnSp>
+        <p:nvCxnSpPr>
+          <p:cNvPr id="166" name="Gekrümmte Verbindung 165">
+            <a:extLst>
+              <a:ext uri="{FF2B5EF4-FFF2-40B4-BE49-F238E27FC236}">
+                <a16:creationId xmlns:a16="http://schemas.microsoft.com/office/drawing/2014/main" id="{9FE2A01A-55A1-43C6-A3ED-CC2388B30C83}"/>
+              </a:ext>
+            </a:extLst>
+          </p:cNvPr>
+          <p:cNvCxnSpPr>
+            <a:cxnSpLocks/>
+            <a:stCxn id="46" idx="1"/>
+            <a:endCxn id="165" idx="2"/>
+          </p:cNvCxnSpPr>
+          <p:nvPr/>
+        </p:nvCxnSpPr>
+        <p:spPr>
+          <a:xfrm rot="16200000" flipH="1">
+            <a:off x="6657471" y="3450444"/>
+            <a:ext cx="22356" cy="5663915"/>
+          </a:xfrm>
+          <a:prstGeom prst="curvedConnector3">
+            <a:avLst>
+              <a:gd name="adj1" fmla="val 1122544"/>
+            </a:avLst>
+          </a:prstGeom>
+          <a:ln>
+            <a:solidFill>
+              <a:schemeClr val="accent6"/>
+            </a:solidFill>
+            <a:tailEnd type="triangle"/>
+          </a:ln>
+        </p:spPr>
+        <p:style>
+          <a:lnRef idx="1">
+            <a:schemeClr val="accent1"/>
+          </a:lnRef>
+          <a:fillRef idx="0">
+            <a:schemeClr val="accent1"/>
+          </a:fillRef>
+          <a:effectRef idx="0">
+            <a:schemeClr val="accent1"/>
+          </a:effectRef>
+          <a:fontRef idx="minor">
+            <a:schemeClr val="tx1"/>
+          </a:fontRef>
+        </p:style>
+      </p:cxnSp>
+      <p:cxnSp>
+        <p:nvCxnSpPr>
+          <p:cNvPr id="171" name="Gekrümmte Verbindung 170">
+            <a:extLst>
+              <a:ext uri="{FF2B5EF4-FFF2-40B4-BE49-F238E27FC236}">
+                <a16:creationId xmlns:a16="http://schemas.microsoft.com/office/drawing/2014/main" id="{CAACBF49-DC69-61C9-C65F-3598A4323E99}"/>
+              </a:ext>
+            </a:extLst>
+          </p:cNvPr>
+          <p:cNvCxnSpPr>
+            <a:cxnSpLocks/>
+          </p:cNvCxnSpPr>
+          <p:nvPr/>
+        </p:nvCxnSpPr>
+        <p:spPr>
+          <a:xfrm rot="16200000" flipH="1">
+            <a:off x="6465317" y="3452536"/>
+            <a:ext cx="22356" cy="5663915"/>
+          </a:xfrm>
+          <a:prstGeom prst="curvedConnector3">
+            <a:avLst>
+              <a:gd name="adj1" fmla="val 1122544"/>
+            </a:avLst>
+          </a:prstGeom>
+          <a:ln>
+            <a:solidFill>
+              <a:schemeClr val="accent6"/>
+            </a:solidFill>
+            <a:tailEnd type="triangle"/>
+          </a:ln>
+        </p:spPr>
+        <p:style>
+          <a:lnRef idx="1">
+            <a:schemeClr val="accent1"/>
+          </a:lnRef>
+          <a:fillRef idx="0">
+            <a:schemeClr val="accent1"/>
+          </a:fillRef>
+          <a:effectRef idx="0">
+            <a:schemeClr val="accent1"/>
+          </a:effectRef>
+          <a:fontRef idx="minor">
+            <a:schemeClr val="tx1"/>
+          </a:fontRef>
+        </p:style>
+      </p:cxnSp>
+      <p:sp>
+        <p:nvSpPr>
+          <p:cNvPr id="172" name="Pfeil nach rechts 171">
+            <a:extLst>
+              <a:ext uri="{FF2B5EF4-FFF2-40B4-BE49-F238E27FC236}">
+                <a16:creationId xmlns:a16="http://schemas.microsoft.com/office/drawing/2014/main" id="{8229B922-59AF-6781-BA52-4C0A62C4AD59}"/>
+              </a:ext>
+            </a:extLst>
+          </p:cNvPr>
+          <p:cNvSpPr/>
+          <p:nvPr/>
+        </p:nvSpPr>
+        <p:spPr>
+          <a:xfrm rot="5400000" flipV="1">
+            <a:off x="3794194" y="5118762"/>
+            <a:ext cx="147176" cy="45719"/>
+          </a:xfrm>
+          <a:prstGeom prst="rightArrow">
+            <a:avLst/>
+          </a:prstGeom>
+          <a:solidFill>
+            <a:schemeClr val="accent6"/>
+          </a:solidFill>
+          <a:ln w="12700">
+            <a:solidFill>
+              <a:schemeClr val="accent6"/>
+            </a:solidFill>
+          </a:ln>
+        </p:spPr>
+        <p:style>
+          <a:lnRef idx="2">
+            <a:schemeClr val="accent1">
+              <a:shade val="50000"/>
+            </a:schemeClr>
+          </a:lnRef>
+          <a:fillRef idx="1">
+            <a:schemeClr val="accent1"/>
+          </a:fillRef>
+          <a:effectRef idx="0">
+            <a:schemeClr val="accent1"/>
+          </a:effectRef>
+          <a:fontRef idx="minor">
+            <a:schemeClr val="lt1"/>
+          </a:fontRef>
+        </p:style>
+        <p:txBody>
+          <a:bodyPr rtlCol="0" anchor="ctr"/>
+          <a:lstStyle/>
+          <a:p>
+            <a:pPr algn="ctr"/>
+            <a:endParaRPr lang="de-DE"/>
+          </a:p>
+        </p:txBody>
+      </p:sp>
+      <p:sp>
+        <p:nvSpPr>
+          <p:cNvPr id="173" name="Pfeil nach rechts 172">
+            <a:extLst>
+              <a:ext uri="{FF2B5EF4-FFF2-40B4-BE49-F238E27FC236}">
+                <a16:creationId xmlns:a16="http://schemas.microsoft.com/office/drawing/2014/main" id="{F0A23A89-DC77-DEBC-7282-4B2947D7EFB0}"/>
+              </a:ext>
+            </a:extLst>
+          </p:cNvPr>
+          <p:cNvSpPr/>
+          <p:nvPr/>
+        </p:nvSpPr>
+        <p:spPr>
+          <a:xfrm rot="5400000" flipV="1">
+            <a:off x="3787237" y="5678871"/>
+            <a:ext cx="147176" cy="45719"/>
+          </a:xfrm>
+          <a:prstGeom prst="rightArrow">
+            <a:avLst/>
+          </a:prstGeom>
+          <a:solidFill>
+            <a:schemeClr val="accent6"/>
+          </a:solidFill>
+          <a:ln w="12700">
+            <a:solidFill>
+              <a:schemeClr val="accent6"/>
+            </a:solidFill>
+          </a:ln>
+        </p:spPr>
+        <p:style>
+          <a:lnRef idx="2">
+            <a:schemeClr val="accent1">
+              <a:shade val="50000"/>
+            </a:schemeClr>
+          </a:lnRef>
+          <a:fillRef idx="1">
+            <a:schemeClr val="accent1"/>
+          </a:fillRef>
+          <a:effectRef idx="0">
+            <a:schemeClr val="accent1"/>
+          </a:effectRef>
+          <a:fontRef idx="minor">
+            <a:schemeClr val="lt1"/>
+          </a:fontRef>
+        </p:style>
+        <p:txBody>
+          <a:bodyPr rtlCol="0" anchor="ctr"/>
+          <a:lstStyle/>
+          <a:p>
+            <a:pPr algn="ctr"/>
+            <a:endParaRPr lang="de-DE"/>
+          </a:p>
+        </p:txBody>
+      </p:sp>
+      <p:sp>
+        <p:nvSpPr>
+          <p:cNvPr id="174" name="Pfeil nach rechts 173">
+            <a:extLst>
+              <a:ext uri="{FF2B5EF4-FFF2-40B4-BE49-F238E27FC236}">
+                <a16:creationId xmlns:a16="http://schemas.microsoft.com/office/drawing/2014/main" id="{70C015C9-9030-5B11-D976-820C31968278}"/>
+              </a:ext>
+            </a:extLst>
+          </p:cNvPr>
+          <p:cNvSpPr/>
+          <p:nvPr/>
+        </p:nvSpPr>
+        <p:spPr>
+          <a:xfrm rot="16200000" flipV="1">
+            <a:off x="3906839" y="5239358"/>
+            <a:ext cx="147176" cy="45719"/>
+          </a:xfrm>
+          <a:prstGeom prst="rightArrow">
+            <a:avLst/>
+          </a:prstGeom>
+          <a:solidFill>
+            <a:schemeClr val="accent6"/>
+          </a:solidFill>
+          <a:ln w="12700">
+            <a:solidFill>
+              <a:schemeClr val="accent6"/>
+            </a:solidFill>
+          </a:ln>
+        </p:spPr>
+        <p:style>
+          <a:lnRef idx="2">
+            <a:schemeClr val="accent1">
+              <a:shade val="50000"/>
+            </a:schemeClr>
+          </a:lnRef>
+          <a:fillRef idx="1">
+            <a:schemeClr val="accent1"/>
+          </a:fillRef>
+          <a:effectRef idx="0">
+            <a:schemeClr val="accent1"/>
+          </a:effectRef>
+          <a:fontRef idx="minor">
+            <a:schemeClr val="lt1"/>
+          </a:fontRef>
+        </p:style>
+        <p:txBody>
+          <a:bodyPr rtlCol="0" anchor="ctr"/>
+          <a:lstStyle/>
+          <a:p>
+            <a:pPr algn="ctr"/>
+            <a:endParaRPr lang="de-DE"/>
+          </a:p>
+        </p:txBody>
+      </p:sp>
+      <p:sp>
+        <p:nvSpPr>
+          <p:cNvPr id="175" name="Pfeil nach rechts 174">
+            <a:extLst>
+              <a:ext uri="{FF2B5EF4-FFF2-40B4-BE49-F238E27FC236}">
+                <a16:creationId xmlns:a16="http://schemas.microsoft.com/office/drawing/2014/main" id="{3DADF268-D4E2-1559-39BA-05E3FED5DFC0}"/>
+              </a:ext>
+            </a:extLst>
+          </p:cNvPr>
+          <p:cNvSpPr/>
+          <p:nvPr/>
+        </p:nvSpPr>
+        <p:spPr>
+          <a:xfrm rot="16200000" flipV="1">
+            <a:off x="3906838" y="5791515"/>
+            <a:ext cx="147176" cy="45719"/>
+          </a:xfrm>
+          <a:prstGeom prst="rightArrow">
+            <a:avLst/>
+          </a:prstGeom>
+          <a:solidFill>
+            <a:schemeClr val="accent6"/>
+          </a:solidFill>
+          <a:ln w="12700">
+            <a:solidFill>
+              <a:schemeClr val="accent6"/>
+            </a:solidFill>
+          </a:ln>
+        </p:spPr>
+        <p:style>
+          <a:lnRef idx="2">
+            <a:schemeClr val="accent1">
+              <a:shade val="50000"/>
+            </a:schemeClr>
+          </a:lnRef>
+          <a:fillRef idx="1">
+            <a:schemeClr val="accent1"/>
+          </a:fillRef>
+          <a:effectRef idx="0">
+            <a:schemeClr val="accent1"/>
+          </a:effectRef>
+          <a:fontRef idx="minor">
+            <a:schemeClr val="lt1"/>
+          </a:fontRef>
+        </p:style>
+        <p:txBody>
+          <a:bodyPr rtlCol="0" anchor="ctr"/>
+          <a:lstStyle/>
+          <a:p>
+            <a:pPr algn="ctr"/>
+            <a:endParaRPr lang="de-DE"/>
           </a:p>
         </p:txBody>
       </p:sp>
@@ -7185,4 +10781,299 @@
     </a:ext>
   </a:extLst>
 </a:theme>
+</file>
+
+<file path=ppt/theme/theme2.xml><?xml version="1.0" encoding="utf-8"?>
+<a:theme xmlns:a="http://schemas.openxmlformats.org/drawingml/2006/main" name="Office">
+  <a:themeElements>
+    <a:clrScheme name="Office">
+      <a:dk1>
+        <a:sysClr val="windowText" lastClr="000000"/>
+      </a:dk1>
+      <a:lt1>
+        <a:sysClr val="window" lastClr="FFFFFF"/>
+      </a:lt1>
+      <a:dk2>
+        <a:srgbClr val="44546A"/>
+      </a:dk2>
+      <a:lt2>
+        <a:srgbClr val="E7E6E6"/>
+      </a:lt2>
+      <a:accent1>
+        <a:srgbClr val="4472C4"/>
+      </a:accent1>
+      <a:accent2>
+        <a:srgbClr val="ED7D31"/>
+      </a:accent2>
+      <a:accent3>
+        <a:srgbClr val="A5A5A5"/>
+      </a:accent3>
+      <a:accent4>
+        <a:srgbClr val="FFC000"/>
+      </a:accent4>
+      <a:accent5>
+        <a:srgbClr val="5B9BD5"/>
+      </a:accent5>
+      <a:accent6>
+        <a:srgbClr val="70AD47"/>
+      </a:accent6>
+      <a:hlink>
+        <a:srgbClr val="0563C1"/>
+      </a:hlink>
+      <a:folHlink>
+        <a:srgbClr val="954F72"/>
+      </a:folHlink>
+    </a:clrScheme>
+    <a:fontScheme name="Office">
+      <a:majorFont>
+        <a:latin typeface="Calibri Light" panose="020F0302020204030204"/>
+        <a:ea typeface=""/>
+        <a:cs typeface=""/>
+        <a:font script="Jpan" typeface="游ゴシック Light"/>
+        <a:font script="Hang" typeface="맑은 고딕"/>
+        <a:font script="Hans" typeface="等线 Light"/>
+        <a:font script="Hant" typeface="新細明體"/>
+        <a:font script="Arab" typeface="Times New Roman"/>
+        <a:font script="Hebr" typeface="Times New Roman"/>
+        <a:font script="Thai" typeface="Angsana New"/>
+        <a:font script="Ethi" typeface="Nyala"/>
+        <a:font script="Beng" typeface="Vrinda"/>
+        <a:font script="Gujr" typeface="Shruti"/>
+        <a:font script="Khmr" typeface="MoolBoran"/>
+        <a:font script="Knda" typeface="Tunga"/>
+        <a:font script="Guru" typeface="Raavi"/>
+        <a:font script="Cans" typeface="Euphemia"/>
+        <a:font script="Cher" typeface="Plantagenet Cherokee"/>
+        <a:font script="Yiii" typeface="Microsoft Yi Baiti"/>
+        <a:font script="Tibt" typeface="Microsoft Himalaya"/>
+        <a:font script="Thaa" typeface="MV Boli"/>
+        <a:font script="Deva" typeface="Mangal"/>
+        <a:font script="Telu" typeface="Gautami"/>
+        <a:font script="Taml" typeface="Latha"/>
+        <a:font script="Syrc" typeface="Estrangelo Edessa"/>
+        <a:font script="Orya" typeface="Kalinga"/>
+        <a:font script="Mlym" typeface="Kartika"/>
+        <a:font script="Laoo" typeface="DokChampa"/>
+        <a:font script="Sinh" typeface="Iskoola Pota"/>
+        <a:font script="Mong" typeface="Mongolian Baiti"/>
+        <a:font script="Viet" typeface="Times New Roman"/>
+        <a:font script="Uigh" typeface="Microsoft Uighur"/>
+        <a:font script="Geor" typeface="Sylfaen"/>
+        <a:font script="Armn" typeface="Arial"/>
+        <a:font script="Bugi" typeface="Leelawadee UI"/>
+        <a:font script="Bopo" typeface="Microsoft JhengHei"/>
+        <a:font script="Java" typeface="Javanese Text"/>
+        <a:font script="Lisu" typeface="Segoe UI"/>
+        <a:font script="Mymr" typeface="Myanmar Text"/>
+        <a:font script="Nkoo" typeface="Ebrima"/>
+        <a:font script="Olck" typeface="Nirmala UI"/>
+        <a:font script="Osma" typeface="Ebrima"/>
+        <a:font script="Phag" typeface="Phagspa"/>
+        <a:font script="Syrn" typeface="Estrangelo Edessa"/>
+        <a:font script="Syrj" typeface="Estrangelo Edessa"/>
+        <a:font script="Syre" typeface="Estrangelo Edessa"/>
+        <a:font script="Sora" typeface="Nirmala UI"/>
+        <a:font script="Tale" typeface="Microsoft Tai Le"/>
+        <a:font script="Talu" typeface="Microsoft New Tai Lue"/>
+        <a:font script="Tfng" typeface="Ebrima"/>
+      </a:majorFont>
+      <a:minorFont>
+        <a:latin typeface="Calibri" panose="020F0502020204030204"/>
+        <a:ea typeface=""/>
+        <a:cs typeface=""/>
+        <a:font script="Jpan" typeface="游ゴシック"/>
+        <a:font script="Hang" typeface="맑은 고딕"/>
+        <a:font script="Hans" typeface="等线"/>
+        <a:font script="Hant" typeface="新細明體"/>
+        <a:font script="Arab" typeface="Arial"/>
+        <a:font script="Hebr" typeface="Arial"/>
+        <a:font script="Thai" typeface="Cordia New"/>
+        <a:font script="Ethi" typeface="Nyala"/>
+        <a:font script="Beng" typeface="Vrinda"/>
+        <a:font script="Gujr" typeface="Shruti"/>
+        <a:font script="Khmr" typeface="DaunPenh"/>
+        <a:font script="Knda" typeface="Tunga"/>
+        <a:font script="Guru" typeface="Raavi"/>
+        <a:font script="Cans" typeface="Euphemia"/>
+        <a:font script="Cher" typeface="Plantagenet Cherokee"/>
+        <a:font script="Yiii" typeface="Microsoft Yi Baiti"/>
+        <a:font script="Tibt" typeface="Microsoft Himalaya"/>
+        <a:font script="Thaa" typeface="MV Boli"/>
+        <a:font script="Deva" typeface="Mangal"/>
+        <a:font script="Telu" typeface="Gautami"/>
+        <a:font script="Taml" typeface="Latha"/>
+        <a:font script="Syrc" typeface="Estrangelo Edessa"/>
+        <a:font script="Orya" typeface="Kalinga"/>
+        <a:font script="Mlym" typeface="Kartika"/>
+        <a:font script="Laoo" typeface="DokChampa"/>
+        <a:font script="Sinh" typeface="Iskoola Pota"/>
+        <a:font script="Mong" typeface="Mongolian Baiti"/>
+        <a:font script="Viet" typeface="Arial"/>
+        <a:font script="Uigh" typeface="Microsoft Uighur"/>
+        <a:font script="Geor" typeface="Sylfaen"/>
+        <a:font script="Armn" typeface="Arial"/>
+        <a:font script="Bugi" typeface="Leelawadee UI"/>
+        <a:font script="Bopo" typeface="Microsoft JhengHei"/>
+        <a:font script="Java" typeface="Javanese Text"/>
+        <a:font script="Lisu" typeface="Segoe UI"/>
+        <a:font script="Mymr" typeface="Myanmar Text"/>
+        <a:font script="Nkoo" typeface="Ebrima"/>
+        <a:font script="Olck" typeface="Nirmala UI"/>
+        <a:font script="Osma" typeface="Ebrima"/>
+        <a:font script="Phag" typeface="Phagspa"/>
+        <a:font script="Syrn" typeface="Estrangelo Edessa"/>
+        <a:font script="Syrj" typeface="Estrangelo Edessa"/>
+        <a:font script="Syre" typeface="Estrangelo Edessa"/>
+        <a:font script="Sora" typeface="Nirmala UI"/>
+        <a:font script="Tale" typeface="Microsoft Tai Le"/>
+        <a:font script="Talu" typeface="Microsoft New Tai Lue"/>
+        <a:font script="Tfng" typeface="Ebrima"/>
+      </a:minorFont>
+    </a:fontScheme>
+    <a:fmtScheme name="Office">
+      <a:fillStyleLst>
+        <a:solidFill>
+          <a:schemeClr val="phClr"/>
+        </a:solidFill>
+        <a:gradFill rotWithShape="1">
+          <a:gsLst>
+            <a:gs pos="0">
+              <a:schemeClr val="phClr">
+                <a:lumMod val="110000"/>
+                <a:satMod val="105000"/>
+                <a:tint val="67000"/>
+              </a:schemeClr>
+            </a:gs>
+            <a:gs pos="50000">
+              <a:schemeClr val="phClr">
+                <a:lumMod val="105000"/>
+                <a:satMod val="103000"/>
+                <a:tint val="73000"/>
+              </a:schemeClr>
+            </a:gs>
+            <a:gs pos="100000">
+              <a:schemeClr val="phClr">
+                <a:lumMod val="105000"/>
+                <a:satMod val="109000"/>
+                <a:tint val="81000"/>
+              </a:schemeClr>
+            </a:gs>
+          </a:gsLst>
+          <a:lin ang="5400000" scaled="0"/>
+        </a:gradFill>
+        <a:gradFill rotWithShape="1">
+          <a:gsLst>
+            <a:gs pos="0">
+              <a:schemeClr val="phClr">
+                <a:satMod val="103000"/>
+                <a:lumMod val="102000"/>
+                <a:tint val="94000"/>
+              </a:schemeClr>
+            </a:gs>
+            <a:gs pos="50000">
+              <a:schemeClr val="phClr">
+                <a:satMod val="110000"/>
+                <a:lumMod val="100000"/>
+                <a:shade val="100000"/>
+              </a:schemeClr>
+            </a:gs>
+            <a:gs pos="100000">
+              <a:schemeClr val="phClr">
+                <a:lumMod val="99000"/>
+                <a:satMod val="120000"/>
+                <a:shade val="78000"/>
+              </a:schemeClr>
+            </a:gs>
+          </a:gsLst>
+          <a:lin ang="5400000" scaled="0"/>
+        </a:gradFill>
+      </a:fillStyleLst>
+      <a:lnStyleLst>
+        <a:ln w="6350" cap="flat" cmpd="sng" algn="ctr">
+          <a:solidFill>
+            <a:schemeClr val="phClr"/>
+          </a:solidFill>
+          <a:prstDash val="solid"/>
+          <a:miter lim="800000"/>
+        </a:ln>
+        <a:ln w="12700" cap="flat" cmpd="sng" algn="ctr">
+          <a:solidFill>
+            <a:schemeClr val="phClr"/>
+          </a:solidFill>
+          <a:prstDash val="solid"/>
+          <a:miter lim="800000"/>
+        </a:ln>
+        <a:ln w="19050" cap="flat" cmpd="sng" algn="ctr">
+          <a:solidFill>
+            <a:schemeClr val="phClr"/>
+          </a:solidFill>
+          <a:prstDash val="solid"/>
+          <a:miter lim="800000"/>
+        </a:ln>
+      </a:lnStyleLst>
+      <a:effectStyleLst>
+        <a:effectStyle>
+          <a:effectLst/>
+        </a:effectStyle>
+        <a:effectStyle>
+          <a:effectLst/>
+        </a:effectStyle>
+        <a:effectStyle>
+          <a:effectLst>
+            <a:outerShdw blurRad="57150" dist="19050" dir="5400000" algn="ctr" rotWithShape="0">
+              <a:srgbClr val="000000">
+                <a:alpha val="63000"/>
+              </a:srgbClr>
+            </a:outerShdw>
+          </a:effectLst>
+        </a:effectStyle>
+      </a:effectStyleLst>
+      <a:bgFillStyleLst>
+        <a:solidFill>
+          <a:schemeClr val="phClr"/>
+        </a:solidFill>
+        <a:solidFill>
+          <a:schemeClr val="phClr">
+            <a:tint val="95000"/>
+            <a:satMod val="170000"/>
+          </a:schemeClr>
+        </a:solidFill>
+        <a:gradFill rotWithShape="1">
+          <a:gsLst>
+            <a:gs pos="0">
+              <a:schemeClr val="phClr">
+                <a:tint val="93000"/>
+                <a:satMod val="150000"/>
+                <a:shade val="98000"/>
+                <a:lumMod val="102000"/>
+              </a:schemeClr>
+            </a:gs>
+            <a:gs pos="50000">
+              <a:schemeClr val="phClr">
+                <a:tint val="98000"/>
+                <a:satMod val="130000"/>
+                <a:shade val="90000"/>
+                <a:lumMod val="103000"/>
+              </a:schemeClr>
+            </a:gs>
+            <a:gs pos="100000">
+              <a:schemeClr val="phClr">
+                <a:shade val="63000"/>
+                <a:satMod val="120000"/>
+              </a:schemeClr>
+            </a:gs>
+          </a:gsLst>
+          <a:lin ang="5400000" scaled="0"/>
+        </a:gradFill>
+      </a:bgFillStyleLst>
+    </a:fmtScheme>
+  </a:themeElements>
+  <a:objectDefaults/>
+  <a:extraClrSchemeLst/>
+  <a:extLst>
+    <a:ext uri="{05A4C25C-085E-4340-85A3-A5531E510DB2}">
+      <thm15:themeFamily xmlns:thm15="http://schemas.microsoft.com/office/thememl/2012/main" name="Office Theme" id="{62F939B6-93AF-4DB8-9C6B-D6C7DFDC589F}" vid="{4A3C46E8-61CC-4603-A589-7422A47A8E4A}"/>
+    </a:ext>
+  </a:extLst>
+</a:theme>
 </file>
</xml_diff>